<commit_message>
Started implementing Kalman-Filter. Lots of stuff, but doesnt work...
</commit_message>
<xml_diff>
--- a/vortrag/ba_seminar_presentation.pptx
+++ b/vortrag/ba_seminar_presentation.pptx
@@ -5,7 +5,7 @@
     <p:sldMasterId id="2147483648" r:id="rId1"/>
   </p:sldMasterIdLst>
   <p:notesMasterIdLst>
-    <p:notesMasterId r:id="rId18"/>
+    <p:notesMasterId r:id="rId19"/>
   </p:notesMasterIdLst>
   <p:sldIdLst>
     <p:sldId id="256" r:id="rId2"/>
@@ -15,15 +15,16 @@
     <p:sldId id="264" r:id="rId6"/>
     <p:sldId id="259" r:id="rId7"/>
     <p:sldId id="267" r:id="rId8"/>
-    <p:sldId id="268" r:id="rId9"/>
-    <p:sldId id="262" r:id="rId10"/>
-    <p:sldId id="260" r:id="rId11"/>
-    <p:sldId id="266" r:id="rId12"/>
-    <p:sldId id="269" r:id="rId13"/>
-    <p:sldId id="272" r:id="rId14"/>
-    <p:sldId id="270" r:id="rId15"/>
-    <p:sldId id="265" r:id="rId16"/>
-    <p:sldId id="273" r:id="rId17"/>
+    <p:sldId id="274" r:id="rId9"/>
+    <p:sldId id="268" r:id="rId10"/>
+    <p:sldId id="262" r:id="rId11"/>
+    <p:sldId id="260" r:id="rId12"/>
+    <p:sldId id="266" r:id="rId13"/>
+    <p:sldId id="269" r:id="rId14"/>
+    <p:sldId id="272" r:id="rId15"/>
+    <p:sldId id="270" r:id="rId16"/>
+    <p:sldId id="265" r:id="rId17"/>
+    <p:sldId id="273" r:id="rId18"/>
   </p:sldIdLst>
   <p:sldSz cx="9144000" cy="6858000" type="screen4x3"/>
   <p:notesSz cx="6858000" cy="9144000"/>
@@ -628,7 +629,7 @@
           <a:p>
             <a:fld id="{416FB7CF-276F-45FE-92E9-289D7174B126}" type="slidenum">
               <a:rPr lang="de-DE" smtClean="0"/>
-              <a:t>9</a:t>
+              <a:t>10</a:t>
             </a:fld>
             <a:endParaRPr lang="de-DE"/>
           </a:p>
@@ -755,7 +756,7 @@
           <a:p>
             <a:fld id="{416FB7CF-276F-45FE-92E9-289D7174B126}" type="slidenum">
               <a:rPr lang="de-DE" smtClean="0"/>
-              <a:t>12</a:t>
+              <a:t>13</a:t>
             </a:fld>
             <a:endParaRPr lang="de-DE"/>
           </a:p>
@@ -882,7 +883,7 @@
           <a:p>
             <a:fld id="{416FB7CF-276F-45FE-92E9-289D7174B126}" type="slidenum">
               <a:rPr lang="de-DE" smtClean="0"/>
-              <a:t>13</a:t>
+              <a:t>14</a:t>
             </a:fld>
             <a:endParaRPr lang="de-DE"/>
           </a:p>
@@ -1009,7 +1010,7 @@
           <a:p>
             <a:fld id="{416FB7CF-276F-45FE-92E9-289D7174B126}" type="slidenum">
               <a:rPr lang="de-DE" smtClean="0"/>
-              <a:t>14</a:t>
+              <a:t>15</a:t>
             </a:fld>
             <a:endParaRPr lang="de-DE"/>
           </a:p>
@@ -4379,6 +4380,716 @@
         </p:spPr>
         <p:txBody>
           <a:bodyPr>
+            <a:normAutofit/>
+          </a:bodyPr>
+          <a:lstStyle/>
+          <a:p>
+            <a:pPr algn="ctr"/>
+            <a:r>
+              <a:rPr lang="de-DE" sz="5400"/>
+              <a:t>Kalman Filter: World Model</a:t>
+            </a:r>
+          </a:p>
+        </p:txBody>
+      </p:sp>
+      <mc:AlternateContent xmlns:mc="http://schemas.openxmlformats.org/markup-compatibility/2006" xmlns:a14="http://schemas.microsoft.com/office/drawing/2010/main">
+        <mc:Choice Requires="a14">
+          <p:sp>
+            <p:nvSpPr>
+              <p:cNvPr id="3" name="Inhaltsplatzhalter 2">
+                <a:extLst>
+                  <a:ext uri="{FF2B5EF4-FFF2-40B4-BE49-F238E27FC236}">
+                    <a16:creationId xmlns:a16="http://schemas.microsoft.com/office/drawing/2014/main" id="{9962D4C6-1989-457F-A5DB-9CC2C96CDAE3}"/>
+                  </a:ext>
+                </a:extLst>
+              </p:cNvPr>
+              <p:cNvSpPr>
+                <a:spLocks noGrp="1"/>
+              </p:cNvSpPr>
+              <p:nvPr>
+                <p:ph idx="1"/>
+              </p:nvPr>
+            </p:nvSpPr>
+            <p:spPr/>
+            <p:txBody>
+              <a:bodyPr>
+                <a:normAutofit/>
+              </a:bodyPr>
+              <a:lstStyle/>
+              <a:p>
+                <a:pPr marL="0" indent="0">
+                  <a:buNone/>
+                </a:pPr>
+                <a:r>
+                  <a:rPr lang="de-DE" sz="2800">
+                    <a:latin typeface="Corbel" panose="020B0503020204020204" pitchFamily="34" charset="0"/>
+                  </a:rPr>
+                  <a:t>the kalman-filter assumes the following state progression (based on former state </a:t>
+                </a:r>
+                <a14:m>
+                  <m:oMath xmlns:m="http://schemas.openxmlformats.org/officeDocument/2006/math">
+                    <m:sSub>
+                      <m:sSubPr>
+                        <m:ctrlPr>
+                          <a:rPr lang="de-DE" sz="2800" b="0" i="1" smtClean="0">
+                            <a:latin typeface="Cambria Math" panose="02040503050406030204" pitchFamily="18" charset="0"/>
+                          </a:rPr>
+                        </m:ctrlPr>
+                      </m:sSubPr>
+                      <m:e>
+                        <m:r>
+                          <a:rPr lang="de-DE" sz="2800" b="0" i="1" smtClean="0">
+                            <a:latin typeface="Cambria Math" panose="02040503050406030204" pitchFamily="18" charset="0"/>
+                          </a:rPr>
+                          <m:t>𝑥</m:t>
+                        </m:r>
+                      </m:e>
+                      <m:sub>
+                        <m:r>
+                          <a:rPr lang="de-DE" sz="2800" b="0" i="1" smtClean="0">
+                            <a:latin typeface="Cambria Math" panose="02040503050406030204" pitchFamily="18" charset="0"/>
+                          </a:rPr>
+                          <m:t>𝑘</m:t>
+                        </m:r>
+                        <m:r>
+                          <a:rPr lang="de-DE" sz="2800" b="0" i="1" smtClean="0">
+                            <a:latin typeface="Cambria Math" panose="02040503050406030204" pitchFamily="18" charset="0"/>
+                          </a:rPr>
+                          <m:t>−1</m:t>
+                        </m:r>
+                      </m:sub>
+                    </m:sSub>
+                  </m:oMath>
+                </a14:m>
+                <a:r>
+                  <a:rPr lang="de-DE" sz="2800">
+                    <a:latin typeface="Corbel" panose="020B0503020204020204" pitchFamily="34" charset="0"/>
+                  </a:rPr>
+                  <a:t>):</a:t>
+                </a:r>
+              </a:p>
+              <a:p>
+                <a:pPr marL="0" indent="0">
+                  <a:buNone/>
+                </a:pPr>
+                <a:endParaRPr lang="de-DE" sz="2800">
+                  <a:latin typeface="Corbel" panose="020B0503020204020204" pitchFamily="34" charset="0"/>
+                </a:endParaRPr>
+              </a:p>
+              <a:p>
+                <a:pPr marL="0" indent="0">
+                  <a:buNone/>
+                </a:pPr>
+                <a14:m>
+                  <m:oMathPara xmlns:m="http://schemas.openxmlformats.org/officeDocument/2006/math">
+                    <m:oMathParaPr>
+                      <m:jc m:val="centerGroup"/>
+                    </m:oMathParaPr>
+                    <m:oMath xmlns:m="http://schemas.openxmlformats.org/officeDocument/2006/math">
+                      <m:sSub>
+                        <m:sSubPr>
+                          <m:ctrlPr>
+                            <a:rPr lang="de-DE" sz="3200" b="0" i="1" smtClean="0">
+                              <a:latin typeface="Cambria Math" panose="02040503050406030204" pitchFamily="18" charset="0"/>
+                            </a:rPr>
+                          </m:ctrlPr>
+                        </m:sSubPr>
+                        <m:e>
+                          <m:r>
+                            <a:rPr lang="de-DE" sz="3200" b="0" i="1" smtClean="0">
+                              <a:latin typeface="Cambria Math" panose="02040503050406030204" pitchFamily="18" charset="0"/>
+                            </a:rPr>
+                            <m:t>𝑥</m:t>
+                          </m:r>
+                        </m:e>
+                        <m:sub>
+                          <m:r>
+                            <a:rPr lang="de-DE" sz="3200" b="0" i="1" smtClean="0">
+                              <a:latin typeface="Cambria Math" panose="02040503050406030204" pitchFamily="18" charset="0"/>
+                            </a:rPr>
+                            <m:t>𝑘</m:t>
+                          </m:r>
+                        </m:sub>
+                      </m:sSub>
+                      <m:r>
+                        <a:rPr lang="de-DE" sz="3200" b="0" i="1" smtClean="0">
+                          <a:latin typeface="Cambria Math" panose="02040503050406030204" pitchFamily="18" charset="0"/>
+                        </a:rPr>
+                        <m:t>=</m:t>
+                      </m:r>
+                      <m:sSub>
+                        <m:sSubPr>
+                          <m:ctrlPr>
+                            <a:rPr lang="de-DE" sz="3200" b="0" i="1" smtClean="0">
+                              <a:latin typeface="Cambria Math" panose="02040503050406030204" pitchFamily="18" charset="0"/>
+                            </a:rPr>
+                          </m:ctrlPr>
+                        </m:sSubPr>
+                        <m:e>
+                          <m:r>
+                            <a:rPr lang="de-DE" sz="3200" b="0" i="1" smtClean="0">
+                              <a:latin typeface="Cambria Math" panose="02040503050406030204" pitchFamily="18" charset="0"/>
+                            </a:rPr>
+                            <m:t>𝐹</m:t>
+                          </m:r>
+                        </m:e>
+                        <m:sub>
+                          <m:r>
+                            <a:rPr lang="de-DE" sz="3200" b="0" i="1" smtClean="0">
+                              <a:latin typeface="Cambria Math" panose="02040503050406030204" pitchFamily="18" charset="0"/>
+                            </a:rPr>
+                            <m:t>𝑘</m:t>
+                          </m:r>
+                        </m:sub>
+                      </m:sSub>
+                      <m:sSub>
+                        <m:sSubPr>
+                          <m:ctrlPr>
+                            <a:rPr lang="de-DE" sz="3200" b="0" i="1" smtClean="0">
+                              <a:latin typeface="Cambria Math" panose="02040503050406030204" pitchFamily="18" charset="0"/>
+                            </a:rPr>
+                          </m:ctrlPr>
+                        </m:sSubPr>
+                        <m:e>
+                          <m:r>
+                            <a:rPr lang="de-DE" sz="3200" b="0" i="1" smtClean="0">
+                              <a:latin typeface="Cambria Math" panose="02040503050406030204" pitchFamily="18" charset="0"/>
+                            </a:rPr>
+                            <m:t>𝑥</m:t>
+                          </m:r>
+                        </m:e>
+                        <m:sub>
+                          <m:r>
+                            <a:rPr lang="de-DE" sz="3200" b="0" i="1" smtClean="0">
+                              <a:latin typeface="Cambria Math" panose="02040503050406030204" pitchFamily="18" charset="0"/>
+                            </a:rPr>
+                            <m:t>𝑘</m:t>
+                          </m:r>
+                          <m:r>
+                            <a:rPr lang="de-DE" sz="3200" b="0" i="1" smtClean="0">
+                              <a:latin typeface="Cambria Math" panose="02040503050406030204" pitchFamily="18" charset="0"/>
+                            </a:rPr>
+                            <m:t>−1</m:t>
+                          </m:r>
+                        </m:sub>
+                      </m:sSub>
+                      <m:r>
+                        <a:rPr lang="de-DE" sz="3200" b="0" i="1" smtClean="0">
+                          <a:latin typeface="Cambria Math" panose="02040503050406030204" pitchFamily="18" charset="0"/>
+                        </a:rPr>
+                        <m:t>+</m:t>
+                      </m:r>
+                      <m:sSub>
+                        <m:sSubPr>
+                          <m:ctrlPr>
+                            <a:rPr lang="de-DE" sz="3200" b="0" i="1" smtClean="0">
+                              <a:latin typeface="Cambria Math" panose="02040503050406030204" pitchFamily="18" charset="0"/>
+                            </a:rPr>
+                          </m:ctrlPr>
+                        </m:sSubPr>
+                        <m:e>
+                          <m:r>
+                            <a:rPr lang="de-DE" sz="3200" b="0" i="1" smtClean="0">
+                              <a:latin typeface="Cambria Math" panose="02040503050406030204" pitchFamily="18" charset="0"/>
+                            </a:rPr>
+                            <m:t>𝐵</m:t>
+                          </m:r>
+                        </m:e>
+                        <m:sub>
+                          <m:r>
+                            <a:rPr lang="de-DE" sz="3200" b="0" i="1" smtClean="0">
+                              <a:latin typeface="Cambria Math" panose="02040503050406030204" pitchFamily="18" charset="0"/>
+                            </a:rPr>
+                            <m:t>𝑘</m:t>
+                          </m:r>
+                        </m:sub>
+                      </m:sSub>
+                      <m:sSub>
+                        <m:sSubPr>
+                          <m:ctrlPr>
+                            <a:rPr lang="de-DE" sz="3200" b="0" i="1" smtClean="0">
+                              <a:latin typeface="Cambria Math" panose="02040503050406030204" pitchFamily="18" charset="0"/>
+                            </a:rPr>
+                          </m:ctrlPr>
+                        </m:sSubPr>
+                        <m:e>
+                          <m:r>
+                            <a:rPr lang="de-DE" sz="3200" b="0" i="1" smtClean="0">
+                              <a:latin typeface="Cambria Math" panose="02040503050406030204" pitchFamily="18" charset="0"/>
+                            </a:rPr>
+                            <m:t>𝑢</m:t>
+                          </m:r>
+                        </m:e>
+                        <m:sub>
+                          <m:r>
+                            <a:rPr lang="de-DE" sz="3200" b="0" i="1" smtClean="0">
+                              <a:latin typeface="Cambria Math" panose="02040503050406030204" pitchFamily="18" charset="0"/>
+                            </a:rPr>
+                            <m:t>𝑘</m:t>
+                          </m:r>
+                        </m:sub>
+                      </m:sSub>
+                      <m:r>
+                        <a:rPr lang="de-DE" sz="3200" b="0" i="1" smtClean="0">
+                          <a:latin typeface="Cambria Math" panose="02040503050406030204" pitchFamily="18" charset="0"/>
+                        </a:rPr>
+                        <m:t>+</m:t>
+                      </m:r>
+                      <m:sSub>
+                        <m:sSubPr>
+                          <m:ctrlPr>
+                            <a:rPr lang="de-DE" sz="3200" b="0" i="1" smtClean="0">
+                              <a:latin typeface="Cambria Math" panose="02040503050406030204" pitchFamily="18" charset="0"/>
+                            </a:rPr>
+                          </m:ctrlPr>
+                        </m:sSubPr>
+                        <m:e>
+                          <m:r>
+                            <a:rPr lang="de-DE" sz="3200" b="0" i="1" smtClean="0">
+                              <a:latin typeface="Cambria Math" panose="02040503050406030204" pitchFamily="18" charset="0"/>
+                            </a:rPr>
+                            <m:t>𝑤</m:t>
+                          </m:r>
+                        </m:e>
+                        <m:sub>
+                          <m:r>
+                            <a:rPr lang="de-DE" sz="3200" b="0" i="1" smtClean="0">
+                              <a:latin typeface="Cambria Math" panose="02040503050406030204" pitchFamily="18" charset="0"/>
+                            </a:rPr>
+                            <m:t>𝑘</m:t>
+                          </m:r>
+                        </m:sub>
+                      </m:sSub>
+                    </m:oMath>
+                  </m:oMathPara>
+                </a14:m>
+                <a:endParaRPr lang="de-DE" sz="2800" b="0">
+                  <a:latin typeface="Corbel" panose="020B0503020204020204" pitchFamily="34" charset="0"/>
+                </a:endParaRPr>
+              </a:p>
+              <a:p>
+                <a:pPr marL="0" indent="0">
+                  <a:buNone/>
+                </a:pPr>
+                <a:endParaRPr lang="de-DE" sz="2800" b="0">
+                  <a:latin typeface="Corbel" panose="020B0503020204020204" pitchFamily="34" charset="0"/>
+                </a:endParaRPr>
+              </a:p>
+              <a:p>
+                <a:pPr>
+                  <a:buFontTx/>
+                  <a:buChar char="-"/>
+                </a:pPr>
+                <a14:m>
+                  <m:oMath xmlns:m="http://schemas.openxmlformats.org/officeDocument/2006/math">
+                    <m:sSub>
+                      <m:sSubPr>
+                        <m:ctrlPr>
+                          <a:rPr lang="de-DE" sz="2800" b="0" i="1" smtClean="0">
+                            <a:latin typeface="Cambria Math" panose="02040503050406030204" pitchFamily="18" charset="0"/>
+                          </a:rPr>
+                        </m:ctrlPr>
+                      </m:sSubPr>
+                      <m:e>
+                        <m:r>
+                          <a:rPr lang="de-DE" sz="2800" b="0" i="1" smtClean="0">
+                            <a:latin typeface="Cambria Math" panose="02040503050406030204" pitchFamily="18" charset="0"/>
+                          </a:rPr>
+                          <m:t>𝐹</m:t>
+                        </m:r>
+                      </m:e>
+                      <m:sub>
+                        <m:r>
+                          <a:rPr lang="de-DE" sz="2800" b="0" i="1" smtClean="0">
+                            <a:latin typeface="Cambria Math" panose="02040503050406030204" pitchFamily="18" charset="0"/>
+                          </a:rPr>
+                          <m:t>𝑘</m:t>
+                        </m:r>
+                      </m:sub>
+                    </m:sSub>
+                  </m:oMath>
+                </a14:m>
+                <a:r>
+                  <a:rPr lang="de-DE" sz="2800">
+                    <a:latin typeface="Corbel" panose="020B0503020204020204" pitchFamily="34" charset="0"/>
+                  </a:rPr>
+                  <a:t> : state-transition model  </a:t>
+                </a:r>
+                <a:r>
+                  <a:rPr lang="de-DE" sz="2400">
+                    <a:solidFill>
+                      <a:schemeClr val="accent3"/>
+                    </a:solidFill>
+                    <a:latin typeface="Corbel" panose="020B0503020204020204" pitchFamily="34" charset="0"/>
+                  </a:rPr>
+                  <a:t>(e.g. classical mechanics)</a:t>
+                </a:r>
+              </a:p>
+              <a:p>
+                <a:pPr>
+                  <a:buFontTx/>
+                  <a:buChar char="-"/>
+                </a:pPr>
+                <a14:m>
+                  <m:oMath xmlns:m="http://schemas.openxmlformats.org/officeDocument/2006/math">
+                    <m:sSub>
+                      <m:sSubPr>
+                        <m:ctrlPr>
+                          <a:rPr lang="de-DE" sz="2800" b="0" i="1" smtClean="0">
+                            <a:latin typeface="Cambria Math" panose="02040503050406030204" pitchFamily="18" charset="0"/>
+                          </a:rPr>
+                        </m:ctrlPr>
+                      </m:sSubPr>
+                      <m:e>
+                        <m:r>
+                          <a:rPr lang="de-DE" sz="2800" b="0" i="1" smtClean="0">
+                            <a:latin typeface="Cambria Math" panose="02040503050406030204" pitchFamily="18" charset="0"/>
+                          </a:rPr>
+                          <m:t>𝐵</m:t>
+                        </m:r>
+                      </m:e>
+                      <m:sub>
+                        <m:r>
+                          <a:rPr lang="de-DE" sz="2800" b="0" i="1" smtClean="0">
+                            <a:latin typeface="Cambria Math" panose="02040503050406030204" pitchFamily="18" charset="0"/>
+                          </a:rPr>
+                          <m:t>𝑘</m:t>
+                        </m:r>
+                      </m:sub>
+                    </m:sSub>
+                  </m:oMath>
+                </a14:m>
+                <a:r>
+                  <a:rPr lang="de-DE" sz="2800">
+                    <a:latin typeface="Corbel" panose="020B0503020204020204" pitchFamily="34" charset="0"/>
+                  </a:rPr>
+                  <a:t> : control-input model  </a:t>
+                </a:r>
+                <a:r>
+                  <a:rPr lang="de-DE" sz="2400">
+                    <a:solidFill>
+                      <a:schemeClr val="accent3"/>
+                    </a:solidFill>
+                    <a:latin typeface="Corbel" panose="020B0503020204020204" pitchFamily="34" charset="0"/>
+                  </a:rPr>
+                  <a:t>(e.g. motor affects position)</a:t>
+                </a:r>
+              </a:p>
+              <a:p>
+                <a:pPr>
+                  <a:buFontTx/>
+                  <a:buChar char="-"/>
+                </a:pPr>
+                <a14:m>
+                  <m:oMath xmlns:m="http://schemas.openxmlformats.org/officeDocument/2006/math">
+                    <m:sSub>
+                      <m:sSubPr>
+                        <m:ctrlPr>
+                          <a:rPr lang="de-DE" sz="2800" b="0" i="1" smtClean="0">
+                            <a:latin typeface="Cambria Math" panose="02040503050406030204" pitchFamily="18" charset="0"/>
+                          </a:rPr>
+                        </m:ctrlPr>
+                      </m:sSubPr>
+                      <m:e>
+                        <m:r>
+                          <a:rPr lang="de-DE" sz="2800" b="0" i="1" smtClean="0">
+                            <a:latin typeface="Cambria Math" panose="02040503050406030204" pitchFamily="18" charset="0"/>
+                          </a:rPr>
+                          <m:t>𝑢</m:t>
+                        </m:r>
+                      </m:e>
+                      <m:sub>
+                        <m:r>
+                          <a:rPr lang="de-DE" sz="2800" b="0" i="1" smtClean="0">
+                            <a:latin typeface="Cambria Math" panose="02040503050406030204" pitchFamily="18" charset="0"/>
+                          </a:rPr>
+                          <m:t>𝑘</m:t>
+                        </m:r>
+                      </m:sub>
+                    </m:sSub>
+                  </m:oMath>
+                </a14:m>
+                <a:r>
+                  <a:rPr lang="de-DE" sz="2800">
+                    <a:latin typeface="Corbel" panose="020B0503020204020204" pitchFamily="34" charset="0"/>
+                  </a:rPr>
+                  <a:t> : control vector  </a:t>
+                </a:r>
+                <a:r>
+                  <a:rPr lang="de-DE" sz="2400">
+                    <a:solidFill>
+                      <a:schemeClr val="accent3"/>
+                    </a:solidFill>
+                    <a:latin typeface="Corbel" panose="020B0503020204020204" pitchFamily="34" charset="0"/>
+                  </a:rPr>
+                  <a:t>(e.g. how much the motor is driven)</a:t>
+                </a:r>
+              </a:p>
+              <a:p>
+                <a:pPr>
+                  <a:buFontTx/>
+                  <a:buChar char="-"/>
+                </a:pPr>
+                <a14:m>
+                  <m:oMath xmlns:m="http://schemas.openxmlformats.org/officeDocument/2006/math">
+                    <m:sSub>
+                      <m:sSubPr>
+                        <m:ctrlPr>
+                          <a:rPr lang="de-DE" sz="2800" i="1">
+                            <a:solidFill>
+                              <a:prstClr val="black"/>
+                            </a:solidFill>
+                            <a:latin typeface="Cambria Math" panose="02040503050406030204" pitchFamily="18" charset="0"/>
+                          </a:rPr>
+                        </m:ctrlPr>
+                      </m:sSubPr>
+                      <m:e>
+                        <m:r>
+                          <a:rPr lang="de-DE" sz="2800" b="0" i="1" smtClean="0">
+                            <a:solidFill>
+                              <a:prstClr val="black"/>
+                            </a:solidFill>
+                            <a:latin typeface="Cambria Math" panose="02040503050406030204" pitchFamily="18" charset="0"/>
+                          </a:rPr>
+                          <m:t>𝑤</m:t>
+                        </m:r>
+                      </m:e>
+                      <m:sub>
+                        <m:r>
+                          <a:rPr lang="de-DE" sz="2800" i="1">
+                            <a:solidFill>
+                              <a:prstClr val="black"/>
+                            </a:solidFill>
+                            <a:latin typeface="Cambria Math" panose="02040503050406030204" pitchFamily="18" charset="0"/>
+                          </a:rPr>
+                          <m:t>𝑘</m:t>
+                        </m:r>
+                      </m:sub>
+                    </m:sSub>
+                  </m:oMath>
+                </a14:m>
+                <a:r>
+                  <a:rPr lang="de-DE" sz="2800">
+                    <a:solidFill>
+                      <a:prstClr val="black"/>
+                    </a:solidFill>
+                    <a:latin typeface="Corbel" panose="020B0503020204020204" pitchFamily="34" charset="0"/>
+                  </a:rPr>
+                  <a:t> : process noise – with covariance </a:t>
+                </a:r>
+                <a14:m>
+                  <m:oMath xmlns:m="http://schemas.openxmlformats.org/officeDocument/2006/math">
+                    <m:sSub>
+                      <m:sSubPr>
+                        <m:ctrlPr>
+                          <a:rPr lang="de-DE" sz="2800" b="0" i="1" smtClean="0">
+                            <a:solidFill>
+                              <a:prstClr val="black"/>
+                            </a:solidFill>
+                            <a:latin typeface="Cambria Math" panose="02040503050406030204" pitchFamily="18" charset="0"/>
+                          </a:rPr>
+                        </m:ctrlPr>
+                      </m:sSubPr>
+                      <m:e>
+                        <m:r>
+                          <a:rPr lang="de-DE" sz="2800" b="0" i="1" smtClean="0">
+                            <a:solidFill>
+                              <a:prstClr val="black"/>
+                            </a:solidFill>
+                            <a:latin typeface="Cambria Math" panose="02040503050406030204" pitchFamily="18" charset="0"/>
+                          </a:rPr>
+                          <m:t>𝑄</m:t>
+                        </m:r>
+                      </m:e>
+                      <m:sub>
+                        <m:r>
+                          <a:rPr lang="de-DE" sz="2800" b="0" i="1" smtClean="0">
+                            <a:solidFill>
+                              <a:prstClr val="black"/>
+                            </a:solidFill>
+                            <a:latin typeface="Cambria Math" panose="02040503050406030204" pitchFamily="18" charset="0"/>
+                          </a:rPr>
+                          <m:t>𝑘</m:t>
+                        </m:r>
+                      </m:sub>
+                    </m:sSub>
+                  </m:oMath>
+                </a14:m>
+                <a:endParaRPr lang="de-DE" sz="2400">
+                  <a:latin typeface="Corbel" panose="020B0503020204020204" pitchFamily="34" charset="0"/>
+                </a:endParaRPr>
+              </a:p>
+              <a:p>
+                <a:pPr>
+                  <a:buFontTx/>
+                  <a:buChar char="-"/>
+                </a:pPr>
+                <a:endParaRPr lang="de-DE" sz="2800">
+                  <a:latin typeface="Corbel" panose="020B0503020204020204" pitchFamily="34" charset="0"/>
+                </a:endParaRPr>
+              </a:p>
+            </p:txBody>
+          </p:sp>
+        </mc:Choice>
+        <mc:Fallback xmlns="">
+          <p:sp>
+            <p:nvSpPr>
+              <p:cNvPr id="3" name="Inhaltsplatzhalter 2">
+                <a:extLst>
+                  <a:ext uri="{FF2B5EF4-FFF2-40B4-BE49-F238E27FC236}">
+                    <a16:creationId xmlns:a16="http://schemas.microsoft.com/office/drawing/2014/main" id="{9962D4C6-1989-457F-A5DB-9CC2C96CDAE3}"/>
+                  </a:ext>
+                </a:extLst>
+              </p:cNvPr>
+              <p:cNvSpPr>
+                <a:spLocks noGrp="1" noRot="1" noChangeAspect="1" noMove="1" noResize="1" noEditPoints="1" noAdjustHandles="1" noChangeArrowheads="1" noChangeShapeType="1" noTextEdit="1"/>
+              </p:cNvSpPr>
+              <p:nvPr>
+                <p:ph idx="1"/>
+              </p:nvPr>
+            </p:nvSpPr>
+            <p:spPr>
+              <a:blipFill>
+                <a:blip r:embed="rId3"/>
+                <a:stretch>
+                  <a:fillRect l="-1546" t="-2241" b="-840"/>
+                </a:stretch>
+              </a:blipFill>
+            </p:spPr>
+            <p:txBody>
+              <a:bodyPr/>
+              <a:lstStyle/>
+              <a:p>
+                <a:r>
+                  <a:rPr lang="de-DE">
+                    <a:noFill/>
+                  </a:rPr>
+                  <a:t> </a:t>
+                </a:r>
+              </a:p>
+            </p:txBody>
+          </p:sp>
+        </mc:Fallback>
+      </mc:AlternateContent>
+      <p:cxnSp>
+        <p:nvCxnSpPr>
+          <p:cNvPr id="5" name="Gerader Verbinder 4">
+            <a:extLst>
+              <a:ext uri="{FF2B5EF4-FFF2-40B4-BE49-F238E27FC236}">
+                <a16:creationId xmlns:a16="http://schemas.microsoft.com/office/drawing/2014/main" id="{1892A047-1063-4568-A9A5-DA40684BA449}"/>
+              </a:ext>
+            </a:extLst>
+          </p:cNvPr>
+          <p:cNvCxnSpPr/>
+          <p:nvPr/>
+        </p:nvCxnSpPr>
+        <p:spPr>
+          <a:xfrm>
+            <a:off x="0" y="1065231"/>
+            <a:ext cx="9144000" cy="0"/>
+          </a:xfrm>
+          <a:prstGeom prst="line">
+            <a:avLst/>
+          </a:prstGeom>
+        </p:spPr>
+        <p:style>
+          <a:lnRef idx="1">
+            <a:schemeClr val="accent1"/>
+          </a:lnRef>
+          <a:fillRef idx="0">
+            <a:schemeClr val="accent1"/>
+          </a:fillRef>
+          <a:effectRef idx="0">
+            <a:schemeClr val="accent1"/>
+          </a:effectRef>
+          <a:fontRef idx="minor">
+            <a:schemeClr val="tx1"/>
+          </a:fontRef>
+        </p:style>
+      </p:cxnSp>
+      <p:sp>
+        <p:nvSpPr>
+          <p:cNvPr id="6" name="Foliennummernplatzhalter 5">
+            <a:extLst>
+              <a:ext uri="{FF2B5EF4-FFF2-40B4-BE49-F238E27FC236}">
+                <a16:creationId xmlns:a16="http://schemas.microsoft.com/office/drawing/2014/main" id="{5140CF2F-6F7F-44F0-8F3E-6C2234A57167}"/>
+              </a:ext>
+            </a:extLst>
+          </p:cNvPr>
+          <p:cNvSpPr>
+            <a:spLocks noGrp="1"/>
+          </p:cNvSpPr>
+          <p:nvPr>
+            <p:ph type="sldNum" sz="quarter" idx="12"/>
+          </p:nvPr>
+        </p:nvSpPr>
+        <p:spPr/>
+        <p:txBody>
+          <a:bodyPr/>
+          <a:lstStyle/>
+          <a:p>
+            <a:fld id="{0696A970-E1A0-4FA3-8434-947DF6AD858B}" type="slidenum">
+              <a:rPr lang="de-DE" smtClean="0"/>
+              <a:t>10</a:t>
+            </a:fld>
+            <a:endParaRPr lang="de-DE"/>
+          </a:p>
+        </p:txBody>
+      </p:sp>
+    </p:spTree>
+    <p:extLst>
+      <p:ext uri="{BB962C8B-B14F-4D97-AF65-F5344CB8AC3E}">
+        <p14:creationId xmlns:p14="http://schemas.microsoft.com/office/powerpoint/2010/main" val="942563095"/>
+      </p:ext>
+    </p:extLst>
+  </p:cSld>
+  <p:clrMapOvr>
+    <a:masterClrMapping/>
+  </p:clrMapOvr>
+</p:sld>
+</file>
+
+<file path=ppt/slides/slide11.xml><?xml version="1.0" encoding="utf-8"?>
+<p:sld xmlns:a="http://schemas.openxmlformats.org/drawingml/2006/main" xmlns:r="http://schemas.openxmlformats.org/officeDocument/2006/relationships" xmlns:p="http://schemas.openxmlformats.org/presentationml/2006/main">
+  <p:cSld>
+    <p:spTree>
+      <p:nvGrpSpPr>
+        <p:cNvPr id="1" name=""/>
+        <p:cNvGrpSpPr/>
+        <p:nvPr/>
+      </p:nvGrpSpPr>
+      <p:grpSpPr>
+        <a:xfrm>
+          <a:off x="0" y="0"/>
+          <a:ext cx="0" cy="0"/>
+          <a:chOff x="0" y="0"/>
+          <a:chExt cx="0" cy="0"/>
+        </a:xfrm>
+      </p:grpSpPr>
+      <p:sp>
+        <p:nvSpPr>
+          <p:cNvPr id="2" name="Titel 1">
+            <a:extLst>
+              <a:ext uri="{FF2B5EF4-FFF2-40B4-BE49-F238E27FC236}">
+                <a16:creationId xmlns:a16="http://schemas.microsoft.com/office/drawing/2014/main" id="{05F9BAA4-7E2C-49B0-A8A8-D436EB0C28B8}"/>
+              </a:ext>
+            </a:extLst>
+          </p:cNvPr>
+          <p:cNvSpPr>
+            <a:spLocks noGrp="1"/>
+          </p:cNvSpPr>
+          <p:nvPr>
+            <p:ph type="title"/>
+          </p:nvPr>
+        </p:nvSpPr>
+        <p:spPr>
+          <a:xfrm>
+            <a:off x="0" y="18255"/>
+            <a:ext cx="9144000" cy="1056401"/>
+          </a:xfrm>
+        </p:spPr>
+        <p:txBody>
+          <a:bodyPr>
             <a:normAutofit fontScale="90000"/>
           </a:bodyPr>
           <a:lstStyle/>
@@ -4866,7 +5577,7 @@
           <a:p>
             <a:fld id="{0696A970-E1A0-4FA3-8434-947DF6AD858B}" type="slidenum">
               <a:rPr lang="de-DE" smtClean="0"/>
-              <a:t>10</a:t>
+              <a:t>11</a:t>
             </a:fld>
             <a:endParaRPr lang="de-DE"/>
           </a:p>
@@ -4885,7 +5596,7 @@
 </p:sld>
 </file>
 
-<file path=ppt/slides/slide11.xml><?xml version="1.0" encoding="utf-8"?>
+<file path=ppt/slides/slide12.xml><?xml version="1.0" encoding="utf-8"?>
 <p:sld xmlns:a="http://schemas.openxmlformats.org/drawingml/2006/main" xmlns:r="http://schemas.openxmlformats.org/officeDocument/2006/relationships" xmlns:p="http://schemas.openxmlformats.org/presentationml/2006/main">
   <p:cSld>
     <p:spTree>
@@ -5060,7 +5771,7 @@
           <a:p>
             <a:fld id="{0696A970-E1A0-4FA3-8434-947DF6AD858B}" type="slidenum">
               <a:rPr lang="de-DE" smtClean="0"/>
-              <a:t>11</a:t>
+              <a:t>12</a:t>
             </a:fld>
             <a:endParaRPr lang="de-DE"/>
           </a:p>
@@ -6741,8 +7452,8 @@
           </a:fontRef>
         </p:style>
       </p:cxnSp>
-      <mc:AlternateContent xmlns:mc="http://schemas.openxmlformats.org/markup-compatibility/2006">
-        <mc:Choice xmlns:a14="http://schemas.microsoft.com/office/drawing/2010/main" Requires="a14">
+      <mc:AlternateContent xmlns:mc="http://schemas.openxmlformats.org/markup-compatibility/2006" xmlns:a14="http://schemas.microsoft.com/office/drawing/2010/main">
+        <mc:Choice Requires="a14">
           <p:sp>
             <p:nvSpPr>
               <p:cNvPr id="55" name="Rechteck: abgerundete Ecken 54">
@@ -6849,7 +7560,7 @@
             </p:txBody>
           </p:sp>
         </mc:Choice>
-        <mc:Fallback>
+        <mc:Fallback xmlns="">
           <p:sp>
             <p:nvSpPr>
               <p:cNvPr id="55" name="Rechteck: abgerundete Ecken 54">
@@ -6956,7 +7667,7 @@
 </p:sld>
 </file>
 
-<file path=ppt/slides/slide12.xml><?xml version="1.0" encoding="utf-8"?>
+<file path=ppt/slides/slide13.xml><?xml version="1.0" encoding="utf-8"?>
 <p:sld xmlns:a="http://schemas.openxmlformats.org/drawingml/2006/main" xmlns:r="http://schemas.openxmlformats.org/officeDocument/2006/relationships" xmlns:p="http://schemas.openxmlformats.org/presentationml/2006/main">
   <p:cSld>
     <p:spTree>
@@ -7072,8 +7783,8 @@
           </a:p>
         </p:txBody>
       </p:sp>
-      <mc:AlternateContent xmlns:mc="http://schemas.openxmlformats.org/markup-compatibility/2006">
-        <mc:Choice xmlns:a14="http://schemas.microsoft.com/office/drawing/2010/main" Requires="a14">
+      <mc:AlternateContent xmlns:mc="http://schemas.openxmlformats.org/markup-compatibility/2006" xmlns:a14="http://schemas.microsoft.com/office/drawing/2010/main">
+        <mc:Choice Requires="a14">
           <p:sp>
             <p:nvSpPr>
               <p:cNvPr id="3" name="Inhaltsplatzhalter 2">
@@ -7508,7 +8219,7 @@
                     <m:sSub>
                       <m:sSubPr>
                         <m:ctrlPr>
-                          <a:rPr lang="de-DE" sz="2400" b="0" i="0" smtClean="0">
+                          <a:rPr lang="de-DE" sz="2400" b="0" i="1" smtClean="0">
                             <a:solidFill>
                               <a:schemeClr val="accent2"/>
                             </a:solidFill>
@@ -7563,7 +8274,7 @@
             </p:txBody>
           </p:sp>
         </mc:Choice>
-        <mc:Fallback>
+        <mc:Fallback xmlns="">
           <p:sp>
             <p:nvSpPr>
               <p:cNvPr id="3" name="Inhaltsplatzhalter 2">
@@ -7666,14 +8377,14 @@
           <a:p>
             <a:fld id="{0696A970-E1A0-4FA3-8434-947DF6AD858B}" type="slidenum">
               <a:rPr lang="de-DE" smtClean="0"/>
-              <a:t>12</a:t>
+              <a:t>13</a:t>
             </a:fld>
             <a:endParaRPr lang="de-DE"/>
           </a:p>
         </p:txBody>
       </p:sp>
-      <mc:AlternateContent xmlns:mc="http://schemas.openxmlformats.org/markup-compatibility/2006">
-        <mc:Choice xmlns:a14="http://schemas.microsoft.com/office/drawing/2010/main" Requires="a14">
+      <mc:AlternateContent xmlns:mc="http://schemas.openxmlformats.org/markup-compatibility/2006" xmlns:a14="http://schemas.microsoft.com/office/drawing/2010/main">
+        <mc:Choice Requires="a14">
           <p:sp>
             <p:nvSpPr>
               <p:cNvPr id="8" name="Rechteck: abgerundete Ecken 7">
@@ -7776,7 +8487,7 @@
             </p:txBody>
           </p:sp>
         </mc:Choice>
-        <mc:Fallback>
+        <mc:Fallback xmlns="">
           <p:sp>
             <p:nvSpPr>
               <p:cNvPr id="8" name="Rechteck: abgerundete Ecken 7">
@@ -7824,8 +8535,8 @@
           </p:sp>
         </mc:Fallback>
       </mc:AlternateContent>
-      <mc:AlternateContent xmlns:mc="http://schemas.openxmlformats.org/markup-compatibility/2006">
-        <mc:Choice xmlns:a14="http://schemas.microsoft.com/office/drawing/2010/main" Requires="a14">
+      <mc:AlternateContent xmlns:mc="http://schemas.openxmlformats.org/markup-compatibility/2006" xmlns:a14="http://schemas.microsoft.com/office/drawing/2010/main">
+        <mc:Choice Requires="a14">
           <p:sp>
             <p:nvSpPr>
               <p:cNvPr id="9" name="Rechteck: abgerundete Ecken 8">
@@ -7922,7 +8633,7 @@
             </p:txBody>
           </p:sp>
         </mc:Choice>
-        <mc:Fallback>
+        <mc:Fallback xmlns="">
           <p:sp>
             <p:nvSpPr>
               <p:cNvPr id="9" name="Rechteck: abgerundete Ecken 8">
@@ -7970,8 +8681,8 @@
           </p:sp>
         </mc:Fallback>
       </mc:AlternateContent>
-      <mc:AlternateContent xmlns:mc="http://schemas.openxmlformats.org/markup-compatibility/2006">
-        <mc:Choice xmlns:a14="http://schemas.microsoft.com/office/drawing/2010/main" Requires="a14">
+      <mc:AlternateContent xmlns:mc="http://schemas.openxmlformats.org/markup-compatibility/2006" xmlns:a14="http://schemas.microsoft.com/office/drawing/2010/main">
+        <mc:Choice Requires="a14">
           <p:sp>
             <p:nvSpPr>
               <p:cNvPr id="10" name="Rechteck 9">
@@ -8291,7 +9002,7 @@
             </p:txBody>
           </p:sp>
         </mc:Choice>
-        <mc:Fallback>
+        <mc:Fallback xmlns="">
           <p:sp>
             <p:nvSpPr>
               <p:cNvPr id="10" name="Rechteck 9">
@@ -8761,7 +9472,7 @@
 </p:sld>
 </file>
 
-<file path=ppt/slides/slide13.xml><?xml version="1.0" encoding="utf-8"?>
+<file path=ppt/slides/slide14.xml><?xml version="1.0" encoding="utf-8"?>
 <p:sld xmlns:a="http://schemas.openxmlformats.org/drawingml/2006/main" xmlns:r="http://schemas.openxmlformats.org/officeDocument/2006/relationships" xmlns:p="http://schemas.openxmlformats.org/presentationml/2006/main">
   <p:cSld>
     <p:spTree>
@@ -8877,8 +9588,8 @@
           </a:p>
         </p:txBody>
       </p:sp>
-      <mc:AlternateContent xmlns:mc="http://schemas.openxmlformats.org/markup-compatibility/2006">
-        <mc:Choice xmlns:a14="http://schemas.microsoft.com/office/drawing/2010/main" Requires="a14">
+      <mc:AlternateContent xmlns:mc="http://schemas.openxmlformats.org/markup-compatibility/2006" xmlns:a14="http://schemas.microsoft.com/office/drawing/2010/main">
+        <mc:Choice Requires="a14">
           <p:sp>
             <p:nvSpPr>
               <p:cNvPr id="3" name="Inhaltsplatzhalter 2">
@@ -9518,7 +10229,7 @@
             </p:txBody>
           </p:sp>
         </mc:Choice>
-        <mc:Fallback>
+        <mc:Fallback xmlns="">
           <p:sp>
             <p:nvSpPr>
               <p:cNvPr id="3" name="Inhaltsplatzhalter 2">
@@ -9621,14 +10332,14 @@
           <a:p>
             <a:fld id="{0696A970-E1A0-4FA3-8434-947DF6AD858B}" type="slidenum">
               <a:rPr lang="de-DE" smtClean="0"/>
-              <a:t>13</a:t>
+              <a:t>14</a:t>
             </a:fld>
             <a:endParaRPr lang="de-DE"/>
           </a:p>
         </p:txBody>
       </p:sp>
-      <mc:AlternateContent xmlns:mc="http://schemas.openxmlformats.org/markup-compatibility/2006">
-        <mc:Choice xmlns:a14="http://schemas.microsoft.com/office/drawing/2010/main" Requires="a14">
+      <mc:AlternateContent xmlns:mc="http://schemas.openxmlformats.org/markup-compatibility/2006" xmlns:a14="http://schemas.microsoft.com/office/drawing/2010/main">
+        <mc:Choice Requires="a14">
           <p:sp>
             <p:nvSpPr>
               <p:cNvPr id="14" name="Rechteck: abgerundete Ecken 13">
@@ -9723,7 +10434,7 @@
             </p:txBody>
           </p:sp>
         </mc:Choice>
-        <mc:Fallback>
+        <mc:Fallback xmlns="">
           <p:sp>
             <p:nvSpPr>
               <p:cNvPr id="14" name="Rechteck: abgerundete Ecken 13">
@@ -9771,8 +10482,8 @@
           </p:sp>
         </mc:Fallback>
       </mc:AlternateContent>
-      <mc:AlternateContent xmlns:mc="http://schemas.openxmlformats.org/markup-compatibility/2006">
-        <mc:Choice xmlns:a14="http://schemas.microsoft.com/office/drawing/2010/main" Requires="a14">
+      <mc:AlternateContent xmlns:mc="http://schemas.openxmlformats.org/markup-compatibility/2006" xmlns:a14="http://schemas.microsoft.com/office/drawing/2010/main">
+        <mc:Choice Requires="a14">
           <p:sp>
             <p:nvSpPr>
               <p:cNvPr id="15" name="Rechteck 14">
@@ -10007,7 +10718,7 @@
             </p:txBody>
           </p:sp>
         </mc:Choice>
-        <mc:Fallback>
+        <mc:Fallback xmlns="">
           <p:sp>
             <p:nvSpPr>
               <p:cNvPr id="15" name="Rechteck 14">
@@ -10656,7 +11367,7 @@
 </p:sld>
 </file>
 
-<file path=ppt/slides/slide14.xml><?xml version="1.0" encoding="utf-8"?>
+<file path=ppt/slides/slide15.xml><?xml version="1.0" encoding="utf-8"?>
 <p:sld xmlns:a="http://schemas.openxmlformats.org/drawingml/2006/main" xmlns:r="http://schemas.openxmlformats.org/officeDocument/2006/relationships" xmlns:p="http://schemas.openxmlformats.org/presentationml/2006/main">
   <p:cSld>
     <p:spTree>
@@ -10772,8 +11483,8 @@
           </a:p>
         </p:txBody>
       </p:sp>
-      <mc:AlternateContent xmlns:mc="http://schemas.openxmlformats.org/markup-compatibility/2006">
-        <mc:Choice xmlns:a14="http://schemas.microsoft.com/office/drawing/2010/main" Requires="a14">
+      <mc:AlternateContent xmlns:mc="http://schemas.openxmlformats.org/markup-compatibility/2006" xmlns:a14="http://schemas.microsoft.com/office/drawing/2010/main">
+        <mc:Choice Requires="a14">
           <p:sp>
             <p:nvSpPr>
               <p:cNvPr id="3" name="Inhaltsplatzhalter 2">
@@ -11531,7 +12242,7 @@
             </p:txBody>
           </p:sp>
         </mc:Choice>
-        <mc:Fallback>
+        <mc:Fallback xmlns="">
           <p:sp>
             <p:nvSpPr>
               <p:cNvPr id="3" name="Inhaltsplatzhalter 2">
@@ -11634,14 +12345,14 @@
           <a:p>
             <a:fld id="{0696A970-E1A0-4FA3-8434-947DF6AD858B}" type="slidenum">
               <a:rPr lang="de-DE" smtClean="0"/>
-              <a:t>14</a:t>
+              <a:t>15</a:t>
             </a:fld>
             <a:endParaRPr lang="de-DE"/>
           </a:p>
         </p:txBody>
       </p:sp>
-      <mc:AlternateContent xmlns:mc="http://schemas.openxmlformats.org/markup-compatibility/2006">
-        <mc:Choice xmlns:a14="http://schemas.microsoft.com/office/drawing/2010/main" Requires="a14">
+      <mc:AlternateContent xmlns:mc="http://schemas.openxmlformats.org/markup-compatibility/2006" xmlns:a14="http://schemas.microsoft.com/office/drawing/2010/main">
+        <mc:Choice Requires="a14">
           <p:sp>
             <p:nvSpPr>
               <p:cNvPr id="14" name="Rechteck: abgerundete Ecken 13">
@@ -11736,7 +12447,7 @@
             </p:txBody>
           </p:sp>
         </mc:Choice>
-        <mc:Fallback>
+        <mc:Fallback xmlns="">
           <p:sp>
             <p:nvSpPr>
               <p:cNvPr id="14" name="Rechteck: abgerundete Ecken 13">
@@ -11784,8 +12495,8 @@
           </p:sp>
         </mc:Fallback>
       </mc:AlternateContent>
-      <mc:AlternateContent xmlns:mc="http://schemas.openxmlformats.org/markup-compatibility/2006">
-        <mc:Choice xmlns:a14="http://schemas.microsoft.com/office/drawing/2010/main" Requires="a14">
+      <mc:AlternateContent xmlns:mc="http://schemas.openxmlformats.org/markup-compatibility/2006" xmlns:a14="http://schemas.microsoft.com/office/drawing/2010/main">
+        <mc:Choice Requires="a14">
           <p:sp>
             <p:nvSpPr>
               <p:cNvPr id="15" name="Rechteck 14">
@@ -12020,7 +12731,7 @@
             </p:txBody>
           </p:sp>
         </mc:Choice>
-        <mc:Fallback>
+        <mc:Fallback xmlns="">
           <p:sp>
             <p:nvSpPr>
               <p:cNvPr id="15" name="Rechteck 14">
@@ -12389,578 +13100,6 @@
     <p:extLst>
       <p:ext uri="{BB962C8B-B14F-4D97-AF65-F5344CB8AC3E}">
         <p14:creationId xmlns:p14="http://schemas.microsoft.com/office/powerpoint/2010/main" val="80711234"/>
-      </p:ext>
-    </p:extLst>
-  </p:cSld>
-  <p:clrMapOvr>
-    <a:masterClrMapping/>
-  </p:clrMapOvr>
-</p:sld>
-</file>
-
-<file path=ppt/slides/slide15.xml><?xml version="1.0" encoding="utf-8"?>
-<p:sld xmlns:a="http://schemas.openxmlformats.org/drawingml/2006/main" xmlns:r="http://schemas.openxmlformats.org/officeDocument/2006/relationships" xmlns:p="http://schemas.openxmlformats.org/presentationml/2006/main">
-  <p:cSld>
-    <p:spTree>
-      <p:nvGrpSpPr>
-        <p:cNvPr id="1" name=""/>
-        <p:cNvGrpSpPr/>
-        <p:nvPr/>
-      </p:nvGrpSpPr>
-      <p:grpSpPr>
-        <a:xfrm>
-          <a:off x="0" y="0"/>
-          <a:ext cx="0" cy="0"/>
-          <a:chOff x="0" y="0"/>
-          <a:chExt cx="0" cy="0"/>
-        </a:xfrm>
-      </p:grpSpPr>
-      <p:sp>
-        <p:nvSpPr>
-          <p:cNvPr id="2" name="Titel 1">
-            <a:extLst>
-              <a:ext uri="{FF2B5EF4-FFF2-40B4-BE49-F238E27FC236}">
-                <a16:creationId xmlns:a16="http://schemas.microsoft.com/office/drawing/2014/main" id="{05F9BAA4-7E2C-49B0-A8A8-D436EB0C28B8}"/>
-              </a:ext>
-            </a:extLst>
-          </p:cNvPr>
-          <p:cNvSpPr>
-            <a:spLocks noGrp="1"/>
-          </p:cNvSpPr>
-          <p:nvPr>
-            <p:ph type="title"/>
-          </p:nvPr>
-        </p:nvSpPr>
-        <p:spPr>
-          <a:xfrm>
-            <a:off x="0" y="18255"/>
-            <a:ext cx="9144000" cy="1056401"/>
-          </a:xfrm>
-        </p:spPr>
-        <p:txBody>
-          <a:bodyPr>
-            <a:normAutofit/>
-          </a:bodyPr>
-          <a:lstStyle/>
-          <a:p>
-            <a:pPr algn="ctr"/>
-            <a:r>
-              <a:rPr lang="de-DE" sz="5400"/>
-              <a:t>Kalman-Filter</a:t>
-            </a:r>
-          </a:p>
-        </p:txBody>
-      </p:sp>
-      <p:cxnSp>
-        <p:nvCxnSpPr>
-          <p:cNvPr id="5" name="Gerader Verbinder 4">
-            <a:extLst>
-              <a:ext uri="{FF2B5EF4-FFF2-40B4-BE49-F238E27FC236}">
-                <a16:creationId xmlns:a16="http://schemas.microsoft.com/office/drawing/2014/main" id="{1892A047-1063-4568-A9A5-DA40684BA449}"/>
-              </a:ext>
-            </a:extLst>
-          </p:cNvPr>
-          <p:cNvCxnSpPr/>
-          <p:nvPr/>
-        </p:nvCxnSpPr>
-        <p:spPr>
-          <a:xfrm>
-            <a:off x="0" y="1065231"/>
-            <a:ext cx="9144000" cy="0"/>
-          </a:xfrm>
-          <a:prstGeom prst="line">
-            <a:avLst/>
-          </a:prstGeom>
-        </p:spPr>
-        <p:style>
-          <a:lnRef idx="1">
-            <a:schemeClr val="accent1"/>
-          </a:lnRef>
-          <a:fillRef idx="0">
-            <a:schemeClr val="accent1"/>
-          </a:fillRef>
-          <a:effectRef idx="0">
-            <a:schemeClr val="accent1"/>
-          </a:effectRef>
-          <a:fontRef idx="minor">
-            <a:schemeClr val="tx1"/>
-          </a:fontRef>
-        </p:style>
-      </p:cxnSp>
-      <p:sp>
-        <p:nvSpPr>
-          <p:cNvPr id="6" name="Foliennummernplatzhalter 5">
-            <a:extLst>
-              <a:ext uri="{FF2B5EF4-FFF2-40B4-BE49-F238E27FC236}">
-                <a16:creationId xmlns:a16="http://schemas.microsoft.com/office/drawing/2014/main" id="{5140CF2F-6F7F-44F0-8F3E-6C2234A57167}"/>
-              </a:ext>
-            </a:extLst>
-          </p:cNvPr>
-          <p:cNvSpPr>
-            <a:spLocks noGrp="1"/>
-          </p:cNvSpPr>
-          <p:nvPr>
-            <p:ph type="sldNum" sz="quarter" idx="12"/>
-          </p:nvPr>
-        </p:nvSpPr>
-        <p:spPr/>
-        <p:txBody>
-          <a:bodyPr/>
-          <a:lstStyle/>
-          <a:p>
-            <a:fld id="{0696A970-E1A0-4FA3-8434-947DF6AD858B}" type="slidenum">
-              <a:rPr lang="de-DE" smtClean="0"/>
-              <a:t>15</a:t>
-            </a:fld>
-            <a:endParaRPr lang="de-DE"/>
-          </a:p>
-        </p:txBody>
-      </p:sp>
-      <p:sp>
-        <p:nvSpPr>
-          <p:cNvPr id="4" name="Rechteck: abgerundete Ecken 3">
-            <a:extLst>
-              <a:ext uri="{FF2B5EF4-FFF2-40B4-BE49-F238E27FC236}">
-                <a16:creationId xmlns:a16="http://schemas.microsoft.com/office/drawing/2014/main" id="{47758687-F3FE-4A85-A7AE-CFA8CD719E23}"/>
-              </a:ext>
-            </a:extLst>
-          </p:cNvPr>
-          <p:cNvSpPr/>
-          <p:nvPr/>
-        </p:nvSpPr>
-        <p:spPr>
-          <a:xfrm>
-            <a:off x="628650" y="2510314"/>
-            <a:ext cx="1819910" cy="918686"/>
-          </a:xfrm>
-          <a:prstGeom prst="roundRect">
-            <a:avLst/>
-          </a:prstGeom>
-          <a:ln>
-            <a:noFill/>
-          </a:ln>
-        </p:spPr>
-        <p:style>
-          <a:lnRef idx="2">
-            <a:schemeClr val="accent1">
-              <a:shade val="50000"/>
-            </a:schemeClr>
-          </a:lnRef>
-          <a:fillRef idx="1">
-            <a:schemeClr val="accent1"/>
-          </a:fillRef>
-          <a:effectRef idx="0">
-            <a:schemeClr val="accent1"/>
-          </a:effectRef>
-          <a:fontRef idx="minor">
-            <a:schemeClr val="lt1"/>
-          </a:fontRef>
-        </p:style>
-        <p:txBody>
-          <a:bodyPr rtlCol="0" anchor="ctr"/>
-          <a:lstStyle/>
-          <a:p>
-            <a:pPr algn="ctr"/>
-            <a:r>
-              <a:rPr lang="de-DE"/>
-              <a:t>past state</a:t>
-            </a:r>
-          </a:p>
-        </p:txBody>
-      </p:sp>
-      <p:sp>
-        <p:nvSpPr>
-          <p:cNvPr id="7" name="Rechteck: abgerundete Ecken 6">
-            <a:extLst>
-              <a:ext uri="{FF2B5EF4-FFF2-40B4-BE49-F238E27FC236}">
-                <a16:creationId xmlns:a16="http://schemas.microsoft.com/office/drawing/2014/main" id="{FA442E37-F9B9-4845-ACFD-34AED2889B5A}"/>
-              </a:ext>
-            </a:extLst>
-          </p:cNvPr>
-          <p:cNvSpPr/>
-          <p:nvPr/>
-        </p:nvSpPr>
-        <p:spPr>
-          <a:xfrm>
-            <a:off x="628650" y="4485401"/>
-            <a:ext cx="1819910" cy="918686"/>
-          </a:xfrm>
-          <a:prstGeom prst="roundRect">
-            <a:avLst/>
-          </a:prstGeom>
-          <a:solidFill>
-            <a:schemeClr val="accent2"/>
-          </a:solidFill>
-          <a:ln>
-            <a:noFill/>
-          </a:ln>
-        </p:spPr>
-        <p:style>
-          <a:lnRef idx="2">
-            <a:schemeClr val="accent1">
-              <a:shade val="50000"/>
-            </a:schemeClr>
-          </a:lnRef>
-          <a:fillRef idx="1">
-            <a:schemeClr val="accent1"/>
-          </a:fillRef>
-          <a:effectRef idx="0">
-            <a:schemeClr val="accent1"/>
-          </a:effectRef>
-          <a:fontRef idx="minor">
-            <a:schemeClr val="lt1"/>
-          </a:fontRef>
-        </p:style>
-        <p:txBody>
-          <a:bodyPr rtlCol="0" anchor="ctr"/>
-          <a:lstStyle/>
-          <a:p>
-            <a:pPr algn="ctr"/>
-            <a:r>
-              <a:rPr lang="de-DE"/>
-              <a:t>sensor readings</a:t>
-            </a:r>
-          </a:p>
-        </p:txBody>
-      </p:sp>
-      <p:sp>
-        <p:nvSpPr>
-          <p:cNvPr id="8" name="Rechteck: abgerundete Ecken 7">
-            <a:extLst>
-              <a:ext uri="{FF2B5EF4-FFF2-40B4-BE49-F238E27FC236}">
-                <a16:creationId xmlns:a16="http://schemas.microsoft.com/office/drawing/2014/main" id="{FCFD7E92-E227-4F7F-8BD4-B9A9F75AA2A2}"/>
-              </a:ext>
-            </a:extLst>
-          </p:cNvPr>
-          <p:cNvSpPr/>
-          <p:nvPr/>
-        </p:nvSpPr>
-        <p:spPr>
-          <a:xfrm>
-            <a:off x="2752090" y="2510314"/>
-            <a:ext cx="1819910" cy="918686"/>
-          </a:xfrm>
-          <a:prstGeom prst="roundRect">
-            <a:avLst/>
-          </a:prstGeom>
-          <a:ln>
-            <a:noFill/>
-          </a:ln>
-        </p:spPr>
-        <p:style>
-          <a:lnRef idx="2">
-            <a:schemeClr val="accent1">
-              <a:shade val="50000"/>
-            </a:schemeClr>
-          </a:lnRef>
-          <a:fillRef idx="1">
-            <a:schemeClr val="accent1"/>
-          </a:fillRef>
-          <a:effectRef idx="0">
-            <a:schemeClr val="accent1"/>
-          </a:effectRef>
-          <a:fontRef idx="minor">
-            <a:schemeClr val="lt1"/>
-          </a:fontRef>
-        </p:style>
-        <p:txBody>
-          <a:bodyPr rtlCol="0" anchor="ctr"/>
-          <a:lstStyle/>
-          <a:p>
-            <a:pPr algn="ctr"/>
-            <a:r>
-              <a:rPr lang="de-DE"/>
-              <a:t>prediction</a:t>
-            </a:r>
-          </a:p>
-        </p:txBody>
-      </p:sp>
-      <p:cxnSp>
-        <p:nvCxnSpPr>
-          <p:cNvPr id="19" name="Gerade Verbindung mit Pfeil 18">
-            <a:extLst>
-              <a:ext uri="{FF2B5EF4-FFF2-40B4-BE49-F238E27FC236}">
-                <a16:creationId xmlns:a16="http://schemas.microsoft.com/office/drawing/2014/main" id="{B6F04D0E-1BA0-43CA-9CBB-09F0A8FB4A37}"/>
-              </a:ext>
-            </a:extLst>
-          </p:cNvPr>
-          <p:cNvCxnSpPr>
-            <a:stCxn id="4" idx="3"/>
-            <a:endCxn id="8" idx="1"/>
-          </p:cNvCxnSpPr>
-          <p:nvPr/>
-        </p:nvCxnSpPr>
-        <p:spPr>
-          <a:xfrm>
-            <a:off x="2448560" y="2969657"/>
-            <a:ext cx="303530" cy="0"/>
-          </a:xfrm>
-          <a:prstGeom prst="straightConnector1">
-            <a:avLst/>
-          </a:prstGeom>
-          <a:ln>
-            <a:headEnd w="lg" len="lg"/>
-            <a:tailEnd type="triangle" w="lg" len="lg"/>
-          </a:ln>
-        </p:spPr>
-        <p:style>
-          <a:lnRef idx="1">
-            <a:schemeClr val="accent1"/>
-          </a:lnRef>
-          <a:fillRef idx="0">
-            <a:schemeClr val="accent1"/>
-          </a:fillRef>
-          <a:effectRef idx="0">
-            <a:schemeClr val="accent1"/>
-          </a:effectRef>
-          <a:fontRef idx="minor">
-            <a:schemeClr val="tx1"/>
-          </a:fontRef>
-        </p:style>
-      </p:cxnSp>
-      <p:sp>
-        <p:nvSpPr>
-          <p:cNvPr id="27" name="Raute 26">
-            <a:extLst>
-              <a:ext uri="{FF2B5EF4-FFF2-40B4-BE49-F238E27FC236}">
-                <a16:creationId xmlns:a16="http://schemas.microsoft.com/office/drawing/2014/main" id="{DDCDDE14-93BE-4543-8A03-93F381497677}"/>
-              </a:ext>
-            </a:extLst>
-          </p:cNvPr>
-          <p:cNvSpPr/>
-          <p:nvPr/>
-        </p:nvSpPr>
-        <p:spPr>
-          <a:xfrm>
-            <a:off x="4572000" y="3429000"/>
-            <a:ext cx="1717042" cy="1056401"/>
-          </a:xfrm>
-          <a:prstGeom prst="diamond">
-            <a:avLst/>
-          </a:prstGeom>
-          <a:solidFill>
-            <a:schemeClr val="tx1"/>
-          </a:solidFill>
-          <a:ln>
-            <a:noFill/>
-          </a:ln>
-        </p:spPr>
-        <p:style>
-          <a:lnRef idx="2">
-            <a:schemeClr val="accent1">
-              <a:shade val="50000"/>
-            </a:schemeClr>
-          </a:lnRef>
-          <a:fillRef idx="1">
-            <a:schemeClr val="accent1"/>
-          </a:fillRef>
-          <a:effectRef idx="0">
-            <a:schemeClr val="accent1"/>
-          </a:effectRef>
-          <a:fontRef idx="minor">
-            <a:schemeClr val="lt1"/>
-          </a:fontRef>
-        </p:style>
-        <p:txBody>
-          <a:bodyPr rtlCol="0" anchor="ctr"/>
-          <a:lstStyle/>
-          <a:p>
-            <a:pPr algn="ctr"/>
-            <a:r>
-              <a:rPr lang="de-DE"/>
-              <a:t>weight</a:t>
-            </a:r>
-          </a:p>
-        </p:txBody>
-      </p:sp>
-      <p:cxnSp>
-        <p:nvCxnSpPr>
-          <p:cNvPr id="31" name="Verbinder: gewinkelt 30">
-            <a:extLst>
-              <a:ext uri="{FF2B5EF4-FFF2-40B4-BE49-F238E27FC236}">
-                <a16:creationId xmlns:a16="http://schemas.microsoft.com/office/drawing/2014/main" id="{96391CBD-3C2A-4297-BDD8-F452101FABFE}"/>
-              </a:ext>
-            </a:extLst>
-          </p:cNvPr>
-          <p:cNvCxnSpPr>
-            <a:stCxn id="7" idx="3"/>
-            <a:endCxn id="27" idx="2"/>
-          </p:cNvCxnSpPr>
-          <p:nvPr/>
-        </p:nvCxnSpPr>
-        <p:spPr>
-          <a:xfrm flipV="1">
-            <a:off x="2448560" y="4485401"/>
-            <a:ext cx="2981961" cy="459343"/>
-          </a:xfrm>
-          <a:prstGeom prst="bentConnector2">
-            <a:avLst/>
-          </a:prstGeom>
-          <a:ln>
-            <a:headEnd w="lg" len="lg"/>
-            <a:tailEnd type="triangle" w="lg" len="lg"/>
-          </a:ln>
-        </p:spPr>
-        <p:style>
-          <a:lnRef idx="1">
-            <a:schemeClr val="accent1"/>
-          </a:lnRef>
-          <a:fillRef idx="0">
-            <a:schemeClr val="accent1"/>
-          </a:fillRef>
-          <a:effectRef idx="0">
-            <a:schemeClr val="accent1"/>
-          </a:effectRef>
-          <a:fontRef idx="minor">
-            <a:schemeClr val="tx1"/>
-          </a:fontRef>
-        </p:style>
-      </p:cxnSp>
-      <p:cxnSp>
-        <p:nvCxnSpPr>
-          <p:cNvPr id="33" name="Verbinder: gewinkelt 32">
-            <a:extLst>
-              <a:ext uri="{FF2B5EF4-FFF2-40B4-BE49-F238E27FC236}">
-                <a16:creationId xmlns:a16="http://schemas.microsoft.com/office/drawing/2014/main" id="{598E5C07-D174-4D8E-B242-9BA60EF30B73}"/>
-              </a:ext>
-            </a:extLst>
-          </p:cNvPr>
-          <p:cNvCxnSpPr>
-            <a:stCxn id="8" idx="3"/>
-            <a:endCxn id="27" idx="0"/>
-          </p:cNvCxnSpPr>
-          <p:nvPr/>
-        </p:nvCxnSpPr>
-        <p:spPr>
-          <a:xfrm>
-            <a:off x="4572000" y="2969657"/>
-            <a:ext cx="858521" cy="459343"/>
-          </a:xfrm>
-          <a:prstGeom prst="bentConnector2">
-            <a:avLst/>
-          </a:prstGeom>
-          <a:ln>
-            <a:headEnd w="lg" len="lg"/>
-            <a:tailEnd type="triangle" w="lg" len="lg"/>
-          </a:ln>
-        </p:spPr>
-        <p:style>
-          <a:lnRef idx="1">
-            <a:schemeClr val="accent1"/>
-          </a:lnRef>
-          <a:fillRef idx="0">
-            <a:schemeClr val="accent1"/>
-          </a:fillRef>
-          <a:effectRef idx="0">
-            <a:schemeClr val="accent1"/>
-          </a:effectRef>
-          <a:fontRef idx="minor">
-            <a:schemeClr val="tx1"/>
-          </a:fontRef>
-        </p:style>
-      </p:cxnSp>
-      <p:sp>
-        <p:nvSpPr>
-          <p:cNvPr id="34" name="Rechteck: abgerundete Ecken 33">
-            <a:extLst>
-              <a:ext uri="{FF2B5EF4-FFF2-40B4-BE49-F238E27FC236}">
-                <a16:creationId xmlns:a16="http://schemas.microsoft.com/office/drawing/2014/main" id="{F2FC3924-A510-4630-8D2C-8F3E8CCF2149}"/>
-              </a:ext>
-            </a:extLst>
-          </p:cNvPr>
-          <p:cNvSpPr/>
-          <p:nvPr/>
-        </p:nvSpPr>
-        <p:spPr>
-          <a:xfrm>
-            <a:off x="6695440" y="3497857"/>
-            <a:ext cx="1819910" cy="918686"/>
-          </a:xfrm>
-          <a:prstGeom prst="roundRect">
-            <a:avLst/>
-          </a:prstGeom>
-          <a:solidFill>
-            <a:schemeClr val="accent1"/>
-          </a:solidFill>
-          <a:ln>
-            <a:noFill/>
-          </a:ln>
-        </p:spPr>
-        <p:style>
-          <a:lnRef idx="2">
-            <a:schemeClr val="accent1">
-              <a:shade val="50000"/>
-            </a:schemeClr>
-          </a:lnRef>
-          <a:fillRef idx="1">
-            <a:schemeClr val="accent1"/>
-          </a:fillRef>
-          <a:effectRef idx="0">
-            <a:schemeClr val="accent1"/>
-          </a:effectRef>
-          <a:fontRef idx="minor">
-            <a:schemeClr val="lt1"/>
-          </a:fontRef>
-        </p:style>
-        <p:txBody>
-          <a:bodyPr rtlCol="0" anchor="ctr"/>
-          <a:lstStyle/>
-          <a:p>
-            <a:pPr algn="ctr"/>
-            <a:r>
-              <a:rPr lang="de-DE"/>
-              <a:t>best estimate</a:t>
-            </a:r>
-          </a:p>
-        </p:txBody>
-      </p:sp>
-      <p:cxnSp>
-        <p:nvCxnSpPr>
-          <p:cNvPr id="43" name="Gerader Verbinder 42">
-            <a:extLst>
-              <a:ext uri="{FF2B5EF4-FFF2-40B4-BE49-F238E27FC236}">
-                <a16:creationId xmlns:a16="http://schemas.microsoft.com/office/drawing/2014/main" id="{2C5080FA-9FDF-482D-B64F-9D2044092326}"/>
-              </a:ext>
-            </a:extLst>
-          </p:cNvPr>
-          <p:cNvCxnSpPr>
-            <a:stCxn id="27" idx="3"/>
-            <a:endCxn id="34" idx="1"/>
-          </p:cNvCxnSpPr>
-          <p:nvPr/>
-        </p:nvCxnSpPr>
-        <p:spPr>
-          <a:xfrm flipV="1">
-            <a:off x="6289042" y="3957200"/>
-            <a:ext cx="406398" cy="1"/>
-          </a:xfrm>
-          <a:prstGeom prst="line">
-            <a:avLst/>
-          </a:prstGeom>
-          <a:ln>
-            <a:headEnd w="lg" len="lg"/>
-            <a:tailEnd type="triangle" w="lg" len="lg"/>
-          </a:ln>
-        </p:spPr>
-        <p:style>
-          <a:lnRef idx="1">
-            <a:schemeClr val="accent1"/>
-          </a:lnRef>
-          <a:fillRef idx="0">
-            <a:schemeClr val="accent1"/>
-          </a:fillRef>
-          <a:effectRef idx="0">
-            <a:schemeClr val="accent1"/>
-          </a:effectRef>
-          <a:fontRef idx="minor">
-            <a:schemeClr val="tx1"/>
-          </a:fontRef>
-        </p:style>
-      </p:cxnSp>
-    </p:spTree>
-    <p:extLst>
-      <p:ext uri="{BB962C8B-B14F-4D97-AF65-F5344CB8AC3E}">
-        <p14:creationId xmlns:p14="http://schemas.microsoft.com/office/powerpoint/2010/main" val="1214660825"/>
       </p:ext>
     </p:extLst>
   </p:cSld>
@@ -13088,8 +13227,580 @@
           </a:p>
         </p:txBody>
       </p:sp>
-      <mc:AlternateContent xmlns:mc="http://schemas.openxmlformats.org/markup-compatibility/2006">
-        <mc:Choice xmlns:a14="http://schemas.microsoft.com/office/drawing/2010/main" Requires="a14">
+      <p:sp>
+        <p:nvSpPr>
+          <p:cNvPr id="4" name="Rechteck: abgerundete Ecken 3">
+            <a:extLst>
+              <a:ext uri="{FF2B5EF4-FFF2-40B4-BE49-F238E27FC236}">
+                <a16:creationId xmlns:a16="http://schemas.microsoft.com/office/drawing/2014/main" id="{47758687-F3FE-4A85-A7AE-CFA8CD719E23}"/>
+              </a:ext>
+            </a:extLst>
+          </p:cNvPr>
+          <p:cNvSpPr/>
+          <p:nvPr/>
+        </p:nvSpPr>
+        <p:spPr>
+          <a:xfrm>
+            <a:off x="628650" y="2510314"/>
+            <a:ext cx="1819910" cy="918686"/>
+          </a:xfrm>
+          <a:prstGeom prst="roundRect">
+            <a:avLst/>
+          </a:prstGeom>
+          <a:ln>
+            <a:noFill/>
+          </a:ln>
+        </p:spPr>
+        <p:style>
+          <a:lnRef idx="2">
+            <a:schemeClr val="accent1">
+              <a:shade val="50000"/>
+            </a:schemeClr>
+          </a:lnRef>
+          <a:fillRef idx="1">
+            <a:schemeClr val="accent1"/>
+          </a:fillRef>
+          <a:effectRef idx="0">
+            <a:schemeClr val="accent1"/>
+          </a:effectRef>
+          <a:fontRef idx="minor">
+            <a:schemeClr val="lt1"/>
+          </a:fontRef>
+        </p:style>
+        <p:txBody>
+          <a:bodyPr rtlCol="0" anchor="ctr"/>
+          <a:lstStyle/>
+          <a:p>
+            <a:pPr algn="ctr"/>
+            <a:r>
+              <a:rPr lang="de-DE"/>
+              <a:t>past state</a:t>
+            </a:r>
+          </a:p>
+        </p:txBody>
+      </p:sp>
+      <p:sp>
+        <p:nvSpPr>
+          <p:cNvPr id="7" name="Rechteck: abgerundete Ecken 6">
+            <a:extLst>
+              <a:ext uri="{FF2B5EF4-FFF2-40B4-BE49-F238E27FC236}">
+                <a16:creationId xmlns:a16="http://schemas.microsoft.com/office/drawing/2014/main" id="{FA442E37-F9B9-4845-ACFD-34AED2889B5A}"/>
+              </a:ext>
+            </a:extLst>
+          </p:cNvPr>
+          <p:cNvSpPr/>
+          <p:nvPr/>
+        </p:nvSpPr>
+        <p:spPr>
+          <a:xfrm>
+            <a:off x="628650" y="4485401"/>
+            <a:ext cx="1819910" cy="918686"/>
+          </a:xfrm>
+          <a:prstGeom prst="roundRect">
+            <a:avLst/>
+          </a:prstGeom>
+          <a:solidFill>
+            <a:schemeClr val="accent2"/>
+          </a:solidFill>
+          <a:ln>
+            <a:noFill/>
+          </a:ln>
+        </p:spPr>
+        <p:style>
+          <a:lnRef idx="2">
+            <a:schemeClr val="accent1">
+              <a:shade val="50000"/>
+            </a:schemeClr>
+          </a:lnRef>
+          <a:fillRef idx="1">
+            <a:schemeClr val="accent1"/>
+          </a:fillRef>
+          <a:effectRef idx="0">
+            <a:schemeClr val="accent1"/>
+          </a:effectRef>
+          <a:fontRef idx="minor">
+            <a:schemeClr val="lt1"/>
+          </a:fontRef>
+        </p:style>
+        <p:txBody>
+          <a:bodyPr rtlCol="0" anchor="ctr"/>
+          <a:lstStyle/>
+          <a:p>
+            <a:pPr algn="ctr"/>
+            <a:r>
+              <a:rPr lang="de-DE"/>
+              <a:t>sensor readings</a:t>
+            </a:r>
+          </a:p>
+        </p:txBody>
+      </p:sp>
+      <p:sp>
+        <p:nvSpPr>
+          <p:cNvPr id="8" name="Rechteck: abgerundete Ecken 7">
+            <a:extLst>
+              <a:ext uri="{FF2B5EF4-FFF2-40B4-BE49-F238E27FC236}">
+                <a16:creationId xmlns:a16="http://schemas.microsoft.com/office/drawing/2014/main" id="{FCFD7E92-E227-4F7F-8BD4-B9A9F75AA2A2}"/>
+              </a:ext>
+            </a:extLst>
+          </p:cNvPr>
+          <p:cNvSpPr/>
+          <p:nvPr/>
+        </p:nvSpPr>
+        <p:spPr>
+          <a:xfrm>
+            <a:off x="2752090" y="2510314"/>
+            <a:ext cx="1819910" cy="918686"/>
+          </a:xfrm>
+          <a:prstGeom prst="roundRect">
+            <a:avLst/>
+          </a:prstGeom>
+          <a:ln>
+            <a:noFill/>
+          </a:ln>
+        </p:spPr>
+        <p:style>
+          <a:lnRef idx="2">
+            <a:schemeClr val="accent1">
+              <a:shade val="50000"/>
+            </a:schemeClr>
+          </a:lnRef>
+          <a:fillRef idx="1">
+            <a:schemeClr val="accent1"/>
+          </a:fillRef>
+          <a:effectRef idx="0">
+            <a:schemeClr val="accent1"/>
+          </a:effectRef>
+          <a:fontRef idx="minor">
+            <a:schemeClr val="lt1"/>
+          </a:fontRef>
+        </p:style>
+        <p:txBody>
+          <a:bodyPr rtlCol="0" anchor="ctr"/>
+          <a:lstStyle/>
+          <a:p>
+            <a:pPr algn="ctr"/>
+            <a:r>
+              <a:rPr lang="de-DE"/>
+              <a:t>prediction</a:t>
+            </a:r>
+          </a:p>
+        </p:txBody>
+      </p:sp>
+      <p:cxnSp>
+        <p:nvCxnSpPr>
+          <p:cNvPr id="19" name="Gerade Verbindung mit Pfeil 18">
+            <a:extLst>
+              <a:ext uri="{FF2B5EF4-FFF2-40B4-BE49-F238E27FC236}">
+                <a16:creationId xmlns:a16="http://schemas.microsoft.com/office/drawing/2014/main" id="{B6F04D0E-1BA0-43CA-9CBB-09F0A8FB4A37}"/>
+              </a:ext>
+            </a:extLst>
+          </p:cNvPr>
+          <p:cNvCxnSpPr>
+            <a:stCxn id="4" idx="3"/>
+            <a:endCxn id="8" idx="1"/>
+          </p:cNvCxnSpPr>
+          <p:nvPr/>
+        </p:nvCxnSpPr>
+        <p:spPr>
+          <a:xfrm>
+            <a:off x="2448560" y="2969657"/>
+            <a:ext cx="303530" cy="0"/>
+          </a:xfrm>
+          <a:prstGeom prst="straightConnector1">
+            <a:avLst/>
+          </a:prstGeom>
+          <a:ln>
+            <a:headEnd w="lg" len="lg"/>
+            <a:tailEnd type="triangle" w="lg" len="lg"/>
+          </a:ln>
+        </p:spPr>
+        <p:style>
+          <a:lnRef idx="1">
+            <a:schemeClr val="accent1"/>
+          </a:lnRef>
+          <a:fillRef idx="0">
+            <a:schemeClr val="accent1"/>
+          </a:fillRef>
+          <a:effectRef idx="0">
+            <a:schemeClr val="accent1"/>
+          </a:effectRef>
+          <a:fontRef idx="minor">
+            <a:schemeClr val="tx1"/>
+          </a:fontRef>
+        </p:style>
+      </p:cxnSp>
+      <p:sp>
+        <p:nvSpPr>
+          <p:cNvPr id="27" name="Raute 26">
+            <a:extLst>
+              <a:ext uri="{FF2B5EF4-FFF2-40B4-BE49-F238E27FC236}">
+                <a16:creationId xmlns:a16="http://schemas.microsoft.com/office/drawing/2014/main" id="{DDCDDE14-93BE-4543-8A03-93F381497677}"/>
+              </a:ext>
+            </a:extLst>
+          </p:cNvPr>
+          <p:cNvSpPr/>
+          <p:nvPr/>
+        </p:nvSpPr>
+        <p:spPr>
+          <a:xfrm>
+            <a:off x="4572000" y="3429000"/>
+            <a:ext cx="1717042" cy="1056401"/>
+          </a:xfrm>
+          <a:prstGeom prst="diamond">
+            <a:avLst/>
+          </a:prstGeom>
+          <a:solidFill>
+            <a:schemeClr val="tx1"/>
+          </a:solidFill>
+          <a:ln>
+            <a:noFill/>
+          </a:ln>
+        </p:spPr>
+        <p:style>
+          <a:lnRef idx="2">
+            <a:schemeClr val="accent1">
+              <a:shade val="50000"/>
+            </a:schemeClr>
+          </a:lnRef>
+          <a:fillRef idx="1">
+            <a:schemeClr val="accent1"/>
+          </a:fillRef>
+          <a:effectRef idx="0">
+            <a:schemeClr val="accent1"/>
+          </a:effectRef>
+          <a:fontRef idx="minor">
+            <a:schemeClr val="lt1"/>
+          </a:fontRef>
+        </p:style>
+        <p:txBody>
+          <a:bodyPr rtlCol="0" anchor="ctr"/>
+          <a:lstStyle/>
+          <a:p>
+            <a:pPr algn="ctr"/>
+            <a:r>
+              <a:rPr lang="de-DE"/>
+              <a:t>weight</a:t>
+            </a:r>
+          </a:p>
+        </p:txBody>
+      </p:sp>
+      <p:cxnSp>
+        <p:nvCxnSpPr>
+          <p:cNvPr id="31" name="Verbinder: gewinkelt 30">
+            <a:extLst>
+              <a:ext uri="{FF2B5EF4-FFF2-40B4-BE49-F238E27FC236}">
+                <a16:creationId xmlns:a16="http://schemas.microsoft.com/office/drawing/2014/main" id="{96391CBD-3C2A-4297-BDD8-F452101FABFE}"/>
+              </a:ext>
+            </a:extLst>
+          </p:cNvPr>
+          <p:cNvCxnSpPr>
+            <a:stCxn id="7" idx="3"/>
+            <a:endCxn id="27" idx="2"/>
+          </p:cNvCxnSpPr>
+          <p:nvPr/>
+        </p:nvCxnSpPr>
+        <p:spPr>
+          <a:xfrm flipV="1">
+            <a:off x="2448560" y="4485401"/>
+            <a:ext cx="2981961" cy="459343"/>
+          </a:xfrm>
+          <a:prstGeom prst="bentConnector2">
+            <a:avLst/>
+          </a:prstGeom>
+          <a:ln>
+            <a:headEnd w="lg" len="lg"/>
+            <a:tailEnd type="triangle" w="lg" len="lg"/>
+          </a:ln>
+        </p:spPr>
+        <p:style>
+          <a:lnRef idx="1">
+            <a:schemeClr val="accent1"/>
+          </a:lnRef>
+          <a:fillRef idx="0">
+            <a:schemeClr val="accent1"/>
+          </a:fillRef>
+          <a:effectRef idx="0">
+            <a:schemeClr val="accent1"/>
+          </a:effectRef>
+          <a:fontRef idx="minor">
+            <a:schemeClr val="tx1"/>
+          </a:fontRef>
+        </p:style>
+      </p:cxnSp>
+      <p:cxnSp>
+        <p:nvCxnSpPr>
+          <p:cNvPr id="33" name="Verbinder: gewinkelt 32">
+            <a:extLst>
+              <a:ext uri="{FF2B5EF4-FFF2-40B4-BE49-F238E27FC236}">
+                <a16:creationId xmlns:a16="http://schemas.microsoft.com/office/drawing/2014/main" id="{598E5C07-D174-4D8E-B242-9BA60EF30B73}"/>
+              </a:ext>
+            </a:extLst>
+          </p:cNvPr>
+          <p:cNvCxnSpPr>
+            <a:stCxn id="8" idx="3"/>
+            <a:endCxn id="27" idx="0"/>
+          </p:cNvCxnSpPr>
+          <p:nvPr/>
+        </p:nvCxnSpPr>
+        <p:spPr>
+          <a:xfrm>
+            <a:off x="4572000" y="2969657"/>
+            <a:ext cx="858521" cy="459343"/>
+          </a:xfrm>
+          <a:prstGeom prst="bentConnector2">
+            <a:avLst/>
+          </a:prstGeom>
+          <a:ln>
+            <a:headEnd w="lg" len="lg"/>
+            <a:tailEnd type="triangle" w="lg" len="lg"/>
+          </a:ln>
+        </p:spPr>
+        <p:style>
+          <a:lnRef idx="1">
+            <a:schemeClr val="accent1"/>
+          </a:lnRef>
+          <a:fillRef idx="0">
+            <a:schemeClr val="accent1"/>
+          </a:fillRef>
+          <a:effectRef idx="0">
+            <a:schemeClr val="accent1"/>
+          </a:effectRef>
+          <a:fontRef idx="minor">
+            <a:schemeClr val="tx1"/>
+          </a:fontRef>
+        </p:style>
+      </p:cxnSp>
+      <p:sp>
+        <p:nvSpPr>
+          <p:cNvPr id="34" name="Rechteck: abgerundete Ecken 33">
+            <a:extLst>
+              <a:ext uri="{FF2B5EF4-FFF2-40B4-BE49-F238E27FC236}">
+                <a16:creationId xmlns:a16="http://schemas.microsoft.com/office/drawing/2014/main" id="{F2FC3924-A510-4630-8D2C-8F3E8CCF2149}"/>
+              </a:ext>
+            </a:extLst>
+          </p:cNvPr>
+          <p:cNvSpPr/>
+          <p:nvPr/>
+        </p:nvSpPr>
+        <p:spPr>
+          <a:xfrm>
+            <a:off x="6695440" y="3497857"/>
+            <a:ext cx="1819910" cy="918686"/>
+          </a:xfrm>
+          <a:prstGeom prst="roundRect">
+            <a:avLst/>
+          </a:prstGeom>
+          <a:solidFill>
+            <a:schemeClr val="accent1"/>
+          </a:solidFill>
+          <a:ln>
+            <a:noFill/>
+          </a:ln>
+        </p:spPr>
+        <p:style>
+          <a:lnRef idx="2">
+            <a:schemeClr val="accent1">
+              <a:shade val="50000"/>
+            </a:schemeClr>
+          </a:lnRef>
+          <a:fillRef idx="1">
+            <a:schemeClr val="accent1"/>
+          </a:fillRef>
+          <a:effectRef idx="0">
+            <a:schemeClr val="accent1"/>
+          </a:effectRef>
+          <a:fontRef idx="minor">
+            <a:schemeClr val="lt1"/>
+          </a:fontRef>
+        </p:style>
+        <p:txBody>
+          <a:bodyPr rtlCol="0" anchor="ctr"/>
+          <a:lstStyle/>
+          <a:p>
+            <a:pPr algn="ctr"/>
+            <a:r>
+              <a:rPr lang="de-DE"/>
+              <a:t>best estimate</a:t>
+            </a:r>
+          </a:p>
+        </p:txBody>
+      </p:sp>
+      <p:cxnSp>
+        <p:nvCxnSpPr>
+          <p:cNvPr id="43" name="Gerader Verbinder 42">
+            <a:extLst>
+              <a:ext uri="{FF2B5EF4-FFF2-40B4-BE49-F238E27FC236}">
+                <a16:creationId xmlns:a16="http://schemas.microsoft.com/office/drawing/2014/main" id="{2C5080FA-9FDF-482D-B64F-9D2044092326}"/>
+              </a:ext>
+            </a:extLst>
+          </p:cNvPr>
+          <p:cNvCxnSpPr>
+            <a:stCxn id="27" idx="3"/>
+            <a:endCxn id="34" idx="1"/>
+          </p:cNvCxnSpPr>
+          <p:nvPr/>
+        </p:nvCxnSpPr>
+        <p:spPr>
+          <a:xfrm flipV="1">
+            <a:off x="6289042" y="3957200"/>
+            <a:ext cx="406398" cy="1"/>
+          </a:xfrm>
+          <a:prstGeom prst="line">
+            <a:avLst/>
+          </a:prstGeom>
+          <a:ln>
+            <a:headEnd w="lg" len="lg"/>
+            <a:tailEnd type="triangle" w="lg" len="lg"/>
+          </a:ln>
+        </p:spPr>
+        <p:style>
+          <a:lnRef idx="1">
+            <a:schemeClr val="accent1"/>
+          </a:lnRef>
+          <a:fillRef idx="0">
+            <a:schemeClr val="accent1"/>
+          </a:fillRef>
+          <a:effectRef idx="0">
+            <a:schemeClr val="accent1"/>
+          </a:effectRef>
+          <a:fontRef idx="minor">
+            <a:schemeClr val="tx1"/>
+          </a:fontRef>
+        </p:style>
+      </p:cxnSp>
+    </p:spTree>
+    <p:extLst>
+      <p:ext uri="{BB962C8B-B14F-4D97-AF65-F5344CB8AC3E}">
+        <p14:creationId xmlns:p14="http://schemas.microsoft.com/office/powerpoint/2010/main" val="1214660825"/>
+      </p:ext>
+    </p:extLst>
+  </p:cSld>
+  <p:clrMapOvr>
+    <a:masterClrMapping/>
+  </p:clrMapOvr>
+</p:sld>
+</file>
+
+<file path=ppt/slides/slide17.xml><?xml version="1.0" encoding="utf-8"?>
+<p:sld xmlns:a="http://schemas.openxmlformats.org/drawingml/2006/main" xmlns:r="http://schemas.openxmlformats.org/officeDocument/2006/relationships" xmlns:p="http://schemas.openxmlformats.org/presentationml/2006/main">
+  <p:cSld>
+    <p:spTree>
+      <p:nvGrpSpPr>
+        <p:cNvPr id="1" name=""/>
+        <p:cNvGrpSpPr/>
+        <p:nvPr/>
+      </p:nvGrpSpPr>
+      <p:grpSpPr>
+        <a:xfrm>
+          <a:off x="0" y="0"/>
+          <a:ext cx="0" cy="0"/>
+          <a:chOff x="0" y="0"/>
+          <a:chExt cx="0" cy="0"/>
+        </a:xfrm>
+      </p:grpSpPr>
+      <p:sp>
+        <p:nvSpPr>
+          <p:cNvPr id="2" name="Titel 1">
+            <a:extLst>
+              <a:ext uri="{FF2B5EF4-FFF2-40B4-BE49-F238E27FC236}">
+                <a16:creationId xmlns:a16="http://schemas.microsoft.com/office/drawing/2014/main" id="{05F9BAA4-7E2C-49B0-A8A8-D436EB0C28B8}"/>
+              </a:ext>
+            </a:extLst>
+          </p:cNvPr>
+          <p:cNvSpPr>
+            <a:spLocks noGrp="1"/>
+          </p:cNvSpPr>
+          <p:nvPr>
+            <p:ph type="title"/>
+          </p:nvPr>
+        </p:nvSpPr>
+        <p:spPr>
+          <a:xfrm>
+            <a:off x="0" y="18255"/>
+            <a:ext cx="9144000" cy="1056401"/>
+          </a:xfrm>
+        </p:spPr>
+        <p:txBody>
+          <a:bodyPr>
+            <a:normAutofit/>
+          </a:bodyPr>
+          <a:lstStyle/>
+          <a:p>
+            <a:pPr algn="ctr"/>
+            <a:r>
+              <a:rPr lang="de-DE" sz="5400"/>
+              <a:t>Kalman-Filter</a:t>
+            </a:r>
+          </a:p>
+        </p:txBody>
+      </p:sp>
+      <p:cxnSp>
+        <p:nvCxnSpPr>
+          <p:cNvPr id="5" name="Gerader Verbinder 4">
+            <a:extLst>
+              <a:ext uri="{FF2B5EF4-FFF2-40B4-BE49-F238E27FC236}">
+                <a16:creationId xmlns:a16="http://schemas.microsoft.com/office/drawing/2014/main" id="{1892A047-1063-4568-A9A5-DA40684BA449}"/>
+              </a:ext>
+            </a:extLst>
+          </p:cNvPr>
+          <p:cNvCxnSpPr/>
+          <p:nvPr/>
+        </p:nvCxnSpPr>
+        <p:spPr>
+          <a:xfrm>
+            <a:off x="0" y="1065231"/>
+            <a:ext cx="9144000" cy="0"/>
+          </a:xfrm>
+          <a:prstGeom prst="line">
+            <a:avLst/>
+          </a:prstGeom>
+        </p:spPr>
+        <p:style>
+          <a:lnRef idx="1">
+            <a:schemeClr val="accent1"/>
+          </a:lnRef>
+          <a:fillRef idx="0">
+            <a:schemeClr val="accent1"/>
+          </a:fillRef>
+          <a:effectRef idx="0">
+            <a:schemeClr val="accent1"/>
+          </a:effectRef>
+          <a:fontRef idx="minor">
+            <a:schemeClr val="tx1"/>
+          </a:fontRef>
+        </p:style>
+      </p:cxnSp>
+      <p:sp>
+        <p:nvSpPr>
+          <p:cNvPr id="6" name="Foliennummernplatzhalter 5">
+            <a:extLst>
+              <a:ext uri="{FF2B5EF4-FFF2-40B4-BE49-F238E27FC236}">
+                <a16:creationId xmlns:a16="http://schemas.microsoft.com/office/drawing/2014/main" id="{5140CF2F-6F7F-44F0-8F3E-6C2234A57167}"/>
+              </a:ext>
+            </a:extLst>
+          </p:cNvPr>
+          <p:cNvSpPr>
+            <a:spLocks noGrp="1"/>
+          </p:cNvSpPr>
+          <p:nvPr>
+            <p:ph type="sldNum" sz="quarter" idx="12"/>
+          </p:nvPr>
+        </p:nvSpPr>
+        <p:spPr/>
+        <p:txBody>
+          <a:bodyPr/>
+          <a:lstStyle/>
+          <a:p>
+            <a:fld id="{0696A970-E1A0-4FA3-8434-947DF6AD858B}" type="slidenum">
+              <a:rPr lang="de-DE" smtClean="0"/>
+              <a:t>17</a:t>
+            </a:fld>
+            <a:endParaRPr lang="de-DE"/>
+          </a:p>
+        </p:txBody>
+      </p:sp>
+      <mc:AlternateContent xmlns:mc="http://schemas.openxmlformats.org/markup-compatibility/2006" xmlns:a14="http://schemas.microsoft.com/office/drawing/2010/main">
+        <mc:Choice Requires="a14">
           <p:sp>
             <p:nvSpPr>
               <p:cNvPr id="4" name="Rechteck: abgerundete Ecken 3">
@@ -13233,7 +13944,7 @@
             </p:txBody>
           </p:sp>
         </mc:Choice>
-        <mc:Fallback>
+        <mc:Fallback xmlns="">
           <p:sp>
             <p:nvSpPr>
               <p:cNvPr id="4" name="Rechteck: abgerundete Ecken 3">
@@ -13281,8 +13992,8 @@
           </p:sp>
         </mc:Fallback>
       </mc:AlternateContent>
-      <mc:AlternateContent xmlns:mc="http://schemas.openxmlformats.org/markup-compatibility/2006">
-        <mc:Choice xmlns:a14="http://schemas.microsoft.com/office/drawing/2010/main" Requires="a14">
+      <mc:AlternateContent xmlns:mc="http://schemas.openxmlformats.org/markup-compatibility/2006" xmlns:a14="http://schemas.microsoft.com/office/drawing/2010/main">
+        <mc:Choice Requires="a14">
           <p:sp>
             <p:nvSpPr>
               <p:cNvPr id="7" name="Rechteck: abgerundete Ecken 6">
@@ -13405,7 +14116,7 @@
             </p:txBody>
           </p:sp>
         </mc:Choice>
-        <mc:Fallback>
+        <mc:Fallback xmlns="">
           <p:sp>
             <p:nvSpPr>
               <p:cNvPr id="7" name="Rechteck: abgerundete Ecken 6">
@@ -13453,8 +14164,8 @@
           </p:sp>
         </mc:Fallback>
       </mc:AlternateContent>
-      <mc:AlternateContent xmlns:mc="http://schemas.openxmlformats.org/markup-compatibility/2006">
-        <mc:Choice xmlns:a14="http://schemas.microsoft.com/office/drawing/2010/main" Requires="a14">
+      <mc:AlternateContent xmlns:mc="http://schemas.openxmlformats.org/markup-compatibility/2006" xmlns:a14="http://schemas.microsoft.com/office/drawing/2010/main">
+        <mc:Choice Requires="a14">
           <p:sp>
             <p:nvSpPr>
               <p:cNvPr id="8" name="Rechteck: abgerundete Ecken 7">
@@ -13622,7 +14333,7 @@
             </p:txBody>
           </p:sp>
         </mc:Choice>
-        <mc:Fallback>
+        <mc:Fallback xmlns="">
           <p:sp>
             <p:nvSpPr>
               <p:cNvPr id="8" name="Rechteck: abgerundete Ecken 7">
@@ -13713,8 +14424,8 @@
           </a:fontRef>
         </p:style>
       </p:cxnSp>
-      <mc:AlternateContent xmlns:mc="http://schemas.openxmlformats.org/markup-compatibility/2006">
-        <mc:Choice xmlns:a14="http://schemas.microsoft.com/office/drawing/2010/main" Requires="a14">
+      <mc:AlternateContent xmlns:mc="http://schemas.openxmlformats.org/markup-compatibility/2006" xmlns:a14="http://schemas.microsoft.com/office/drawing/2010/main">
+        <mc:Choice Requires="a14">
           <p:sp>
             <p:nvSpPr>
               <p:cNvPr id="27" name="Raute 26">
@@ -13809,7 +14520,7 @@
             </p:txBody>
           </p:sp>
         </mc:Choice>
-        <mc:Fallback>
+        <mc:Fallback xmlns="">
           <p:sp>
             <p:nvSpPr>
               <p:cNvPr id="27" name="Raute 26">
@@ -13946,8 +14657,8 @@
           </a:fontRef>
         </p:style>
       </p:cxnSp>
-      <mc:AlternateContent xmlns:mc="http://schemas.openxmlformats.org/markup-compatibility/2006">
-        <mc:Choice xmlns:a14="http://schemas.microsoft.com/office/drawing/2010/main" Requires="a14">
+      <mc:AlternateContent xmlns:mc="http://schemas.openxmlformats.org/markup-compatibility/2006" xmlns:a14="http://schemas.microsoft.com/office/drawing/2010/main">
+        <mc:Choice Requires="a14">
           <p:sp>
             <p:nvSpPr>
               <p:cNvPr id="34" name="Rechteck: abgerundete Ecken 33">
@@ -14082,7 +14793,7 @@
             </p:txBody>
           </p:sp>
         </mc:Choice>
-        <mc:Fallback>
+        <mc:Fallback xmlns="">
           <p:sp>
             <p:nvSpPr>
               <p:cNvPr id="34" name="Rechteck: abgerundete Ecken 33">
@@ -14173,8 +14884,8 @@
           </a:fontRef>
         </p:style>
       </p:cxnSp>
-      <mc:AlternateContent xmlns:mc="http://schemas.openxmlformats.org/markup-compatibility/2006">
-        <mc:Choice xmlns:a14="http://schemas.microsoft.com/office/drawing/2010/main" Requires="a14">
+      <mc:AlternateContent xmlns:mc="http://schemas.openxmlformats.org/markup-compatibility/2006" xmlns:a14="http://schemas.microsoft.com/office/drawing/2010/main">
+        <mc:Choice Requires="a14">
           <p:sp>
             <p:nvSpPr>
               <p:cNvPr id="14" name="Rechteck: abgerundete Ecken 13">
@@ -14269,7 +14980,7 @@
             </p:txBody>
           </p:sp>
         </mc:Choice>
-        <mc:Fallback>
+        <mc:Fallback xmlns="">
           <p:sp>
             <p:nvSpPr>
               <p:cNvPr id="14" name="Rechteck: abgerundete Ecken 13">
@@ -14363,8 +15074,8 @@
           </a:fontRef>
         </p:style>
       </p:cxnSp>
-      <mc:AlternateContent xmlns:mc="http://schemas.openxmlformats.org/markup-compatibility/2006">
-        <mc:Choice xmlns:a14="http://schemas.microsoft.com/office/drawing/2010/main" Requires="a14">
+      <mc:AlternateContent xmlns:mc="http://schemas.openxmlformats.org/markup-compatibility/2006" xmlns:a14="http://schemas.microsoft.com/office/drawing/2010/main">
+        <mc:Choice Requires="a14">
           <p:sp>
             <p:nvSpPr>
               <p:cNvPr id="10" name="Textfeld 9">
@@ -14393,6 +15104,7 @@
               </a:bodyPr>
               <a:lstStyle/>
               <a:p>
+                <a:pPr/>
                 <a14:m>
                   <m:oMathPara xmlns:m="http://schemas.openxmlformats.org/officeDocument/2006/math">
                     <m:oMathParaPr>
@@ -14441,7 +15153,7 @@
             </p:txBody>
           </p:sp>
         </mc:Choice>
-        <mc:Fallback>
+        <mc:Fallback xmlns="">
           <p:sp>
             <p:nvSpPr>
               <p:cNvPr id="10" name="Textfeld 9">
@@ -14486,8 +15198,8 @@
           </p:sp>
         </mc:Fallback>
       </mc:AlternateContent>
-      <mc:AlternateContent xmlns:mc="http://schemas.openxmlformats.org/markup-compatibility/2006">
-        <mc:Choice xmlns:a14="http://schemas.microsoft.com/office/drawing/2010/main" Requires="a14">
+      <mc:AlternateContent xmlns:mc="http://schemas.openxmlformats.org/markup-compatibility/2006" xmlns:a14="http://schemas.microsoft.com/office/drawing/2010/main">
+        <mc:Choice Requires="a14">
           <p:sp>
             <p:nvSpPr>
               <p:cNvPr id="18" name="Textfeld 17">
@@ -14516,6 +15228,7 @@
               </a:bodyPr>
               <a:lstStyle/>
               <a:p>
+                <a:pPr/>
                 <a14:m>
                   <m:oMathPara xmlns:m="http://schemas.openxmlformats.org/officeDocument/2006/math">
                     <m:oMathParaPr>
@@ -14568,7 +15281,7 @@
             </p:txBody>
           </p:sp>
         </mc:Choice>
-        <mc:Fallback>
+        <mc:Fallback xmlns="">
           <p:sp>
             <p:nvSpPr>
               <p:cNvPr id="18" name="Textfeld 17">
@@ -14613,8 +15326,8 @@
           </p:sp>
         </mc:Fallback>
       </mc:AlternateContent>
-      <mc:AlternateContent xmlns:mc="http://schemas.openxmlformats.org/markup-compatibility/2006">
-        <mc:Choice xmlns:a14="http://schemas.microsoft.com/office/drawing/2010/main" Requires="a14">
+      <mc:AlternateContent xmlns:mc="http://schemas.openxmlformats.org/markup-compatibility/2006" xmlns:a14="http://schemas.microsoft.com/office/drawing/2010/main">
+        <mc:Choice Requires="a14">
           <p:sp>
             <p:nvSpPr>
               <p:cNvPr id="20" name="Textfeld 19">
@@ -14643,6 +15356,7 @@
               </a:bodyPr>
               <a:lstStyle/>
               <a:p>
+                <a:pPr/>
                 <a14:m>
                   <m:oMathPara xmlns:m="http://schemas.openxmlformats.org/officeDocument/2006/math">
                     <m:oMathParaPr>
@@ -14695,7 +15409,7 @@
             </p:txBody>
           </p:sp>
         </mc:Choice>
-        <mc:Fallback>
+        <mc:Fallback xmlns="">
           <p:sp>
             <p:nvSpPr>
               <p:cNvPr id="20" name="Textfeld 19">
@@ -14740,8 +15454,8 @@
           </p:sp>
         </mc:Fallback>
       </mc:AlternateContent>
-      <mc:AlternateContent xmlns:mc="http://schemas.openxmlformats.org/markup-compatibility/2006">
-        <mc:Choice xmlns:a14="http://schemas.microsoft.com/office/drawing/2010/main" Requires="a14">
+      <mc:AlternateContent xmlns:mc="http://schemas.openxmlformats.org/markup-compatibility/2006" xmlns:a14="http://schemas.microsoft.com/office/drawing/2010/main">
+        <mc:Choice Requires="a14">
           <p:sp>
             <p:nvSpPr>
               <p:cNvPr id="11" name="Textfeld 10">
@@ -14770,6 +15484,7 @@
               </a:bodyPr>
               <a:lstStyle/>
               <a:p>
+                <a:pPr/>
                 <a14:m>
                   <m:oMathPara xmlns:m="http://schemas.openxmlformats.org/officeDocument/2006/math">
                     <m:oMathParaPr>
@@ -14815,7 +15530,7 @@
             </p:txBody>
           </p:sp>
         </mc:Choice>
-        <mc:Fallback>
+        <mc:Fallback xmlns="">
           <p:sp>
             <p:nvSpPr>
               <p:cNvPr id="11" name="Textfeld 10">
@@ -16327,8 +17042,8 @@
           </p:sp>
         </mc:Fallback>
       </mc:AlternateContent>
-      <mc:AlternateContent xmlns:mc="http://schemas.openxmlformats.org/markup-compatibility/2006">
-        <mc:Choice xmlns:a14="http://schemas.microsoft.com/office/drawing/2010/main" Requires="a14">
+      <mc:AlternateContent xmlns:mc="http://schemas.openxmlformats.org/markup-compatibility/2006" xmlns:a14="http://schemas.microsoft.com/office/drawing/2010/main">
+        <mc:Choice Requires="a14">
           <p:sp>
             <p:nvSpPr>
               <p:cNvPr id="8" name="Rechteck: abgerundete Ecken 7">
@@ -16484,7 +17199,7 @@
             </p:txBody>
           </p:sp>
         </mc:Choice>
-        <mc:Fallback>
+        <mc:Fallback xmlns="">
           <p:sp>
             <p:nvSpPr>
               <p:cNvPr id="8" name="Rechteck: abgerundete Ecken 7">
@@ -16575,8 +17290,8 @@
           </a:fontRef>
         </p:style>
       </p:cxnSp>
-      <mc:AlternateContent xmlns:mc="http://schemas.openxmlformats.org/markup-compatibility/2006">
-        <mc:Choice xmlns:a14="http://schemas.microsoft.com/office/drawing/2010/main" Requires="a14">
+      <mc:AlternateContent xmlns:mc="http://schemas.openxmlformats.org/markup-compatibility/2006" xmlns:a14="http://schemas.microsoft.com/office/drawing/2010/main">
+        <mc:Choice Requires="a14">
           <p:sp>
             <p:nvSpPr>
               <p:cNvPr id="27" name="Raute 26">
@@ -16661,7 +17376,7 @@
             </p:txBody>
           </p:sp>
         </mc:Choice>
-        <mc:Fallback>
+        <mc:Fallback xmlns="">
           <p:sp>
             <p:nvSpPr>
               <p:cNvPr id="27" name="Raute 26">
@@ -16798,8 +17513,8 @@
           </a:fontRef>
         </p:style>
       </p:cxnSp>
-      <mc:AlternateContent xmlns:mc="http://schemas.openxmlformats.org/markup-compatibility/2006">
-        <mc:Choice xmlns:a14="http://schemas.microsoft.com/office/drawing/2010/main" Requires="a14">
+      <mc:AlternateContent xmlns:mc="http://schemas.openxmlformats.org/markup-compatibility/2006" xmlns:a14="http://schemas.microsoft.com/office/drawing/2010/main">
+        <mc:Choice Requires="a14">
           <p:sp>
             <p:nvSpPr>
               <p:cNvPr id="34" name="Rechteck: abgerundete Ecken 33">
@@ -16922,7 +17637,7 @@
             </p:txBody>
           </p:sp>
         </mc:Choice>
-        <mc:Fallback>
+        <mc:Fallback xmlns="">
           <p:sp>
             <p:nvSpPr>
               <p:cNvPr id="34" name="Rechteck: abgerundete Ecken 33">
@@ -17079,8 +17794,8 @@
           </a:p>
         </p:txBody>
       </p:sp>
-      <mc:AlternateContent xmlns:mc="http://schemas.openxmlformats.org/markup-compatibility/2006">
-        <mc:Choice xmlns:a14="http://schemas.microsoft.com/office/drawing/2010/main" Requires="a14">
+      <mc:AlternateContent xmlns:mc="http://schemas.openxmlformats.org/markup-compatibility/2006" xmlns:a14="http://schemas.microsoft.com/office/drawing/2010/main">
+        <mc:Choice Requires="a14">
           <p:sp>
             <p:nvSpPr>
               <p:cNvPr id="3" name="Inhaltsplatzhalter 2">
@@ -18202,7 +18917,7 @@
             </p:txBody>
           </p:sp>
         </mc:Choice>
-        <mc:Fallback>
+        <mc:Fallback xmlns="">
           <p:sp>
             <p:nvSpPr>
               <p:cNvPr id="3" name="Inhaltsplatzhalter 2">
@@ -18341,8 +19056,8 @@
           <a:chExt cx="0" cy="0"/>
         </a:xfrm>
       </p:grpSpPr>
-      <mc:AlternateContent xmlns:mc="http://schemas.openxmlformats.org/markup-compatibility/2006">
-        <mc:Choice xmlns:a14="http://schemas.microsoft.com/office/drawing/2010/main" Requires="a14">
+      <mc:AlternateContent xmlns:mc="http://schemas.openxmlformats.org/markup-compatibility/2006" xmlns:a14="http://schemas.microsoft.com/office/drawing/2010/main">
+        <mc:Choice Requires="a14">
           <p:sp>
             <p:nvSpPr>
               <p:cNvPr id="2" name="Titel 1">
@@ -18405,7 +19120,7 @@
             </p:txBody>
           </p:sp>
         </mc:Choice>
-        <mc:Fallback>
+        <mc:Fallback xmlns="">
           <p:sp>
             <p:nvSpPr>
               <p:cNvPr id="2" name="Titel 1">
@@ -18449,8 +19164,8 @@
           </p:sp>
         </mc:Fallback>
       </mc:AlternateContent>
-      <mc:AlternateContent xmlns:mc="http://schemas.openxmlformats.org/markup-compatibility/2006">
-        <mc:Choice xmlns:a14="http://schemas.microsoft.com/office/drawing/2010/main" Requires="a14">
+      <mc:AlternateContent xmlns:mc="http://schemas.openxmlformats.org/markup-compatibility/2006" xmlns:a14="http://schemas.microsoft.com/office/drawing/2010/main">
+        <mc:Choice Requires="a14">
           <p:sp>
             <p:nvSpPr>
               <p:cNvPr id="3" name="Inhaltsplatzhalter 2">
@@ -18561,7 +19276,7 @@
             </p:txBody>
           </p:sp>
         </mc:Choice>
-        <mc:Fallback>
+        <mc:Fallback xmlns="">
           <p:sp>
             <p:nvSpPr>
               <p:cNvPr id="3" name="Inhaltsplatzhalter 2">
@@ -18722,6 +19437,1515 @@
           </a:prstGeom>
           <a:gradFill>
             <a:gsLst>
+              <a:gs pos="30000">
+                <a:schemeClr val="accent3">
+                  <a:lumMod val="40000"/>
+                  <a:lumOff val="60000"/>
+                </a:schemeClr>
+              </a:gs>
+              <a:gs pos="40000">
+                <a:schemeClr val="bg1"/>
+              </a:gs>
+            </a:gsLst>
+            <a:lin ang="0" scaled="0"/>
+          </a:gradFill>
+          <a:ln>
+            <a:noFill/>
+          </a:ln>
+        </p:spPr>
+        <p:style>
+          <a:lnRef idx="2">
+            <a:schemeClr val="accent1">
+              <a:shade val="50000"/>
+            </a:schemeClr>
+          </a:lnRef>
+          <a:fillRef idx="1">
+            <a:schemeClr val="accent1"/>
+          </a:fillRef>
+          <a:effectRef idx="0">
+            <a:schemeClr val="accent1"/>
+          </a:effectRef>
+          <a:fontRef idx="minor">
+            <a:schemeClr val="lt1"/>
+          </a:fontRef>
+        </p:style>
+        <p:txBody>
+          <a:bodyPr rtlCol="0" anchor="ctr"/>
+          <a:lstStyle/>
+          <a:p>
+            <a:pPr algn="ctr"/>
+            <a:endParaRPr lang="de-DE"/>
+          </a:p>
+        </p:txBody>
+      </p:sp>
+      <p:sp>
+        <p:nvSpPr>
+          <p:cNvPr id="2" name="Titel 1">
+            <a:extLst>
+              <a:ext uri="{FF2B5EF4-FFF2-40B4-BE49-F238E27FC236}">
+                <a16:creationId xmlns:a16="http://schemas.microsoft.com/office/drawing/2014/main" id="{05F9BAA4-7E2C-49B0-A8A8-D436EB0C28B8}"/>
+              </a:ext>
+            </a:extLst>
+          </p:cNvPr>
+          <p:cNvSpPr>
+            <a:spLocks noGrp="1"/>
+          </p:cNvSpPr>
+          <p:nvPr>
+            <p:ph type="title"/>
+          </p:nvPr>
+        </p:nvSpPr>
+        <p:spPr>
+          <a:xfrm>
+            <a:off x="0" y="18255"/>
+            <a:ext cx="9144000" cy="1056401"/>
+          </a:xfrm>
+        </p:spPr>
+        <p:txBody>
+          <a:bodyPr>
+            <a:normAutofit/>
+          </a:bodyPr>
+          <a:lstStyle/>
+          <a:p>
+            <a:pPr algn="ctr"/>
+            <a:r>
+              <a:rPr lang="de-DE" sz="5400"/>
+              <a:t>Hidden Markov Model</a:t>
+            </a:r>
+          </a:p>
+        </p:txBody>
+      </p:sp>
+      <p:cxnSp>
+        <p:nvCxnSpPr>
+          <p:cNvPr id="5" name="Gerader Verbinder 4">
+            <a:extLst>
+              <a:ext uri="{FF2B5EF4-FFF2-40B4-BE49-F238E27FC236}">
+                <a16:creationId xmlns:a16="http://schemas.microsoft.com/office/drawing/2014/main" id="{1892A047-1063-4568-A9A5-DA40684BA449}"/>
+              </a:ext>
+            </a:extLst>
+          </p:cNvPr>
+          <p:cNvCxnSpPr/>
+          <p:nvPr/>
+        </p:nvCxnSpPr>
+        <p:spPr>
+          <a:xfrm>
+            <a:off x="0" y="1065231"/>
+            <a:ext cx="9144000" cy="0"/>
+          </a:xfrm>
+          <a:prstGeom prst="line">
+            <a:avLst/>
+          </a:prstGeom>
+        </p:spPr>
+        <p:style>
+          <a:lnRef idx="1">
+            <a:schemeClr val="accent1"/>
+          </a:lnRef>
+          <a:fillRef idx="0">
+            <a:schemeClr val="accent1"/>
+          </a:fillRef>
+          <a:effectRef idx="0">
+            <a:schemeClr val="accent1"/>
+          </a:effectRef>
+          <a:fontRef idx="minor">
+            <a:schemeClr val="tx1"/>
+          </a:fontRef>
+        </p:style>
+      </p:cxnSp>
+      <p:sp>
+        <p:nvSpPr>
+          <p:cNvPr id="6" name="Foliennummernplatzhalter 5">
+            <a:extLst>
+              <a:ext uri="{FF2B5EF4-FFF2-40B4-BE49-F238E27FC236}">
+                <a16:creationId xmlns:a16="http://schemas.microsoft.com/office/drawing/2014/main" id="{5140CF2F-6F7F-44F0-8F3E-6C2234A57167}"/>
+              </a:ext>
+            </a:extLst>
+          </p:cNvPr>
+          <p:cNvSpPr>
+            <a:spLocks noGrp="1"/>
+          </p:cNvSpPr>
+          <p:nvPr>
+            <p:ph type="sldNum" sz="quarter" idx="12"/>
+          </p:nvPr>
+        </p:nvSpPr>
+        <p:spPr/>
+        <p:txBody>
+          <a:bodyPr/>
+          <a:lstStyle/>
+          <a:p>
+            <a:fld id="{0696A970-E1A0-4FA3-8434-947DF6AD858B}" type="slidenum">
+              <a:rPr lang="de-DE" smtClean="0"/>
+              <a:t>8</a:t>
+            </a:fld>
+            <a:endParaRPr lang="de-DE"/>
+          </a:p>
+        </p:txBody>
+      </p:sp>
+      <mc:AlternateContent xmlns:mc="http://schemas.openxmlformats.org/markup-compatibility/2006" xmlns:a14="http://schemas.microsoft.com/office/drawing/2010/main">
+        <mc:Choice Requires="a14">
+          <p:sp>
+            <p:nvSpPr>
+              <p:cNvPr id="7" name="Rechteck: abgerundete Ecken 6">
+                <a:extLst>
+                  <a:ext uri="{FF2B5EF4-FFF2-40B4-BE49-F238E27FC236}">
+                    <a16:creationId xmlns:a16="http://schemas.microsoft.com/office/drawing/2014/main" id="{FA442E37-F9B9-4845-ACFD-34AED2889B5A}"/>
+                  </a:ext>
+                </a:extLst>
+              </p:cNvPr>
+              <p:cNvSpPr/>
+              <p:nvPr/>
+            </p:nvSpPr>
+            <p:spPr>
+              <a:xfrm>
+                <a:off x="3927524" y="3944137"/>
+                <a:ext cx="1819910" cy="918686"/>
+              </a:xfrm>
+              <a:prstGeom prst="roundRect">
+                <a:avLst/>
+              </a:prstGeom>
+              <a:solidFill>
+                <a:schemeClr val="accent2"/>
+              </a:solidFill>
+              <a:ln>
+                <a:noFill/>
+              </a:ln>
+            </p:spPr>
+            <p:style>
+              <a:lnRef idx="2">
+                <a:schemeClr val="accent1">
+                  <a:shade val="50000"/>
+                </a:schemeClr>
+              </a:lnRef>
+              <a:fillRef idx="1">
+                <a:schemeClr val="accent1"/>
+              </a:fillRef>
+              <a:effectRef idx="0">
+                <a:schemeClr val="accent1"/>
+              </a:effectRef>
+              <a:fontRef idx="minor">
+                <a:schemeClr val="lt1"/>
+              </a:fontRef>
+            </p:style>
+            <p:txBody>
+              <a:bodyPr rtlCol="0" anchor="ctr"/>
+              <a:lstStyle/>
+              <a:p>
+                <a:pPr algn="ctr"/>
+                <a:r>
+                  <a:rPr lang="de-DE"/>
+                  <a:t>sensor readings</a:t>
+                </a:r>
+              </a:p>
+              <a:p>
+                <a:pPr algn="ctr"/>
+                <a14:m>
+                  <m:oMathPara xmlns:m="http://schemas.openxmlformats.org/officeDocument/2006/math">
+                    <m:oMathParaPr>
+                      <m:jc m:val="centerGroup"/>
+                    </m:oMathParaPr>
+                    <m:oMath xmlns:m="http://schemas.openxmlformats.org/officeDocument/2006/math">
+                      <m:sSub>
+                        <m:sSubPr>
+                          <m:ctrlPr>
+                            <a:rPr lang="de-DE" b="0" i="1" smtClean="0">
+                              <a:latin typeface="Cambria Math" panose="02040503050406030204" pitchFamily="18" charset="0"/>
+                            </a:rPr>
+                          </m:ctrlPr>
+                        </m:sSubPr>
+                        <m:e>
+                          <m:r>
+                            <a:rPr lang="de-DE" b="0" i="1" smtClean="0">
+                              <a:latin typeface="Cambria Math" panose="02040503050406030204" pitchFamily="18" charset="0"/>
+                            </a:rPr>
+                            <m:t>𝑧</m:t>
+                          </m:r>
+                        </m:e>
+                        <m:sub>
+                          <m:r>
+                            <a:rPr lang="de-DE" b="0" i="1" smtClean="0">
+                              <a:latin typeface="Cambria Math" panose="02040503050406030204" pitchFamily="18" charset="0"/>
+                            </a:rPr>
+                            <m:t>𝑘</m:t>
+                          </m:r>
+                        </m:sub>
+                      </m:sSub>
+                    </m:oMath>
+                  </m:oMathPara>
+                </a14:m>
+                <a:endParaRPr lang="de-DE"/>
+              </a:p>
+            </p:txBody>
+          </p:sp>
+        </mc:Choice>
+        <mc:Fallback xmlns="">
+          <p:sp>
+            <p:nvSpPr>
+              <p:cNvPr id="7" name="Rechteck: abgerundete Ecken 6">
+                <a:extLst>
+                  <a:ext uri="{FF2B5EF4-FFF2-40B4-BE49-F238E27FC236}">
+                    <a16:creationId xmlns:a16="http://schemas.microsoft.com/office/drawing/2014/main" id="{FA442E37-F9B9-4845-ACFD-34AED2889B5A}"/>
+                  </a:ext>
+                </a:extLst>
+              </p:cNvPr>
+              <p:cNvSpPr>
+                <a:spLocks noRot="1" noChangeAspect="1" noMove="1" noResize="1" noEditPoints="1" noAdjustHandles="1" noChangeArrowheads="1" noChangeShapeType="1" noTextEdit="1"/>
+              </p:cNvSpPr>
+              <p:nvPr/>
+            </p:nvSpPr>
+            <p:spPr>
+              <a:xfrm>
+                <a:off x="3927524" y="3944137"/>
+                <a:ext cx="1819910" cy="918686"/>
+              </a:xfrm>
+              <a:prstGeom prst="roundRect">
+                <a:avLst/>
+              </a:prstGeom>
+              <a:blipFill>
+                <a:blip r:embed="rId3"/>
+                <a:stretch>
+                  <a:fillRect/>
+                </a:stretch>
+              </a:blipFill>
+              <a:ln>
+                <a:noFill/>
+              </a:ln>
+            </p:spPr>
+            <p:txBody>
+              <a:bodyPr/>
+              <a:lstStyle/>
+              <a:p>
+                <a:r>
+                  <a:rPr lang="de-DE">
+                    <a:noFill/>
+                  </a:rPr>
+                  <a:t> </a:t>
+                </a:r>
+              </a:p>
+            </p:txBody>
+          </p:sp>
+        </mc:Fallback>
+      </mc:AlternateContent>
+      <mc:AlternateContent xmlns:mc="http://schemas.openxmlformats.org/markup-compatibility/2006">
+        <mc:Choice xmlns:a14="http://schemas.microsoft.com/office/drawing/2010/main" Requires="a14">
+          <p:sp>
+            <p:nvSpPr>
+              <p:cNvPr id="14" name="Rechteck: abgerundete Ecken 13">
+                <a:extLst>
+                  <a:ext uri="{FF2B5EF4-FFF2-40B4-BE49-F238E27FC236}">
+                    <a16:creationId xmlns:a16="http://schemas.microsoft.com/office/drawing/2014/main" id="{772D21F0-83B4-4904-B016-9ED91A301354}"/>
+                  </a:ext>
+                </a:extLst>
+              </p:cNvPr>
+              <p:cNvSpPr/>
+              <p:nvPr/>
+            </p:nvSpPr>
+            <p:spPr>
+              <a:xfrm>
+                <a:off x="1343628" y="2299519"/>
+                <a:ext cx="1071194" cy="704868"/>
+              </a:xfrm>
+              <a:prstGeom prst="roundRect">
+                <a:avLst/>
+              </a:prstGeom>
+              <a:solidFill>
+                <a:schemeClr val="accent3">
+                  <a:lumMod val="75000"/>
+                </a:schemeClr>
+              </a:solidFill>
+              <a:ln>
+                <a:noFill/>
+              </a:ln>
+            </p:spPr>
+            <p:style>
+              <a:lnRef idx="2">
+                <a:schemeClr val="accent1">
+                  <a:shade val="50000"/>
+                </a:schemeClr>
+              </a:lnRef>
+              <a:fillRef idx="1">
+                <a:schemeClr val="accent1"/>
+              </a:fillRef>
+              <a:effectRef idx="0">
+                <a:schemeClr val="accent1"/>
+              </a:effectRef>
+              <a:fontRef idx="minor">
+                <a:schemeClr val="lt1"/>
+              </a:fontRef>
+            </p:style>
+            <p:txBody>
+              <a:bodyPr rtlCol="0" anchor="ctr"/>
+              <a:lstStyle/>
+              <a:p>
+                <a:pPr algn="ctr"/>
+                <a:r>
+                  <a:rPr lang="de-DE"/>
+                  <a:t>state </a:t>
+                </a:r>
+                <a14:m>
+                  <m:oMath xmlns:m="http://schemas.openxmlformats.org/officeDocument/2006/math">
+                    <m:r>
+                      <a:rPr lang="de-DE" b="0" i="1" smtClean="0">
+                        <a:latin typeface="Cambria Math" panose="02040503050406030204" pitchFamily="18" charset="0"/>
+                      </a:rPr>
+                      <m:t>𝑘</m:t>
+                    </m:r>
+                    <m:r>
+                      <a:rPr lang="de-DE" b="0" i="1" smtClean="0">
+                        <a:latin typeface="Cambria Math" panose="02040503050406030204" pitchFamily="18" charset="0"/>
+                      </a:rPr>
+                      <m:t>−2</m:t>
+                    </m:r>
+                  </m:oMath>
+                </a14:m>
+                <a:endParaRPr lang="de-DE" b="0"/>
+              </a:p>
+            </p:txBody>
+          </p:sp>
+        </mc:Choice>
+        <mc:Fallback>
+          <p:sp>
+            <p:nvSpPr>
+              <p:cNvPr id="14" name="Rechteck: abgerundete Ecken 13">
+                <a:extLst>
+                  <a:ext uri="{FF2B5EF4-FFF2-40B4-BE49-F238E27FC236}">
+                    <a16:creationId xmlns:a16="http://schemas.microsoft.com/office/drawing/2014/main" id="{772D21F0-83B4-4904-B016-9ED91A301354}"/>
+                  </a:ext>
+                </a:extLst>
+              </p:cNvPr>
+              <p:cNvSpPr>
+                <a:spLocks noRot="1" noChangeAspect="1" noMove="1" noResize="1" noEditPoints="1" noAdjustHandles="1" noChangeArrowheads="1" noChangeShapeType="1" noTextEdit="1"/>
+              </p:cNvSpPr>
+              <p:nvPr/>
+            </p:nvSpPr>
+            <p:spPr>
+              <a:xfrm>
+                <a:off x="1343628" y="2299519"/>
+                <a:ext cx="1071194" cy="704868"/>
+              </a:xfrm>
+              <a:prstGeom prst="roundRect">
+                <a:avLst/>
+              </a:prstGeom>
+              <a:blipFill>
+                <a:blip r:embed="rId4"/>
+                <a:stretch>
+                  <a:fillRect/>
+                </a:stretch>
+              </a:blipFill>
+              <a:ln>
+                <a:noFill/>
+              </a:ln>
+            </p:spPr>
+            <p:txBody>
+              <a:bodyPr/>
+              <a:lstStyle/>
+              <a:p>
+                <a:r>
+                  <a:rPr lang="de-DE">
+                    <a:noFill/>
+                  </a:rPr>
+                  <a:t> </a:t>
+                </a:r>
+              </a:p>
+            </p:txBody>
+          </p:sp>
+        </mc:Fallback>
+      </mc:AlternateContent>
+      <p:sp>
+        <p:nvSpPr>
+          <p:cNvPr id="3" name="Rechteck 2">
+            <a:extLst>
+              <a:ext uri="{FF2B5EF4-FFF2-40B4-BE49-F238E27FC236}">
+                <a16:creationId xmlns:a16="http://schemas.microsoft.com/office/drawing/2014/main" id="{E80E2245-9499-4961-8176-1EDAD256DDED}"/>
+              </a:ext>
+            </a:extLst>
+          </p:cNvPr>
+          <p:cNvSpPr/>
+          <p:nvPr/>
+        </p:nvSpPr>
+        <p:spPr>
+          <a:xfrm>
+            <a:off x="1456724" y="3193975"/>
+            <a:ext cx="845002" cy="514902"/>
+          </a:xfrm>
+          <a:prstGeom prst="rect">
+            <a:avLst/>
+          </a:prstGeom>
+          <a:solidFill>
+            <a:schemeClr val="accent3">
+              <a:lumMod val="75000"/>
+            </a:schemeClr>
+          </a:solidFill>
+          <a:ln>
+            <a:noFill/>
+          </a:ln>
+        </p:spPr>
+        <p:style>
+          <a:lnRef idx="2">
+            <a:schemeClr val="accent1">
+              <a:shade val="50000"/>
+            </a:schemeClr>
+          </a:lnRef>
+          <a:fillRef idx="1">
+            <a:schemeClr val="accent1"/>
+          </a:fillRef>
+          <a:effectRef idx="0">
+            <a:schemeClr val="accent1"/>
+          </a:effectRef>
+          <a:fontRef idx="minor">
+            <a:schemeClr val="lt1"/>
+          </a:fontRef>
+        </p:style>
+        <p:txBody>
+          <a:bodyPr rtlCol="0" anchor="ctr"/>
+          <a:lstStyle/>
+          <a:p>
+            <a:pPr algn="ctr"/>
+            <a:endParaRPr lang="de-DE">
+              <a:solidFill>
+                <a:schemeClr val="bg1"/>
+              </a:solidFill>
+            </a:endParaRPr>
+          </a:p>
+        </p:txBody>
+      </p:sp>
+      <p:cxnSp>
+        <p:nvCxnSpPr>
+          <p:cNvPr id="10" name="Gerader Verbinder 9">
+            <a:extLst>
+              <a:ext uri="{FF2B5EF4-FFF2-40B4-BE49-F238E27FC236}">
+                <a16:creationId xmlns:a16="http://schemas.microsoft.com/office/drawing/2014/main" id="{510261C7-BC01-49E1-B049-800D7B088BD2}"/>
+              </a:ext>
+            </a:extLst>
+          </p:cNvPr>
+          <p:cNvCxnSpPr>
+            <a:cxnSpLocks/>
+            <a:stCxn id="14" idx="2"/>
+            <a:endCxn id="3" idx="0"/>
+          </p:cNvCxnSpPr>
+          <p:nvPr/>
+        </p:nvCxnSpPr>
+        <p:spPr>
+          <a:xfrm>
+            <a:off x="1879225" y="3004387"/>
+            <a:ext cx="0" cy="189588"/>
+          </a:xfrm>
+          <a:prstGeom prst="line">
+            <a:avLst/>
+          </a:prstGeom>
+          <a:ln>
+            <a:solidFill>
+              <a:schemeClr val="tx1"/>
+            </a:solidFill>
+            <a:headEnd w="lg" len="lg"/>
+            <a:tailEnd type="triangle" w="lg" len="lg"/>
+          </a:ln>
+        </p:spPr>
+        <p:style>
+          <a:lnRef idx="1">
+            <a:schemeClr val="accent1"/>
+          </a:lnRef>
+          <a:fillRef idx="0">
+            <a:schemeClr val="accent1"/>
+          </a:fillRef>
+          <a:effectRef idx="0">
+            <a:schemeClr val="accent1"/>
+          </a:effectRef>
+          <a:fontRef idx="minor">
+            <a:schemeClr val="tx1"/>
+          </a:fontRef>
+        </p:style>
+      </p:cxnSp>
+      <p:sp>
+        <p:nvSpPr>
+          <p:cNvPr id="26" name="Rechteck 25">
+            <a:extLst>
+              <a:ext uri="{FF2B5EF4-FFF2-40B4-BE49-F238E27FC236}">
+                <a16:creationId xmlns:a16="http://schemas.microsoft.com/office/drawing/2014/main" id="{E80F9302-E6BB-4FE8-95E9-9B0472110C39}"/>
+              </a:ext>
+            </a:extLst>
+          </p:cNvPr>
+          <p:cNvSpPr/>
+          <p:nvPr/>
+        </p:nvSpPr>
+        <p:spPr>
+          <a:xfrm>
+            <a:off x="3721801" y="5415187"/>
+            <a:ext cx="2231356" cy="918686"/>
+          </a:xfrm>
+          <a:prstGeom prst="rect">
+            <a:avLst/>
+          </a:prstGeom>
+          <a:solidFill>
+            <a:schemeClr val="accent3">
+              <a:lumMod val="75000"/>
+            </a:schemeClr>
+          </a:solidFill>
+          <a:ln>
+            <a:noFill/>
+          </a:ln>
+        </p:spPr>
+        <p:style>
+          <a:lnRef idx="2">
+            <a:schemeClr val="accent1">
+              <a:shade val="50000"/>
+            </a:schemeClr>
+          </a:lnRef>
+          <a:fillRef idx="1">
+            <a:schemeClr val="accent1"/>
+          </a:fillRef>
+          <a:effectRef idx="0">
+            <a:schemeClr val="accent1"/>
+          </a:effectRef>
+          <a:fontRef idx="minor">
+            <a:schemeClr val="lt1"/>
+          </a:fontRef>
+        </p:style>
+        <p:txBody>
+          <a:bodyPr rtlCol="0" anchor="ctr"/>
+          <a:lstStyle/>
+          <a:p>
+            <a:pPr algn="ctr"/>
+            <a:r>
+              <a:rPr lang="de-DE">
+                <a:solidFill>
+                  <a:schemeClr val="bg1"/>
+                </a:solidFill>
+              </a:rPr>
+              <a:t>observation model</a:t>
+            </a:r>
+            <a:endParaRPr lang="de-DE">
+              <a:solidFill>
+                <a:schemeClr val="bg1"/>
+              </a:solidFill>
+              <a:latin typeface="Corbel" panose="020B0503020204020204" pitchFamily="34" charset="0"/>
+            </a:endParaRPr>
+          </a:p>
+        </p:txBody>
+      </p:sp>
+      <p:cxnSp>
+        <p:nvCxnSpPr>
+          <p:cNvPr id="22" name="Gerader Verbinder 21">
+            <a:extLst>
+              <a:ext uri="{FF2B5EF4-FFF2-40B4-BE49-F238E27FC236}">
+                <a16:creationId xmlns:a16="http://schemas.microsoft.com/office/drawing/2014/main" id="{7C5BAD98-A193-4D48-9060-EFDD0B7317BD}"/>
+              </a:ext>
+            </a:extLst>
+          </p:cNvPr>
+          <p:cNvCxnSpPr>
+            <a:cxnSpLocks/>
+            <a:endCxn id="26" idx="1"/>
+          </p:cNvCxnSpPr>
+          <p:nvPr/>
+        </p:nvCxnSpPr>
+        <p:spPr>
+          <a:xfrm flipV="1">
+            <a:off x="3108352" y="5874530"/>
+            <a:ext cx="613449" cy="13055"/>
+          </a:xfrm>
+          <a:prstGeom prst="line">
+            <a:avLst/>
+          </a:prstGeom>
+          <a:ln>
+            <a:solidFill>
+              <a:schemeClr val="tx1"/>
+            </a:solidFill>
+            <a:headEnd w="lg" len="lg"/>
+            <a:tailEnd type="triangle" w="lg" len="lg"/>
+          </a:ln>
+        </p:spPr>
+        <p:style>
+          <a:lnRef idx="1">
+            <a:schemeClr val="accent1"/>
+          </a:lnRef>
+          <a:fillRef idx="0">
+            <a:schemeClr val="accent1"/>
+          </a:fillRef>
+          <a:effectRef idx="0">
+            <a:schemeClr val="accent1"/>
+          </a:effectRef>
+          <a:fontRef idx="minor">
+            <a:schemeClr val="tx1"/>
+          </a:fontRef>
+        </p:style>
+      </p:cxnSp>
+      <p:sp>
+        <p:nvSpPr>
+          <p:cNvPr id="37" name="Textfeld 36">
+            <a:extLst>
+              <a:ext uri="{FF2B5EF4-FFF2-40B4-BE49-F238E27FC236}">
+                <a16:creationId xmlns:a16="http://schemas.microsoft.com/office/drawing/2014/main" id="{18962E41-8479-401C-B357-559562D40393}"/>
+              </a:ext>
+            </a:extLst>
+          </p:cNvPr>
+          <p:cNvSpPr txBox="1"/>
+          <p:nvPr/>
+        </p:nvSpPr>
+        <p:spPr>
+          <a:xfrm>
+            <a:off x="921440" y="1105871"/>
+            <a:ext cx="1495602" cy="984885"/>
+          </a:xfrm>
+          <a:prstGeom prst="rect">
+            <a:avLst/>
+          </a:prstGeom>
+          <a:noFill/>
+        </p:spPr>
+        <p:txBody>
+          <a:bodyPr wrap="none" rtlCol="0">
+            <a:spAutoFit/>
+          </a:bodyPr>
+          <a:lstStyle/>
+          <a:p>
+            <a:pPr algn="ctr"/>
+            <a:r>
+              <a:rPr lang="de-DE" sz="4000"/>
+              <a:t>reality</a:t>
+            </a:r>
+          </a:p>
+          <a:p>
+            <a:pPr algn="ctr"/>
+            <a:r>
+              <a:rPr lang="de-DE"/>
+              <a:t>(hidden)</a:t>
+            </a:r>
+          </a:p>
+        </p:txBody>
+      </p:sp>
+      <p:sp>
+        <p:nvSpPr>
+          <p:cNvPr id="39" name="Textfeld 38">
+            <a:extLst>
+              <a:ext uri="{FF2B5EF4-FFF2-40B4-BE49-F238E27FC236}">
+                <a16:creationId xmlns:a16="http://schemas.microsoft.com/office/drawing/2014/main" id="{75423E59-75BF-4295-8E44-ABF34B661813}"/>
+              </a:ext>
+            </a:extLst>
+          </p:cNvPr>
+          <p:cNvSpPr txBox="1"/>
+          <p:nvPr/>
+        </p:nvSpPr>
+        <p:spPr>
+          <a:xfrm>
+            <a:off x="6817896" y="1144137"/>
+            <a:ext cx="1176219" cy="984885"/>
+          </a:xfrm>
+          <a:prstGeom prst="rect">
+            <a:avLst/>
+          </a:prstGeom>
+          <a:noFill/>
+        </p:spPr>
+        <p:txBody>
+          <a:bodyPr wrap="none" rtlCol="0">
+            <a:spAutoFit/>
+          </a:bodyPr>
+          <a:lstStyle/>
+          <a:p>
+            <a:pPr algn="ctr"/>
+            <a:r>
+              <a:rPr lang="de-DE" sz="4000"/>
+              <a:t>filter</a:t>
+            </a:r>
+          </a:p>
+          <a:p>
+            <a:pPr algn="ctr"/>
+            <a:endParaRPr lang="de-DE"/>
+          </a:p>
+        </p:txBody>
+      </p:sp>
+      <p:cxnSp>
+        <p:nvCxnSpPr>
+          <p:cNvPr id="41" name="Gerader Verbinder 40">
+            <a:extLst>
+              <a:ext uri="{FF2B5EF4-FFF2-40B4-BE49-F238E27FC236}">
+                <a16:creationId xmlns:a16="http://schemas.microsoft.com/office/drawing/2014/main" id="{AC5F31ED-B968-4E1A-8A95-3B71658C21D7}"/>
+              </a:ext>
+            </a:extLst>
+          </p:cNvPr>
+          <p:cNvCxnSpPr>
+            <a:stCxn id="26" idx="0"/>
+            <a:endCxn id="7" idx="2"/>
+          </p:cNvCxnSpPr>
+          <p:nvPr/>
+        </p:nvCxnSpPr>
+        <p:spPr>
+          <a:xfrm flipV="1">
+            <a:off x="4837479" y="4862823"/>
+            <a:ext cx="0" cy="552364"/>
+          </a:xfrm>
+          <a:prstGeom prst="line">
+            <a:avLst/>
+          </a:prstGeom>
+          <a:ln>
+            <a:solidFill>
+              <a:schemeClr val="tx1"/>
+            </a:solidFill>
+            <a:headEnd w="lg" len="lg"/>
+            <a:tailEnd type="triangle" w="lg" len="lg"/>
+          </a:ln>
+        </p:spPr>
+        <p:style>
+          <a:lnRef idx="1">
+            <a:schemeClr val="accent1"/>
+          </a:lnRef>
+          <a:fillRef idx="0">
+            <a:schemeClr val="accent1"/>
+          </a:fillRef>
+          <a:effectRef idx="0">
+            <a:schemeClr val="accent1"/>
+          </a:effectRef>
+          <a:fontRef idx="minor">
+            <a:schemeClr val="tx1"/>
+          </a:fontRef>
+        </p:style>
+      </p:cxnSp>
+      <p:cxnSp>
+        <p:nvCxnSpPr>
+          <p:cNvPr id="24" name="Gerader Verbinder 23">
+            <a:extLst>
+              <a:ext uri="{FF2B5EF4-FFF2-40B4-BE49-F238E27FC236}">
+                <a16:creationId xmlns:a16="http://schemas.microsoft.com/office/drawing/2014/main" id="{0A3F2CA3-D7BB-45B1-ABB9-23EB87B0C507}"/>
+              </a:ext>
+            </a:extLst>
+          </p:cNvPr>
+          <p:cNvCxnSpPr>
+            <a:cxnSpLocks/>
+          </p:cNvCxnSpPr>
+          <p:nvPr/>
+        </p:nvCxnSpPr>
+        <p:spPr>
+          <a:xfrm>
+            <a:off x="1879225" y="2063351"/>
+            <a:ext cx="0" cy="226744"/>
+          </a:xfrm>
+          <a:prstGeom prst="line">
+            <a:avLst/>
+          </a:prstGeom>
+          <a:ln>
+            <a:solidFill>
+              <a:schemeClr val="tx1"/>
+            </a:solidFill>
+            <a:headEnd w="lg" len="lg"/>
+            <a:tailEnd type="triangle" w="lg" len="lg"/>
+          </a:ln>
+        </p:spPr>
+        <p:style>
+          <a:lnRef idx="1">
+            <a:schemeClr val="accent1"/>
+          </a:lnRef>
+          <a:fillRef idx="0">
+            <a:schemeClr val="accent1"/>
+          </a:fillRef>
+          <a:effectRef idx="0">
+            <a:schemeClr val="accent1"/>
+          </a:effectRef>
+          <a:fontRef idx="minor">
+            <a:schemeClr val="tx1"/>
+          </a:fontRef>
+        </p:style>
+      </p:cxnSp>
+      <mc:AlternateContent xmlns:mc="http://schemas.openxmlformats.org/markup-compatibility/2006">
+        <mc:Choice xmlns:a14="http://schemas.microsoft.com/office/drawing/2010/main" Requires="a14">
+          <p:sp>
+            <p:nvSpPr>
+              <p:cNvPr id="33" name="Rechteck: abgerundete Ecken 32">
+                <a:extLst>
+                  <a:ext uri="{FF2B5EF4-FFF2-40B4-BE49-F238E27FC236}">
+                    <a16:creationId xmlns:a16="http://schemas.microsoft.com/office/drawing/2014/main" id="{F6793176-6682-44C4-A077-15FB1A5AEAD4}"/>
+                  </a:ext>
+                </a:extLst>
+              </p:cNvPr>
+              <p:cNvSpPr/>
+              <p:nvPr/>
+            </p:nvSpPr>
+            <p:spPr>
+              <a:xfrm>
+                <a:off x="1339794" y="3938415"/>
+                <a:ext cx="1071194" cy="704868"/>
+              </a:xfrm>
+              <a:prstGeom prst="roundRect">
+                <a:avLst/>
+              </a:prstGeom>
+              <a:solidFill>
+                <a:schemeClr val="accent3">
+                  <a:lumMod val="75000"/>
+                </a:schemeClr>
+              </a:solidFill>
+              <a:ln>
+                <a:noFill/>
+              </a:ln>
+            </p:spPr>
+            <p:style>
+              <a:lnRef idx="2">
+                <a:schemeClr val="accent1">
+                  <a:shade val="50000"/>
+                </a:schemeClr>
+              </a:lnRef>
+              <a:fillRef idx="1">
+                <a:schemeClr val="accent1"/>
+              </a:fillRef>
+              <a:effectRef idx="0">
+                <a:schemeClr val="accent1"/>
+              </a:effectRef>
+              <a:fontRef idx="minor">
+                <a:schemeClr val="lt1"/>
+              </a:fontRef>
+            </p:style>
+            <p:txBody>
+              <a:bodyPr rtlCol="0" anchor="ctr"/>
+              <a:lstStyle/>
+              <a:p>
+                <a:pPr algn="ctr"/>
+                <a:r>
+                  <a:rPr lang="de-DE"/>
+                  <a:t>state </a:t>
+                </a:r>
+                <a14:m>
+                  <m:oMath xmlns:m="http://schemas.openxmlformats.org/officeDocument/2006/math">
+                    <m:r>
+                      <a:rPr lang="de-DE" b="0" i="1" smtClean="0">
+                        <a:latin typeface="Cambria Math" panose="02040503050406030204" pitchFamily="18" charset="0"/>
+                      </a:rPr>
+                      <m:t>𝑘</m:t>
+                    </m:r>
+                    <m:r>
+                      <a:rPr lang="de-DE" b="0" i="1" smtClean="0">
+                        <a:latin typeface="Cambria Math" panose="02040503050406030204" pitchFamily="18" charset="0"/>
+                      </a:rPr>
+                      <m:t>−2</m:t>
+                    </m:r>
+                  </m:oMath>
+                </a14:m>
+                <a:endParaRPr lang="de-DE" b="0"/>
+              </a:p>
+            </p:txBody>
+          </p:sp>
+        </mc:Choice>
+        <mc:Fallback>
+          <p:sp>
+            <p:nvSpPr>
+              <p:cNvPr id="33" name="Rechteck: abgerundete Ecken 32">
+                <a:extLst>
+                  <a:ext uri="{FF2B5EF4-FFF2-40B4-BE49-F238E27FC236}">
+                    <a16:creationId xmlns:a16="http://schemas.microsoft.com/office/drawing/2014/main" id="{F6793176-6682-44C4-A077-15FB1A5AEAD4}"/>
+                  </a:ext>
+                </a:extLst>
+              </p:cNvPr>
+              <p:cNvSpPr>
+                <a:spLocks noRot="1" noChangeAspect="1" noMove="1" noResize="1" noEditPoints="1" noAdjustHandles="1" noChangeArrowheads="1" noChangeShapeType="1" noTextEdit="1"/>
+              </p:cNvSpPr>
+              <p:nvPr/>
+            </p:nvSpPr>
+            <p:spPr>
+              <a:xfrm>
+                <a:off x="1339794" y="3938415"/>
+                <a:ext cx="1071194" cy="704868"/>
+              </a:xfrm>
+              <a:prstGeom prst="roundRect">
+                <a:avLst/>
+              </a:prstGeom>
+              <a:blipFill>
+                <a:blip r:embed="rId5"/>
+                <a:stretch>
+                  <a:fillRect/>
+                </a:stretch>
+              </a:blipFill>
+              <a:ln>
+                <a:noFill/>
+              </a:ln>
+            </p:spPr>
+            <p:txBody>
+              <a:bodyPr/>
+              <a:lstStyle/>
+              <a:p>
+                <a:r>
+                  <a:rPr lang="de-DE">
+                    <a:noFill/>
+                  </a:rPr>
+                  <a:t> </a:t>
+                </a:r>
+              </a:p>
+            </p:txBody>
+          </p:sp>
+        </mc:Fallback>
+      </mc:AlternateContent>
+      <p:sp>
+        <p:nvSpPr>
+          <p:cNvPr id="34" name="Rechteck 33">
+            <a:extLst>
+              <a:ext uri="{FF2B5EF4-FFF2-40B4-BE49-F238E27FC236}">
+                <a16:creationId xmlns:a16="http://schemas.microsoft.com/office/drawing/2014/main" id="{C6245857-DAD0-425E-B2C7-C8541B0C8F5A}"/>
+              </a:ext>
+            </a:extLst>
+          </p:cNvPr>
+          <p:cNvSpPr/>
+          <p:nvPr/>
+        </p:nvSpPr>
+        <p:spPr>
+          <a:xfrm>
+            <a:off x="1456724" y="4852046"/>
+            <a:ext cx="845002" cy="514902"/>
+          </a:xfrm>
+          <a:prstGeom prst="rect">
+            <a:avLst/>
+          </a:prstGeom>
+          <a:solidFill>
+            <a:schemeClr val="accent3">
+              <a:lumMod val="75000"/>
+            </a:schemeClr>
+          </a:solidFill>
+          <a:ln>
+            <a:noFill/>
+          </a:ln>
+        </p:spPr>
+        <p:style>
+          <a:lnRef idx="2">
+            <a:schemeClr val="accent1">
+              <a:shade val="50000"/>
+            </a:schemeClr>
+          </a:lnRef>
+          <a:fillRef idx="1">
+            <a:schemeClr val="accent1"/>
+          </a:fillRef>
+          <a:effectRef idx="0">
+            <a:schemeClr val="accent1"/>
+          </a:effectRef>
+          <a:fontRef idx="minor">
+            <a:schemeClr val="lt1"/>
+          </a:fontRef>
+        </p:style>
+        <p:txBody>
+          <a:bodyPr rtlCol="0" anchor="ctr"/>
+          <a:lstStyle/>
+          <a:p>
+            <a:pPr algn="ctr"/>
+            <a:endParaRPr lang="de-DE">
+              <a:solidFill>
+                <a:schemeClr val="bg1"/>
+              </a:solidFill>
+            </a:endParaRPr>
+          </a:p>
+        </p:txBody>
+      </p:sp>
+      <p:cxnSp>
+        <p:nvCxnSpPr>
+          <p:cNvPr id="35" name="Gerader Verbinder 34">
+            <a:extLst>
+              <a:ext uri="{FF2B5EF4-FFF2-40B4-BE49-F238E27FC236}">
+                <a16:creationId xmlns:a16="http://schemas.microsoft.com/office/drawing/2014/main" id="{7AB72388-27F7-423F-BE34-491B1EDA771E}"/>
+              </a:ext>
+            </a:extLst>
+          </p:cNvPr>
+          <p:cNvCxnSpPr>
+            <a:cxnSpLocks/>
+            <a:stCxn id="33" idx="2"/>
+            <a:endCxn id="34" idx="0"/>
+          </p:cNvCxnSpPr>
+          <p:nvPr/>
+        </p:nvCxnSpPr>
+        <p:spPr>
+          <a:xfrm>
+            <a:off x="1875391" y="4643283"/>
+            <a:ext cx="3834" cy="208763"/>
+          </a:xfrm>
+          <a:prstGeom prst="line">
+            <a:avLst/>
+          </a:prstGeom>
+          <a:ln>
+            <a:solidFill>
+              <a:schemeClr val="tx1"/>
+            </a:solidFill>
+            <a:headEnd w="lg" len="lg"/>
+            <a:tailEnd type="triangle" w="lg" len="lg"/>
+          </a:ln>
+        </p:spPr>
+        <p:style>
+          <a:lnRef idx="1">
+            <a:schemeClr val="accent1"/>
+          </a:lnRef>
+          <a:fillRef idx="0">
+            <a:schemeClr val="accent1"/>
+          </a:fillRef>
+          <a:effectRef idx="0">
+            <a:schemeClr val="accent1"/>
+          </a:effectRef>
+          <a:fontRef idx="minor">
+            <a:schemeClr val="tx1"/>
+          </a:fontRef>
+        </p:style>
+      </p:cxnSp>
+      <p:cxnSp>
+        <p:nvCxnSpPr>
+          <p:cNvPr id="38" name="Gerader Verbinder 37">
+            <a:extLst>
+              <a:ext uri="{FF2B5EF4-FFF2-40B4-BE49-F238E27FC236}">
+                <a16:creationId xmlns:a16="http://schemas.microsoft.com/office/drawing/2014/main" id="{7DA0545D-4EFC-47B4-9770-ACAB8DEF794C}"/>
+              </a:ext>
+            </a:extLst>
+          </p:cNvPr>
+          <p:cNvCxnSpPr>
+            <a:cxnSpLocks/>
+            <a:stCxn id="3" idx="2"/>
+            <a:endCxn id="33" idx="0"/>
+          </p:cNvCxnSpPr>
+          <p:nvPr/>
+        </p:nvCxnSpPr>
+        <p:spPr>
+          <a:xfrm flipH="1">
+            <a:off x="1875391" y="3708877"/>
+            <a:ext cx="3834" cy="229538"/>
+          </a:xfrm>
+          <a:prstGeom prst="line">
+            <a:avLst/>
+          </a:prstGeom>
+          <a:ln>
+            <a:solidFill>
+              <a:schemeClr val="tx1"/>
+            </a:solidFill>
+            <a:headEnd w="lg" len="lg"/>
+            <a:tailEnd type="triangle" w="lg" len="lg"/>
+          </a:ln>
+        </p:spPr>
+        <p:style>
+          <a:lnRef idx="1">
+            <a:schemeClr val="accent1"/>
+          </a:lnRef>
+          <a:fillRef idx="0">
+            <a:schemeClr val="accent1"/>
+          </a:fillRef>
+          <a:effectRef idx="0">
+            <a:schemeClr val="accent1"/>
+          </a:effectRef>
+          <a:fontRef idx="minor">
+            <a:schemeClr val="tx1"/>
+          </a:fontRef>
+        </p:style>
+      </p:cxnSp>
+      <mc:AlternateContent xmlns:mc="http://schemas.openxmlformats.org/markup-compatibility/2006">
+        <mc:Choice xmlns:a14="http://schemas.microsoft.com/office/drawing/2010/main" Requires="a14">
+          <p:sp>
+            <p:nvSpPr>
+              <p:cNvPr id="40" name="Rechteck: abgerundete Ecken 39">
+                <a:extLst>
+                  <a:ext uri="{FF2B5EF4-FFF2-40B4-BE49-F238E27FC236}">
+                    <a16:creationId xmlns:a16="http://schemas.microsoft.com/office/drawing/2014/main" id="{2264E3C1-1513-4D02-A898-351BB2588903}"/>
+                  </a:ext>
+                </a:extLst>
+              </p:cNvPr>
+              <p:cNvSpPr/>
+              <p:nvPr/>
+            </p:nvSpPr>
+            <p:spPr>
+              <a:xfrm>
+                <a:off x="1339794" y="5575711"/>
+                <a:ext cx="1071194" cy="704868"/>
+              </a:xfrm>
+              <a:prstGeom prst="roundRect">
+                <a:avLst/>
+              </a:prstGeom>
+              <a:solidFill>
+                <a:schemeClr val="accent3">
+                  <a:lumMod val="75000"/>
+                </a:schemeClr>
+              </a:solidFill>
+              <a:ln>
+                <a:noFill/>
+              </a:ln>
+            </p:spPr>
+            <p:style>
+              <a:lnRef idx="2">
+                <a:schemeClr val="accent1">
+                  <a:shade val="50000"/>
+                </a:schemeClr>
+              </a:lnRef>
+              <a:fillRef idx="1">
+                <a:schemeClr val="accent1"/>
+              </a:fillRef>
+              <a:effectRef idx="0">
+                <a:schemeClr val="accent1"/>
+              </a:effectRef>
+              <a:fontRef idx="minor">
+                <a:schemeClr val="lt1"/>
+              </a:fontRef>
+            </p:style>
+            <p:txBody>
+              <a:bodyPr rtlCol="0" anchor="ctr"/>
+              <a:lstStyle/>
+              <a:p>
+                <a:pPr algn="ctr"/>
+                <a:r>
+                  <a:rPr lang="de-DE"/>
+                  <a:t>state </a:t>
+                </a:r>
+                <a14:m>
+                  <m:oMath xmlns:m="http://schemas.openxmlformats.org/officeDocument/2006/math">
+                    <m:r>
+                      <a:rPr lang="de-DE" b="0" i="1" smtClean="0">
+                        <a:latin typeface="Cambria Math" panose="02040503050406030204" pitchFamily="18" charset="0"/>
+                      </a:rPr>
+                      <m:t>𝑘</m:t>
+                    </m:r>
+                    <m:r>
+                      <a:rPr lang="de-DE" b="0" i="1" smtClean="0">
+                        <a:latin typeface="Cambria Math" panose="02040503050406030204" pitchFamily="18" charset="0"/>
+                      </a:rPr>
+                      <m:t>−2</m:t>
+                    </m:r>
+                  </m:oMath>
+                </a14:m>
+                <a:endParaRPr lang="de-DE" b="0"/>
+              </a:p>
+            </p:txBody>
+          </p:sp>
+        </mc:Choice>
+        <mc:Fallback>
+          <p:sp>
+            <p:nvSpPr>
+              <p:cNvPr id="40" name="Rechteck: abgerundete Ecken 39">
+                <a:extLst>
+                  <a:ext uri="{FF2B5EF4-FFF2-40B4-BE49-F238E27FC236}">
+                    <a16:creationId xmlns:a16="http://schemas.microsoft.com/office/drawing/2014/main" id="{2264E3C1-1513-4D02-A898-351BB2588903}"/>
+                  </a:ext>
+                </a:extLst>
+              </p:cNvPr>
+              <p:cNvSpPr>
+                <a:spLocks noRot="1" noChangeAspect="1" noMove="1" noResize="1" noEditPoints="1" noAdjustHandles="1" noChangeArrowheads="1" noChangeShapeType="1" noTextEdit="1"/>
+              </p:cNvSpPr>
+              <p:nvPr/>
+            </p:nvSpPr>
+            <p:spPr>
+              <a:xfrm>
+                <a:off x="1339794" y="5575711"/>
+                <a:ext cx="1071194" cy="704868"/>
+              </a:xfrm>
+              <a:prstGeom prst="roundRect">
+                <a:avLst/>
+              </a:prstGeom>
+              <a:blipFill>
+                <a:blip r:embed="rId6"/>
+                <a:stretch>
+                  <a:fillRect t="-870"/>
+                </a:stretch>
+              </a:blipFill>
+              <a:ln>
+                <a:noFill/>
+              </a:ln>
+            </p:spPr>
+            <p:txBody>
+              <a:bodyPr/>
+              <a:lstStyle/>
+              <a:p>
+                <a:r>
+                  <a:rPr lang="de-DE">
+                    <a:noFill/>
+                  </a:rPr>
+                  <a:t> </a:t>
+                </a:r>
+              </a:p>
+            </p:txBody>
+          </p:sp>
+        </mc:Fallback>
+      </mc:AlternateContent>
+      <p:cxnSp>
+        <p:nvCxnSpPr>
+          <p:cNvPr id="25" name="Gerade Verbindung mit Pfeil 24">
+            <a:extLst>
+              <a:ext uri="{FF2B5EF4-FFF2-40B4-BE49-F238E27FC236}">
+                <a16:creationId xmlns:a16="http://schemas.microsoft.com/office/drawing/2014/main" id="{43AADF21-E39C-4C09-AA03-8D62C252438A}"/>
+              </a:ext>
+            </a:extLst>
+          </p:cNvPr>
+          <p:cNvCxnSpPr/>
+          <p:nvPr/>
+        </p:nvCxnSpPr>
+        <p:spPr>
+          <a:xfrm>
+            <a:off x="390617" y="1251751"/>
+            <a:ext cx="0" cy="5326602"/>
+          </a:xfrm>
+          <a:prstGeom prst="straightConnector1">
+            <a:avLst/>
+          </a:prstGeom>
+          <a:ln w="50800">
+            <a:solidFill>
+              <a:schemeClr val="tx1"/>
+            </a:solidFill>
+            <a:headEnd w="lg" len="lg"/>
+            <a:tailEnd type="triangle" w="lg" len="lg"/>
+          </a:ln>
+        </p:spPr>
+        <p:style>
+          <a:lnRef idx="1">
+            <a:schemeClr val="accent1"/>
+          </a:lnRef>
+          <a:fillRef idx="0">
+            <a:schemeClr val="accent1"/>
+          </a:fillRef>
+          <a:effectRef idx="0">
+            <a:schemeClr val="accent1"/>
+          </a:effectRef>
+          <a:fontRef idx="minor">
+            <a:schemeClr val="tx1"/>
+          </a:fontRef>
+        </p:style>
+      </p:cxnSp>
+      <p:sp>
+        <p:nvSpPr>
+          <p:cNvPr id="27" name="Textfeld 26">
+            <a:extLst>
+              <a:ext uri="{FF2B5EF4-FFF2-40B4-BE49-F238E27FC236}">
+                <a16:creationId xmlns:a16="http://schemas.microsoft.com/office/drawing/2014/main" id="{58CBFBC4-875A-4F3F-B459-933CFB1F450C}"/>
+              </a:ext>
+            </a:extLst>
+          </p:cNvPr>
+          <p:cNvSpPr txBox="1"/>
+          <p:nvPr/>
+        </p:nvSpPr>
+        <p:spPr>
+          <a:xfrm rot="5400000">
+            <a:off x="300914" y="6059345"/>
+            <a:ext cx="851515" cy="523220"/>
+          </a:xfrm>
+          <a:prstGeom prst="rect">
+            <a:avLst/>
+          </a:prstGeom>
+          <a:noFill/>
+        </p:spPr>
+        <p:txBody>
+          <a:bodyPr wrap="none" rtlCol="0">
+            <a:spAutoFit/>
+          </a:bodyPr>
+          <a:lstStyle/>
+          <a:p>
+            <a:r>
+              <a:rPr lang="de-DE" sz="2800"/>
+              <a:t>time</a:t>
+            </a:r>
+          </a:p>
+        </p:txBody>
+      </p:sp>
+      <p:cxnSp>
+        <p:nvCxnSpPr>
+          <p:cNvPr id="29" name="Gerader Verbinder 28">
+            <a:extLst>
+              <a:ext uri="{FF2B5EF4-FFF2-40B4-BE49-F238E27FC236}">
+                <a16:creationId xmlns:a16="http://schemas.microsoft.com/office/drawing/2014/main" id="{E911BD40-AC93-485C-892B-99BC93A3B9AF}"/>
+              </a:ext>
+            </a:extLst>
+          </p:cNvPr>
+          <p:cNvCxnSpPr/>
+          <p:nvPr/>
+        </p:nvCxnSpPr>
+        <p:spPr>
+          <a:xfrm>
+            <a:off x="292962" y="2651953"/>
+            <a:ext cx="204187" cy="0"/>
+          </a:xfrm>
+          <a:prstGeom prst="line">
+            <a:avLst/>
+          </a:prstGeom>
+          <a:ln w="25400">
+            <a:solidFill>
+              <a:schemeClr val="tx1"/>
+            </a:solidFill>
+            <a:headEnd w="lg" len="lg"/>
+            <a:tailEnd type="none"/>
+          </a:ln>
+        </p:spPr>
+        <p:style>
+          <a:lnRef idx="1">
+            <a:schemeClr val="accent1"/>
+          </a:lnRef>
+          <a:fillRef idx="0">
+            <a:schemeClr val="accent1"/>
+          </a:fillRef>
+          <a:effectRef idx="0">
+            <a:schemeClr val="accent1"/>
+          </a:effectRef>
+          <a:fontRef idx="minor">
+            <a:schemeClr val="tx1"/>
+          </a:fontRef>
+        </p:style>
+      </p:cxnSp>
+      <p:cxnSp>
+        <p:nvCxnSpPr>
+          <p:cNvPr id="46" name="Gerader Verbinder 45">
+            <a:extLst>
+              <a:ext uri="{FF2B5EF4-FFF2-40B4-BE49-F238E27FC236}">
+                <a16:creationId xmlns:a16="http://schemas.microsoft.com/office/drawing/2014/main" id="{0F49CBA6-ACAE-47F1-ABE3-57111C0B0F1F}"/>
+              </a:ext>
+            </a:extLst>
+          </p:cNvPr>
+          <p:cNvCxnSpPr/>
+          <p:nvPr/>
+        </p:nvCxnSpPr>
+        <p:spPr>
+          <a:xfrm>
+            <a:off x="292962" y="4486454"/>
+            <a:ext cx="204187" cy="0"/>
+          </a:xfrm>
+          <a:prstGeom prst="line">
+            <a:avLst/>
+          </a:prstGeom>
+          <a:ln w="25400">
+            <a:solidFill>
+              <a:schemeClr val="tx1"/>
+            </a:solidFill>
+            <a:headEnd w="lg" len="lg"/>
+            <a:tailEnd type="none"/>
+          </a:ln>
+        </p:spPr>
+        <p:style>
+          <a:lnRef idx="1">
+            <a:schemeClr val="accent1"/>
+          </a:lnRef>
+          <a:fillRef idx="0">
+            <a:schemeClr val="accent1"/>
+          </a:fillRef>
+          <a:effectRef idx="0">
+            <a:schemeClr val="accent1"/>
+          </a:effectRef>
+          <a:fontRef idx="minor">
+            <a:schemeClr val="tx1"/>
+          </a:fontRef>
+        </p:style>
+      </p:cxnSp>
+      <p:cxnSp>
+        <p:nvCxnSpPr>
+          <p:cNvPr id="47" name="Gerader Verbinder 46">
+            <a:extLst>
+              <a:ext uri="{FF2B5EF4-FFF2-40B4-BE49-F238E27FC236}">
+                <a16:creationId xmlns:a16="http://schemas.microsoft.com/office/drawing/2014/main" id="{72ABBA55-2A60-4444-A8B7-B51DE8A02EFE}"/>
+              </a:ext>
+            </a:extLst>
+          </p:cNvPr>
+          <p:cNvCxnSpPr/>
+          <p:nvPr/>
+        </p:nvCxnSpPr>
+        <p:spPr>
+          <a:xfrm>
+            <a:off x="303319" y="5918277"/>
+            <a:ext cx="204187" cy="0"/>
+          </a:xfrm>
+          <a:prstGeom prst="line">
+            <a:avLst/>
+          </a:prstGeom>
+          <a:ln w="25400">
+            <a:solidFill>
+              <a:schemeClr val="tx1"/>
+            </a:solidFill>
+            <a:headEnd w="lg" len="lg"/>
+            <a:tailEnd type="none"/>
+          </a:ln>
+        </p:spPr>
+        <p:style>
+          <a:lnRef idx="1">
+            <a:schemeClr val="accent1"/>
+          </a:lnRef>
+          <a:fillRef idx="0">
+            <a:schemeClr val="accent1"/>
+          </a:fillRef>
+          <a:effectRef idx="0">
+            <a:schemeClr val="accent1"/>
+          </a:effectRef>
+          <a:fontRef idx="minor">
+            <a:schemeClr val="tx1"/>
+          </a:fontRef>
+        </p:style>
+      </p:cxnSp>
+      <p:cxnSp>
+        <p:nvCxnSpPr>
+          <p:cNvPr id="56" name="Gerader Verbinder 55">
+            <a:extLst>
+              <a:ext uri="{FF2B5EF4-FFF2-40B4-BE49-F238E27FC236}">
+                <a16:creationId xmlns:a16="http://schemas.microsoft.com/office/drawing/2014/main" id="{97261862-5A65-494F-A66F-B98F2E8F16C3}"/>
+              </a:ext>
+            </a:extLst>
+          </p:cNvPr>
+          <p:cNvCxnSpPr>
+            <a:cxnSpLocks/>
+          </p:cNvCxnSpPr>
+          <p:nvPr/>
+        </p:nvCxnSpPr>
+        <p:spPr>
+          <a:xfrm>
+            <a:off x="1876576" y="5376372"/>
+            <a:ext cx="3834" cy="208763"/>
+          </a:xfrm>
+          <a:prstGeom prst="line">
+            <a:avLst/>
+          </a:prstGeom>
+          <a:ln>
+            <a:solidFill>
+              <a:schemeClr val="tx1"/>
+            </a:solidFill>
+            <a:headEnd w="lg" len="lg"/>
+            <a:tailEnd type="triangle" w="lg" len="lg"/>
+          </a:ln>
+        </p:spPr>
+        <p:style>
+          <a:lnRef idx="1">
+            <a:schemeClr val="accent1"/>
+          </a:lnRef>
+          <a:fillRef idx="0">
+            <a:schemeClr val="accent1"/>
+          </a:fillRef>
+          <a:effectRef idx="0">
+            <a:schemeClr val="accent1"/>
+          </a:effectRef>
+          <a:fontRef idx="minor">
+            <a:schemeClr val="tx1"/>
+          </a:fontRef>
+        </p:style>
+      </p:cxnSp>
+    </p:spTree>
+    <p:extLst>
+      <p:ext uri="{BB962C8B-B14F-4D97-AF65-F5344CB8AC3E}">
+        <p14:creationId xmlns:p14="http://schemas.microsoft.com/office/powerpoint/2010/main" val="744428868"/>
+      </p:ext>
+    </p:extLst>
+  </p:cSld>
+  <p:clrMapOvr>
+    <a:masterClrMapping/>
+  </p:clrMapOvr>
+</p:sld>
+</file>
+
+<file path=ppt/slides/slide9.xml><?xml version="1.0" encoding="utf-8"?>
+<p:sld xmlns:a="http://schemas.openxmlformats.org/drawingml/2006/main" xmlns:r="http://schemas.openxmlformats.org/officeDocument/2006/relationships" xmlns:p="http://schemas.openxmlformats.org/presentationml/2006/main">
+  <p:cSld>
+    <p:spTree>
+      <p:nvGrpSpPr>
+        <p:cNvPr id="1" name=""/>
+        <p:cNvGrpSpPr/>
+        <p:nvPr/>
+      </p:nvGrpSpPr>
+      <p:grpSpPr>
+        <a:xfrm>
+          <a:off x="0" y="0"/>
+          <a:ext cx="0" cy="0"/>
+          <a:chOff x="0" y="0"/>
+          <a:chExt cx="0" cy="0"/>
+        </a:xfrm>
+      </p:grpSpPr>
+      <p:sp>
+        <p:nvSpPr>
+          <p:cNvPr id="36" name="Rechteck 35">
+            <a:extLst>
+              <a:ext uri="{FF2B5EF4-FFF2-40B4-BE49-F238E27FC236}">
+                <a16:creationId xmlns:a16="http://schemas.microsoft.com/office/drawing/2014/main" id="{8160B053-4D50-4DEB-9B26-49B00044D64B}"/>
+              </a:ext>
+            </a:extLst>
+          </p:cNvPr>
+          <p:cNvSpPr/>
+          <p:nvPr/>
+        </p:nvSpPr>
+        <p:spPr>
+          <a:xfrm>
+            <a:off x="0" y="1074656"/>
+            <a:ext cx="9144000" cy="5783344"/>
+          </a:xfrm>
+          <a:prstGeom prst="rect">
+            <a:avLst/>
+          </a:prstGeom>
+          <a:gradFill>
+            <a:gsLst>
               <a:gs pos="39000">
                 <a:schemeClr val="accent3">
                   <a:lumMod val="40000"/>
@@ -18858,7 +21082,7 @@
           <a:p>
             <a:fld id="{0696A970-E1A0-4FA3-8434-947DF6AD858B}" type="slidenum">
               <a:rPr lang="de-DE" smtClean="0"/>
-              <a:t>8</a:t>
+              <a:t>9</a:t>
             </a:fld>
             <a:endParaRPr lang="de-DE"/>
           </a:p>
@@ -20015,8 +22239,8 @@
           </a:fontRef>
         </p:style>
       </p:cxnSp>
-      <mc:AlternateContent xmlns:mc="http://schemas.openxmlformats.org/markup-compatibility/2006">
-        <mc:Choice xmlns:a14="http://schemas.microsoft.com/office/drawing/2010/main" Requires="a14">
+      <mc:AlternateContent xmlns:mc="http://schemas.openxmlformats.org/markup-compatibility/2006" xmlns:a14="http://schemas.microsoft.com/office/drawing/2010/main">
+        <mc:Choice Requires="a14">
           <p:sp>
             <p:nvSpPr>
               <p:cNvPr id="55" name="Rechteck: abgerundete Ecken 54">
@@ -20123,7 +22347,7 @@
             </p:txBody>
           </p:sp>
         </mc:Choice>
-        <mc:Fallback>
+        <mc:Fallback xmlns="">
           <p:sp>
             <p:nvSpPr>
               <p:cNvPr id="55" name="Rechteck: abgerundete Ecken 54">
@@ -20221,716 +22445,6 @@
     <p:extLst>
       <p:ext uri="{BB962C8B-B14F-4D97-AF65-F5344CB8AC3E}">
         <p14:creationId xmlns:p14="http://schemas.microsoft.com/office/powerpoint/2010/main" val="1117418552"/>
-      </p:ext>
-    </p:extLst>
-  </p:cSld>
-  <p:clrMapOvr>
-    <a:masterClrMapping/>
-  </p:clrMapOvr>
-</p:sld>
-</file>
-
-<file path=ppt/slides/slide9.xml><?xml version="1.0" encoding="utf-8"?>
-<p:sld xmlns:a="http://schemas.openxmlformats.org/drawingml/2006/main" xmlns:r="http://schemas.openxmlformats.org/officeDocument/2006/relationships" xmlns:p="http://schemas.openxmlformats.org/presentationml/2006/main">
-  <p:cSld>
-    <p:spTree>
-      <p:nvGrpSpPr>
-        <p:cNvPr id="1" name=""/>
-        <p:cNvGrpSpPr/>
-        <p:nvPr/>
-      </p:nvGrpSpPr>
-      <p:grpSpPr>
-        <a:xfrm>
-          <a:off x="0" y="0"/>
-          <a:ext cx="0" cy="0"/>
-          <a:chOff x="0" y="0"/>
-          <a:chExt cx="0" cy="0"/>
-        </a:xfrm>
-      </p:grpSpPr>
-      <p:sp>
-        <p:nvSpPr>
-          <p:cNvPr id="2" name="Titel 1">
-            <a:extLst>
-              <a:ext uri="{FF2B5EF4-FFF2-40B4-BE49-F238E27FC236}">
-                <a16:creationId xmlns:a16="http://schemas.microsoft.com/office/drawing/2014/main" id="{05F9BAA4-7E2C-49B0-A8A8-D436EB0C28B8}"/>
-              </a:ext>
-            </a:extLst>
-          </p:cNvPr>
-          <p:cNvSpPr>
-            <a:spLocks noGrp="1"/>
-          </p:cNvSpPr>
-          <p:nvPr>
-            <p:ph type="title"/>
-          </p:nvPr>
-        </p:nvSpPr>
-        <p:spPr>
-          <a:xfrm>
-            <a:off x="0" y="18255"/>
-            <a:ext cx="9144000" cy="1056401"/>
-          </a:xfrm>
-        </p:spPr>
-        <p:txBody>
-          <a:bodyPr>
-            <a:normAutofit/>
-          </a:bodyPr>
-          <a:lstStyle/>
-          <a:p>
-            <a:pPr algn="ctr"/>
-            <a:r>
-              <a:rPr lang="de-DE" sz="5400"/>
-              <a:t>Kalman Filter: World Model</a:t>
-            </a:r>
-          </a:p>
-        </p:txBody>
-      </p:sp>
-      <mc:AlternateContent xmlns:mc="http://schemas.openxmlformats.org/markup-compatibility/2006" xmlns:a14="http://schemas.microsoft.com/office/drawing/2010/main">
-        <mc:Choice Requires="a14">
-          <p:sp>
-            <p:nvSpPr>
-              <p:cNvPr id="3" name="Inhaltsplatzhalter 2">
-                <a:extLst>
-                  <a:ext uri="{FF2B5EF4-FFF2-40B4-BE49-F238E27FC236}">
-                    <a16:creationId xmlns:a16="http://schemas.microsoft.com/office/drawing/2014/main" id="{9962D4C6-1989-457F-A5DB-9CC2C96CDAE3}"/>
-                  </a:ext>
-                </a:extLst>
-              </p:cNvPr>
-              <p:cNvSpPr>
-                <a:spLocks noGrp="1"/>
-              </p:cNvSpPr>
-              <p:nvPr>
-                <p:ph idx="1"/>
-              </p:nvPr>
-            </p:nvSpPr>
-            <p:spPr/>
-            <p:txBody>
-              <a:bodyPr>
-                <a:normAutofit/>
-              </a:bodyPr>
-              <a:lstStyle/>
-              <a:p>
-                <a:pPr marL="0" indent="0">
-                  <a:buNone/>
-                </a:pPr>
-                <a:r>
-                  <a:rPr lang="de-DE" sz="2800">
-                    <a:latin typeface="Corbel" panose="020B0503020204020204" pitchFamily="34" charset="0"/>
-                  </a:rPr>
-                  <a:t>the kalman-filter assumes the following state progression (based on former state </a:t>
-                </a:r>
-                <a14:m>
-                  <m:oMath xmlns:m="http://schemas.openxmlformats.org/officeDocument/2006/math">
-                    <m:sSub>
-                      <m:sSubPr>
-                        <m:ctrlPr>
-                          <a:rPr lang="de-DE" sz="2800" b="0" i="1" smtClean="0">
-                            <a:latin typeface="Cambria Math" panose="02040503050406030204" pitchFamily="18" charset="0"/>
-                          </a:rPr>
-                        </m:ctrlPr>
-                      </m:sSubPr>
-                      <m:e>
-                        <m:r>
-                          <a:rPr lang="de-DE" sz="2800" b="0" i="1" smtClean="0">
-                            <a:latin typeface="Cambria Math" panose="02040503050406030204" pitchFamily="18" charset="0"/>
-                          </a:rPr>
-                          <m:t>𝑥</m:t>
-                        </m:r>
-                      </m:e>
-                      <m:sub>
-                        <m:r>
-                          <a:rPr lang="de-DE" sz="2800" b="0" i="1" smtClean="0">
-                            <a:latin typeface="Cambria Math" panose="02040503050406030204" pitchFamily="18" charset="0"/>
-                          </a:rPr>
-                          <m:t>𝑘</m:t>
-                        </m:r>
-                        <m:r>
-                          <a:rPr lang="de-DE" sz="2800" b="0" i="1" smtClean="0">
-                            <a:latin typeface="Cambria Math" panose="02040503050406030204" pitchFamily="18" charset="0"/>
-                          </a:rPr>
-                          <m:t>−1</m:t>
-                        </m:r>
-                      </m:sub>
-                    </m:sSub>
-                  </m:oMath>
-                </a14:m>
-                <a:r>
-                  <a:rPr lang="de-DE" sz="2800">
-                    <a:latin typeface="Corbel" panose="020B0503020204020204" pitchFamily="34" charset="0"/>
-                  </a:rPr>
-                  <a:t>):</a:t>
-                </a:r>
-              </a:p>
-              <a:p>
-                <a:pPr marL="0" indent="0">
-                  <a:buNone/>
-                </a:pPr>
-                <a:endParaRPr lang="de-DE" sz="2800">
-                  <a:latin typeface="Corbel" panose="020B0503020204020204" pitchFamily="34" charset="0"/>
-                </a:endParaRPr>
-              </a:p>
-              <a:p>
-                <a:pPr marL="0" indent="0">
-                  <a:buNone/>
-                </a:pPr>
-                <a14:m>
-                  <m:oMathPara xmlns:m="http://schemas.openxmlformats.org/officeDocument/2006/math">
-                    <m:oMathParaPr>
-                      <m:jc m:val="centerGroup"/>
-                    </m:oMathParaPr>
-                    <m:oMath xmlns:m="http://schemas.openxmlformats.org/officeDocument/2006/math">
-                      <m:sSub>
-                        <m:sSubPr>
-                          <m:ctrlPr>
-                            <a:rPr lang="de-DE" sz="3200" b="0" i="1" smtClean="0">
-                              <a:latin typeface="Cambria Math" panose="02040503050406030204" pitchFamily="18" charset="0"/>
-                            </a:rPr>
-                          </m:ctrlPr>
-                        </m:sSubPr>
-                        <m:e>
-                          <m:r>
-                            <a:rPr lang="de-DE" sz="3200" b="0" i="1" smtClean="0">
-                              <a:latin typeface="Cambria Math" panose="02040503050406030204" pitchFamily="18" charset="0"/>
-                            </a:rPr>
-                            <m:t>𝑥</m:t>
-                          </m:r>
-                        </m:e>
-                        <m:sub>
-                          <m:r>
-                            <a:rPr lang="de-DE" sz="3200" b="0" i="1" smtClean="0">
-                              <a:latin typeface="Cambria Math" panose="02040503050406030204" pitchFamily="18" charset="0"/>
-                            </a:rPr>
-                            <m:t>𝑘</m:t>
-                          </m:r>
-                        </m:sub>
-                      </m:sSub>
-                      <m:r>
-                        <a:rPr lang="de-DE" sz="3200" b="0" i="1" smtClean="0">
-                          <a:latin typeface="Cambria Math" panose="02040503050406030204" pitchFamily="18" charset="0"/>
-                        </a:rPr>
-                        <m:t>=</m:t>
-                      </m:r>
-                      <m:sSub>
-                        <m:sSubPr>
-                          <m:ctrlPr>
-                            <a:rPr lang="de-DE" sz="3200" b="0" i="1" smtClean="0">
-                              <a:latin typeface="Cambria Math" panose="02040503050406030204" pitchFamily="18" charset="0"/>
-                            </a:rPr>
-                          </m:ctrlPr>
-                        </m:sSubPr>
-                        <m:e>
-                          <m:r>
-                            <a:rPr lang="de-DE" sz="3200" b="0" i="1" smtClean="0">
-                              <a:latin typeface="Cambria Math" panose="02040503050406030204" pitchFamily="18" charset="0"/>
-                            </a:rPr>
-                            <m:t>𝐹</m:t>
-                          </m:r>
-                        </m:e>
-                        <m:sub>
-                          <m:r>
-                            <a:rPr lang="de-DE" sz="3200" b="0" i="1" smtClean="0">
-                              <a:latin typeface="Cambria Math" panose="02040503050406030204" pitchFamily="18" charset="0"/>
-                            </a:rPr>
-                            <m:t>𝑘</m:t>
-                          </m:r>
-                        </m:sub>
-                      </m:sSub>
-                      <m:sSub>
-                        <m:sSubPr>
-                          <m:ctrlPr>
-                            <a:rPr lang="de-DE" sz="3200" b="0" i="1" smtClean="0">
-                              <a:latin typeface="Cambria Math" panose="02040503050406030204" pitchFamily="18" charset="0"/>
-                            </a:rPr>
-                          </m:ctrlPr>
-                        </m:sSubPr>
-                        <m:e>
-                          <m:r>
-                            <a:rPr lang="de-DE" sz="3200" b="0" i="1" smtClean="0">
-                              <a:latin typeface="Cambria Math" panose="02040503050406030204" pitchFamily="18" charset="0"/>
-                            </a:rPr>
-                            <m:t>𝑥</m:t>
-                          </m:r>
-                        </m:e>
-                        <m:sub>
-                          <m:r>
-                            <a:rPr lang="de-DE" sz="3200" b="0" i="1" smtClean="0">
-                              <a:latin typeface="Cambria Math" panose="02040503050406030204" pitchFamily="18" charset="0"/>
-                            </a:rPr>
-                            <m:t>𝑘</m:t>
-                          </m:r>
-                          <m:r>
-                            <a:rPr lang="de-DE" sz="3200" b="0" i="1" smtClean="0">
-                              <a:latin typeface="Cambria Math" panose="02040503050406030204" pitchFamily="18" charset="0"/>
-                            </a:rPr>
-                            <m:t>−1</m:t>
-                          </m:r>
-                        </m:sub>
-                      </m:sSub>
-                      <m:r>
-                        <a:rPr lang="de-DE" sz="3200" b="0" i="1" smtClean="0">
-                          <a:latin typeface="Cambria Math" panose="02040503050406030204" pitchFamily="18" charset="0"/>
-                        </a:rPr>
-                        <m:t>+</m:t>
-                      </m:r>
-                      <m:sSub>
-                        <m:sSubPr>
-                          <m:ctrlPr>
-                            <a:rPr lang="de-DE" sz="3200" b="0" i="1" smtClean="0">
-                              <a:latin typeface="Cambria Math" panose="02040503050406030204" pitchFamily="18" charset="0"/>
-                            </a:rPr>
-                          </m:ctrlPr>
-                        </m:sSubPr>
-                        <m:e>
-                          <m:r>
-                            <a:rPr lang="de-DE" sz="3200" b="0" i="1" smtClean="0">
-                              <a:latin typeface="Cambria Math" panose="02040503050406030204" pitchFamily="18" charset="0"/>
-                            </a:rPr>
-                            <m:t>𝐵</m:t>
-                          </m:r>
-                        </m:e>
-                        <m:sub>
-                          <m:r>
-                            <a:rPr lang="de-DE" sz="3200" b="0" i="1" smtClean="0">
-                              <a:latin typeface="Cambria Math" panose="02040503050406030204" pitchFamily="18" charset="0"/>
-                            </a:rPr>
-                            <m:t>𝑘</m:t>
-                          </m:r>
-                        </m:sub>
-                      </m:sSub>
-                      <m:sSub>
-                        <m:sSubPr>
-                          <m:ctrlPr>
-                            <a:rPr lang="de-DE" sz="3200" b="0" i="1" smtClean="0">
-                              <a:latin typeface="Cambria Math" panose="02040503050406030204" pitchFamily="18" charset="0"/>
-                            </a:rPr>
-                          </m:ctrlPr>
-                        </m:sSubPr>
-                        <m:e>
-                          <m:r>
-                            <a:rPr lang="de-DE" sz="3200" b="0" i="1" smtClean="0">
-                              <a:latin typeface="Cambria Math" panose="02040503050406030204" pitchFamily="18" charset="0"/>
-                            </a:rPr>
-                            <m:t>𝑢</m:t>
-                          </m:r>
-                        </m:e>
-                        <m:sub>
-                          <m:r>
-                            <a:rPr lang="de-DE" sz="3200" b="0" i="1" smtClean="0">
-                              <a:latin typeface="Cambria Math" panose="02040503050406030204" pitchFamily="18" charset="0"/>
-                            </a:rPr>
-                            <m:t>𝑘</m:t>
-                          </m:r>
-                        </m:sub>
-                      </m:sSub>
-                      <m:r>
-                        <a:rPr lang="de-DE" sz="3200" b="0" i="1" smtClean="0">
-                          <a:latin typeface="Cambria Math" panose="02040503050406030204" pitchFamily="18" charset="0"/>
-                        </a:rPr>
-                        <m:t>+</m:t>
-                      </m:r>
-                      <m:sSub>
-                        <m:sSubPr>
-                          <m:ctrlPr>
-                            <a:rPr lang="de-DE" sz="3200" b="0" i="1" smtClean="0">
-                              <a:latin typeface="Cambria Math" panose="02040503050406030204" pitchFamily="18" charset="0"/>
-                            </a:rPr>
-                          </m:ctrlPr>
-                        </m:sSubPr>
-                        <m:e>
-                          <m:r>
-                            <a:rPr lang="de-DE" sz="3200" b="0" i="1" smtClean="0">
-                              <a:latin typeface="Cambria Math" panose="02040503050406030204" pitchFamily="18" charset="0"/>
-                            </a:rPr>
-                            <m:t>𝑤</m:t>
-                          </m:r>
-                        </m:e>
-                        <m:sub>
-                          <m:r>
-                            <a:rPr lang="de-DE" sz="3200" b="0" i="1" smtClean="0">
-                              <a:latin typeface="Cambria Math" panose="02040503050406030204" pitchFamily="18" charset="0"/>
-                            </a:rPr>
-                            <m:t>𝑘</m:t>
-                          </m:r>
-                        </m:sub>
-                      </m:sSub>
-                    </m:oMath>
-                  </m:oMathPara>
-                </a14:m>
-                <a:endParaRPr lang="de-DE" sz="2800" b="0">
-                  <a:latin typeface="Corbel" panose="020B0503020204020204" pitchFamily="34" charset="0"/>
-                </a:endParaRPr>
-              </a:p>
-              <a:p>
-                <a:pPr marL="0" indent="0">
-                  <a:buNone/>
-                </a:pPr>
-                <a:endParaRPr lang="de-DE" sz="2800" b="0">
-                  <a:latin typeface="Corbel" panose="020B0503020204020204" pitchFamily="34" charset="0"/>
-                </a:endParaRPr>
-              </a:p>
-              <a:p>
-                <a:pPr>
-                  <a:buFontTx/>
-                  <a:buChar char="-"/>
-                </a:pPr>
-                <a14:m>
-                  <m:oMath xmlns:m="http://schemas.openxmlformats.org/officeDocument/2006/math">
-                    <m:sSub>
-                      <m:sSubPr>
-                        <m:ctrlPr>
-                          <a:rPr lang="de-DE" sz="2800" b="0" i="1" smtClean="0">
-                            <a:latin typeface="Cambria Math" panose="02040503050406030204" pitchFamily="18" charset="0"/>
-                          </a:rPr>
-                        </m:ctrlPr>
-                      </m:sSubPr>
-                      <m:e>
-                        <m:r>
-                          <a:rPr lang="de-DE" sz="2800" b="0" i="1" smtClean="0">
-                            <a:latin typeface="Cambria Math" panose="02040503050406030204" pitchFamily="18" charset="0"/>
-                          </a:rPr>
-                          <m:t>𝐹</m:t>
-                        </m:r>
-                      </m:e>
-                      <m:sub>
-                        <m:r>
-                          <a:rPr lang="de-DE" sz="2800" b="0" i="1" smtClean="0">
-                            <a:latin typeface="Cambria Math" panose="02040503050406030204" pitchFamily="18" charset="0"/>
-                          </a:rPr>
-                          <m:t>𝑘</m:t>
-                        </m:r>
-                      </m:sub>
-                    </m:sSub>
-                  </m:oMath>
-                </a14:m>
-                <a:r>
-                  <a:rPr lang="de-DE" sz="2800">
-                    <a:latin typeface="Corbel" panose="020B0503020204020204" pitchFamily="34" charset="0"/>
-                  </a:rPr>
-                  <a:t> : state-transition model  </a:t>
-                </a:r>
-                <a:r>
-                  <a:rPr lang="de-DE" sz="2400">
-                    <a:solidFill>
-                      <a:schemeClr val="accent3"/>
-                    </a:solidFill>
-                    <a:latin typeface="Corbel" panose="020B0503020204020204" pitchFamily="34" charset="0"/>
-                  </a:rPr>
-                  <a:t>(e.g. classical mechanics)</a:t>
-                </a:r>
-              </a:p>
-              <a:p>
-                <a:pPr>
-                  <a:buFontTx/>
-                  <a:buChar char="-"/>
-                </a:pPr>
-                <a14:m>
-                  <m:oMath xmlns:m="http://schemas.openxmlformats.org/officeDocument/2006/math">
-                    <m:sSub>
-                      <m:sSubPr>
-                        <m:ctrlPr>
-                          <a:rPr lang="de-DE" sz="2800" b="0" i="1" smtClean="0">
-                            <a:latin typeface="Cambria Math" panose="02040503050406030204" pitchFamily="18" charset="0"/>
-                          </a:rPr>
-                        </m:ctrlPr>
-                      </m:sSubPr>
-                      <m:e>
-                        <m:r>
-                          <a:rPr lang="de-DE" sz="2800" b="0" i="1" smtClean="0">
-                            <a:latin typeface="Cambria Math" panose="02040503050406030204" pitchFamily="18" charset="0"/>
-                          </a:rPr>
-                          <m:t>𝐵</m:t>
-                        </m:r>
-                      </m:e>
-                      <m:sub>
-                        <m:r>
-                          <a:rPr lang="de-DE" sz="2800" b="0" i="1" smtClean="0">
-                            <a:latin typeface="Cambria Math" panose="02040503050406030204" pitchFamily="18" charset="0"/>
-                          </a:rPr>
-                          <m:t>𝑘</m:t>
-                        </m:r>
-                      </m:sub>
-                    </m:sSub>
-                  </m:oMath>
-                </a14:m>
-                <a:r>
-                  <a:rPr lang="de-DE" sz="2800">
-                    <a:latin typeface="Corbel" panose="020B0503020204020204" pitchFamily="34" charset="0"/>
-                  </a:rPr>
-                  <a:t> : control-input model  </a:t>
-                </a:r>
-                <a:r>
-                  <a:rPr lang="de-DE" sz="2400">
-                    <a:solidFill>
-                      <a:schemeClr val="accent3"/>
-                    </a:solidFill>
-                    <a:latin typeface="Corbel" panose="020B0503020204020204" pitchFamily="34" charset="0"/>
-                  </a:rPr>
-                  <a:t>(e.g. motor affects position)</a:t>
-                </a:r>
-              </a:p>
-              <a:p>
-                <a:pPr>
-                  <a:buFontTx/>
-                  <a:buChar char="-"/>
-                </a:pPr>
-                <a14:m>
-                  <m:oMath xmlns:m="http://schemas.openxmlformats.org/officeDocument/2006/math">
-                    <m:sSub>
-                      <m:sSubPr>
-                        <m:ctrlPr>
-                          <a:rPr lang="de-DE" sz="2800" b="0" i="1" smtClean="0">
-                            <a:latin typeface="Cambria Math" panose="02040503050406030204" pitchFamily="18" charset="0"/>
-                          </a:rPr>
-                        </m:ctrlPr>
-                      </m:sSubPr>
-                      <m:e>
-                        <m:r>
-                          <a:rPr lang="de-DE" sz="2800" b="0" i="1" smtClean="0">
-                            <a:latin typeface="Cambria Math" panose="02040503050406030204" pitchFamily="18" charset="0"/>
-                          </a:rPr>
-                          <m:t>𝑢</m:t>
-                        </m:r>
-                      </m:e>
-                      <m:sub>
-                        <m:r>
-                          <a:rPr lang="de-DE" sz="2800" b="0" i="1" smtClean="0">
-                            <a:latin typeface="Cambria Math" panose="02040503050406030204" pitchFamily="18" charset="0"/>
-                          </a:rPr>
-                          <m:t>𝑘</m:t>
-                        </m:r>
-                      </m:sub>
-                    </m:sSub>
-                  </m:oMath>
-                </a14:m>
-                <a:r>
-                  <a:rPr lang="de-DE" sz="2800">
-                    <a:latin typeface="Corbel" panose="020B0503020204020204" pitchFamily="34" charset="0"/>
-                  </a:rPr>
-                  <a:t> : control vector  </a:t>
-                </a:r>
-                <a:r>
-                  <a:rPr lang="de-DE" sz="2400">
-                    <a:solidFill>
-                      <a:schemeClr val="accent3"/>
-                    </a:solidFill>
-                    <a:latin typeface="Corbel" panose="020B0503020204020204" pitchFamily="34" charset="0"/>
-                  </a:rPr>
-                  <a:t>(e.g. how much the motor is driven)</a:t>
-                </a:r>
-              </a:p>
-              <a:p>
-                <a:pPr>
-                  <a:buFontTx/>
-                  <a:buChar char="-"/>
-                </a:pPr>
-                <a14:m>
-                  <m:oMath xmlns:m="http://schemas.openxmlformats.org/officeDocument/2006/math">
-                    <m:sSub>
-                      <m:sSubPr>
-                        <m:ctrlPr>
-                          <a:rPr lang="de-DE" sz="2800" i="1">
-                            <a:solidFill>
-                              <a:prstClr val="black"/>
-                            </a:solidFill>
-                            <a:latin typeface="Cambria Math" panose="02040503050406030204" pitchFamily="18" charset="0"/>
-                          </a:rPr>
-                        </m:ctrlPr>
-                      </m:sSubPr>
-                      <m:e>
-                        <m:r>
-                          <a:rPr lang="de-DE" sz="2800" b="0" i="1" smtClean="0">
-                            <a:solidFill>
-                              <a:prstClr val="black"/>
-                            </a:solidFill>
-                            <a:latin typeface="Cambria Math" panose="02040503050406030204" pitchFamily="18" charset="0"/>
-                          </a:rPr>
-                          <m:t>𝑤</m:t>
-                        </m:r>
-                      </m:e>
-                      <m:sub>
-                        <m:r>
-                          <a:rPr lang="de-DE" sz="2800" i="1">
-                            <a:solidFill>
-                              <a:prstClr val="black"/>
-                            </a:solidFill>
-                            <a:latin typeface="Cambria Math" panose="02040503050406030204" pitchFamily="18" charset="0"/>
-                          </a:rPr>
-                          <m:t>𝑘</m:t>
-                        </m:r>
-                      </m:sub>
-                    </m:sSub>
-                  </m:oMath>
-                </a14:m>
-                <a:r>
-                  <a:rPr lang="de-DE" sz="2800">
-                    <a:solidFill>
-                      <a:prstClr val="black"/>
-                    </a:solidFill>
-                    <a:latin typeface="Corbel" panose="020B0503020204020204" pitchFamily="34" charset="0"/>
-                  </a:rPr>
-                  <a:t> : process noise – with covariance </a:t>
-                </a:r>
-                <a14:m>
-                  <m:oMath xmlns:m="http://schemas.openxmlformats.org/officeDocument/2006/math">
-                    <m:sSub>
-                      <m:sSubPr>
-                        <m:ctrlPr>
-                          <a:rPr lang="de-DE" sz="2800" b="0" i="1" smtClean="0">
-                            <a:solidFill>
-                              <a:prstClr val="black"/>
-                            </a:solidFill>
-                            <a:latin typeface="Cambria Math" panose="02040503050406030204" pitchFamily="18" charset="0"/>
-                          </a:rPr>
-                        </m:ctrlPr>
-                      </m:sSubPr>
-                      <m:e>
-                        <m:r>
-                          <a:rPr lang="de-DE" sz="2800" b="0" i="1" smtClean="0">
-                            <a:solidFill>
-                              <a:prstClr val="black"/>
-                            </a:solidFill>
-                            <a:latin typeface="Cambria Math" panose="02040503050406030204" pitchFamily="18" charset="0"/>
-                          </a:rPr>
-                          <m:t>𝑄</m:t>
-                        </m:r>
-                      </m:e>
-                      <m:sub>
-                        <m:r>
-                          <a:rPr lang="de-DE" sz="2800" b="0" i="1" smtClean="0">
-                            <a:solidFill>
-                              <a:prstClr val="black"/>
-                            </a:solidFill>
-                            <a:latin typeface="Cambria Math" panose="02040503050406030204" pitchFamily="18" charset="0"/>
-                          </a:rPr>
-                          <m:t>𝑘</m:t>
-                        </m:r>
-                      </m:sub>
-                    </m:sSub>
-                  </m:oMath>
-                </a14:m>
-                <a:endParaRPr lang="de-DE" sz="2400">
-                  <a:latin typeface="Corbel" panose="020B0503020204020204" pitchFamily="34" charset="0"/>
-                </a:endParaRPr>
-              </a:p>
-              <a:p>
-                <a:pPr>
-                  <a:buFontTx/>
-                  <a:buChar char="-"/>
-                </a:pPr>
-                <a:endParaRPr lang="de-DE" sz="2800">
-                  <a:latin typeface="Corbel" panose="020B0503020204020204" pitchFamily="34" charset="0"/>
-                </a:endParaRPr>
-              </a:p>
-            </p:txBody>
-          </p:sp>
-        </mc:Choice>
-        <mc:Fallback xmlns="">
-          <p:sp>
-            <p:nvSpPr>
-              <p:cNvPr id="3" name="Inhaltsplatzhalter 2">
-                <a:extLst>
-                  <a:ext uri="{FF2B5EF4-FFF2-40B4-BE49-F238E27FC236}">
-                    <a16:creationId xmlns:a16="http://schemas.microsoft.com/office/drawing/2014/main" id="{9962D4C6-1989-457F-A5DB-9CC2C96CDAE3}"/>
-                  </a:ext>
-                </a:extLst>
-              </p:cNvPr>
-              <p:cNvSpPr>
-                <a:spLocks noGrp="1" noRot="1" noChangeAspect="1" noMove="1" noResize="1" noEditPoints="1" noAdjustHandles="1" noChangeArrowheads="1" noChangeShapeType="1" noTextEdit="1"/>
-              </p:cNvSpPr>
-              <p:nvPr>
-                <p:ph idx="1"/>
-              </p:nvPr>
-            </p:nvSpPr>
-            <p:spPr>
-              <a:blipFill>
-                <a:blip r:embed="rId3"/>
-                <a:stretch>
-                  <a:fillRect l="-1546" t="-2241" b="-840"/>
-                </a:stretch>
-              </a:blipFill>
-            </p:spPr>
-            <p:txBody>
-              <a:bodyPr/>
-              <a:lstStyle/>
-              <a:p>
-                <a:r>
-                  <a:rPr lang="de-DE">
-                    <a:noFill/>
-                  </a:rPr>
-                  <a:t> </a:t>
-                </a:r>
-              </a:p>
-            </p:txBody>
-          </p:sp>
-        </mc:Fallback>
-      </mc:AlternateContent>
-      <p:cxnSp>
-        <p:nvCxnSpPr>
-          <p:cNvPr id="5" name="Gerader Verbinder 4">
-            <a:extLst>
-              <a:ext uri="{FF2B5EF4-FFF2-40B4-BE49-F238E27FC236}">
-                <a16:creationId xmlns:a16="http://schemas.microsoft.com/office/drawing/2014/main" id="{1892A047-1063-4568-A9A5-DA40684BA449}"/>
-              </a:ext>
-            </a:extLst>
-          </p:cNvPr>
-          <p:cNvCxnSpPr/>
-          <p:nvPr/>
-        </p:nvCxnSpPr>
-        <p:spPr>
-          <a:xfrm>
-            <a:off x="0" y="1065231"/>
-            <a:ext cx="9144000" cy="0"/>
-          </a:xfrm>
-          <a:prstGeom prst="line">
-            <a:avLst/>
-          </a:prstGeom>
-        </p:spPr>
-        <p:style>
-          <a:lnRef idx="1">
-            <a:schemeClr val="accent1"/>
-          </a:lnRef>
-          <a:fillRef idx="0">
-            <a:schemeClr val="accent1"/>
-          </a:fillRef>
-          <a:effectRef idx="0">
-            <a:schemeClr val="accent1"/>
-          </a:effectRef>
-          <a:fontRef idx="minor">
-            <a:schemeClr val="tx1"/>
-          </a:fontRef>
-        </p:style>
-      </p:cxnSp>
-      <p:sp>
-        <p:nvSpPr>
-          <p:cNvPr id="6" name="Foliennummernplatzhalter 5">
-            <a:extLst>
-              <a:ext uri="{FF2B5EF4-FFF2-40B4-BE49-F238E27FC236}">
-                <a16:creationId xmlns:a16="http://schemas.microsoft.com/office/drawing/2014/main" id="{5140CF2F-6F7F-44F0-8F3E-6C2234A57167}"/>
-              </a:ext>
-            </a:extLst>
-          </p:cNvPr>
-          <p:cNvSpPr>
-            <a:spLocks noGrp="1"/>
-          </p:cNvSpPr>
-          <p:nvPr>
-            <p:ph type="sldNum" sz="quarter" idx="12"/>
-          </p:nvPr>
-        </p:nvSpPr>
-        <p:spPr/>
-        <p:txBody>
-          <a:bodyPr/>
-          <a:lstStyle/>
-          <a:p>
-            <a:fld id="{0696A970-E1A0-4FA3-8434-947DF6AD858B}" type="slidenum">
-              <a:rPr lang="de-DE" smtClean="0"/>
-              <a:t>9</a:t>
-            </a:fld>
-            <a:endParaRPr lang="de-DE"/>
-          </a:p>
-        </p:txBody>
-      </p:sp>
-    </p:spTree>
-    <p:extLst>
-      <p:ext uri="{BB962C8B-B14F-4D97-AF65-F5344CB8AC3E}">
-        <p14:creationId xmlns:p14="http://schemas.microsoft.com/office/powerpoint/2010/main" val="942563095"/>
       </p:ext>
     </p:extLst>
   </p:cSld>

</xml_diff>